<commit_message>
Update ppt presentation for conv layer
</commit_message>
<xml_diff>
--- a/ifx_docu/NN Kernels/NN Kernels - Conv layer.pptx
+++ b/ifx_docu/NN Kernels/NN Kernels - Conv layer.pptx
@@ -5,27 +5,31 @@
     <p:sldMasterId id="2147483715" r:id="rId5"/>
   </p:sldMasterIdLst>
   <p:notesMasterIdLst>
-    <p:notesMasterId r:id="rId16"/>
+    <p:notesMasterId r:id="rId20"/>
   </p:notesMasterIdLst>
   <p:handoutMasterIdLst>
-    <p:handoutMasterId r:id="rId17"/>
+    <p:handoutMasterId r:id="rId21"/>
   </p:handoutMasterIdLst>
   <p:sldIdLst>
     <p:sldId id="318" r:id="rId6"/>
-    <p:sldId id="328" r:id="rId7"/>
-    <p:sldId id="330" r:id="rId8"/>
-    <p:sldId id="335" r:id="rId9"/>
-    <p:sldId id="329" r:id="rId10"/>
-    <p:sldId id="331" r:id="rId11"/>
-    <p:sldId id="332" r:id="rId12"/>
-    <p:sldId id="333" r:id="rId13"/>
-    <p:sldId id="334" r:id="rId14"/>
-    <p:sldId id="324" r:id="rId15"/>
+    <p:sldId id="338" r:id="rId7"/>
+    <p:sldId id="328" r:id="rId8"/>
+    <p:sldId id="330" r:id="rId9"/>
+    <p:sldId id="335" r:id="rId10"/>
+    <p:sldId id="329" r:id="rId11"/>
+    <p:sldId id="331" r:id="rId12"/>
+    <p:sldId id="332" r:id="rId13"/>
+    <p:sldId id="333" r:id="rId14"/>
+    <p:sldId id="334" r:id="rId15"/>
+    <p:sldId id="337" r:id="rId16"/>
+    <p:sldId id="336" r:id="rId17"/>
+    <p:sldId id="339" r:id="rId18"/>
+    <p:sldId id="324" r:id="rId19"/>
   </p:sldIdLst>
   <p:sldSz cx="9144000" cy="6858000" type="screen4x3"/>
   <p:notesSz cx="7099300" cy="10234613"/>
   <p:custDataLst>
-    <p:tags r:id="rId18"/>
+    <p:tags r:id="rId22"/>
   </p:custDataLst>
   <p:defaultTextStyle>
     <a:defPPr>
@@ -225,6 +229,12 @@
 </p:presentation>
 </file>
 
+<file path=ppt/commentAuthors.xml><?xml version="1.0" encoding="utf-8"?>
+<p:cmAuthorLst xmlns:a="http://schemas.openxmlformats.org/drawingml/2006/main" xmlns:r="http://schemas.openxmlformats.org/officeDocument/2006/relationships" xmlns:p="http://schemas.openxmlformats.org/presentationml/2006/main">
+  <p:cmAuthor id="2" name="Author" initials="A" lastIdx="0" clrIdx="1"/>
+</p:cmAuthorLst>
+</file>
+
 <file path=ppt/handoutMasters/handoutMaster1.xml><?xml version="1.0" encoding="utf-8"?>
 <p:handoutMaster xmlns:a="http://schemas.openxmlformats.org/drawingml/2006/main" xmlns:r="http://schemas.openxmlformats.org/officeDocument/2006/relationships" xmlns:p="http://schemas.openxmlformats.org/presentationml/2006/main">
   <p:cSld>
@@ -1311,7 +1321,7 @@
                 <a:cs typeface="Arial" panose="020B0604020202020204" pitchFamily="34" charset="0"/>
               </a:rPr>
               <a:pPr/>
-              <a:t>10</a:t>
+              <a:t>14</a:t>
             </a:fld>
             <a:endParaRPr lang="en-US">
               <a:latin typeface="Arial" panose="020B0604020202020204" pitchFamily="34" charset="0"/>
@@ -11018,7 +11028,11 @@
           <a:p>
             <a:r>
               <a:rPr lang="de-DE" dirty="0" smtClean="0"/>
-              <a:t>Convolutional layer </a:t>
+              <a:t>Convolutional </a:t>
+            </a:r>
+            <a:r>
+              <a:rPr lang="de-DE" dirty="0" smtClean="0"/>
+              <a:t>layers </a:t>
             </a:r>
             <a:r>
               <a:rPr lang="de-DE" dirty="0" smtClean="0"/>
@@ -11106,6 +11120,1303 @@
 </file>
 
 <file path=ppt/slides/slide10.xml><?xml version="1.0" encoding="utf-8"?>
+<p:sld xmlns:a="http://schemas.openxmlformats.org/drawingml/2006/main" xmlns:r="http://schemas.openxmlformats.org/officeDocument/2006/relationships" xmlns:p="http://schemas.openxmlformats.org/presentationml/2006/main">
+  <p:cSld>
+    <p:spTree>
+      <p:nvGrpSpPr>
+        <p:cNvPr id="1" name=""/>
+        <p:cNvGrpSpPr/>
+        <p:nvPr/>
+      </p:nvGrpSpPr>
+      <p:grpSpPr>
+        <a:xfrm>
+          <a:off x="0" y="0"/>
+          <a:ext cx="0" cy="0"/>
+          <a:chOff x="0" y="0"/>
+          <a:chExt cx="0" cy="0"/>
+        </a:xfrm>
+      </p:grpSpPr>
+      <p:sp>
+        <p:nvSpPr>
+          <p:cNvPr id="2" name="Footer Placeholder 1"/>
+          <p:cNvSpPr>
+            <a:spLocks noGrp="1"/>
+          </p:cNvSpPr>
+          <p:nvPr>
+            <p:ph type="ftr" sz="quarter" idx="16"/>
+          </p:nvPr>
+        </p:nvSpPr>
+        <p:spPr/>
+        <p:txBody>
+          <a:bodyPr/>
+          <a:lstStyle/>
+          <a:p>
+            <a:r>
+              <a:rPr lang="en-US" smtClean="0"/>
+              <a:t>Copyright © Infineon Technologies AG 2020. All rights reserved.</a:t>
+            </a:r>
+            <a:endParaRPr lang="de-DE" dirty="0"/>
+          </a:p>
+        </p:txBody>
+      </p:sp>
+      <p:sp>
+        <p:nvSpPr>
+          <p:cNvPr id="3" name="Slide Number Placeholder 2"/>
+          <p:cNvSpPr>
+            <a:spLocks noGrp="1"/>
+          </p:cNvSpPr>
+          <p:nvPr>
+            <p:ph type="sldNum" sz="quarter" idx="14"/>
+          </p:nvPr>
+        </p:nvSpPr>
+        <p:spPr/>
+        <p:txBody>
+          <a:bodyPr/>
+          <a:lstStyle/>
+          <a:p>
+            <a:fld id="{97555E91-926B-4C96-90B6-D75C3A27DF23}" type="slidenum">
+              <a:rPr lang="de-DE" smtClean="0"/>
+              <a:pPr/>
+              <a:t>10</a:t>
+            </a:fld>
+            <a:endParaRPr lang="de-DE" dirty="0"/>
+          </a:p>
+        </p:txBody>
+      </p:sp>
+      <p:sp>
+        <p:nvSpPr>
+          <p:cNvPr id="4" name="Title 3"/>
+          <p:cNvSpPr>
+            <a:spLocks noGrp="1"/>
+          </p:cNvSpPr>
+          <p:nvPr>
+            <p:ph type="title"/>
+          </p:nvPr>
+        </p:nvSpPr>
+        <p:spPr/>
+        <p:txBody>
+          <a:bodyPr/>
+          <a:lstStyle/>
+          <a:p>
+            <a:r>
+              <a:rPr lang="de-DE" dirty="0" smtClean="0"/>
+              <a:t>Benchmarks Int8</a:t>
+            </a:r>
+            <a:endParaRPr lang="de-DE" dirty="0"/>
+          </a:p>
+        </p:txBody>
+      </p:sp>
+      <p:sp>
+        <p:nvSpPr>
+          <p:cNvPr id="6" name="Date Placeholder 5"/>
+          <p:cNvSpPr>
+            <a:spLocks noGrp="1"/>
+          </p:cNvSpPr>
+          <p:nvPr>
+            <p:ph type="dt" sz="half" idx="15"/>
+          </p:nvPr>
+        </p:nvSpPr>
+        <p:spPr/>
+        <p:txBody>
+          <a:bodyPr/>
+          <a:lstStyle/>
+          <a:p>
+            <a:r>
+              <a:rPr lang="de-DE" smtClean="0"/>
+              <a:t>2020-05-14             </a:t>
+            </a:r>
+            <a:r>
+              <a:rPr lang="de-DE" b="1" smtClean="0"/>
+              <a:t>restricted</a:t>
+            </a:r>
+            <a:endParaRPr lang="de-DE" b="1" dirty="0"/>
+          </a:p>
+        </p:txBody>
+      </p:sp>
+      <p:pic>
+        <p:nvPicPr>
+          <p:cNvPr id="8" name="Picture 7"/>
+          <p:cNvPicPr>
+            <a:picLocks noChangeAspect="1"/>
+          </p:cNvPicPr>
+          <p:nvPr/>
+        </p:nvPicPr>
+        <p:blipFill>
+          <a:blip r:embed="rId2">
+            <a:extLst>
+              <a:ext uri="{28A0092B-C50C-407E-A947-70E740481C1C}">
+                <a14:useLocalDpi xmlns:a14="http://schemas.microsoft.com/office/drawing/2010/main" val="0"/>
+              </a:ext>
+            </a:extLst>
+          </a:blip>
+          <a:stretch>
+            <a:fillRect/>
+          </a:stretch>
+        </p:blipFill>
+        <p:spPr>
+          <a:xfrm>
+            <a:off x="827584" y="1484784"/>
+            <a:ext cx="7315215" cy="3657607"/>
+          </a:xfrm>
+          <a:prstGeom prst="rect">
+            <a:avLst/>
+          </a:prstGeom>
+        </p:spPr>
+      </p:pic>
+      <p:sp>
+        <p:nvSpPr>
+          <p:cNvPr id="10" name="TextBox 9"/>
+          <p:cNvSpPr txBox="1"/>
+          <p:nvPr/>
+        </p:nvSpPr>
+        <p:spPr bwMode="auto">
+          <a:xfrm>
+            <a:off x="6156176" y="5157192"/>
+            <a:ext cx="2688236" cy="1300356"/>
+          </a:xfrm>
+          <a:prstGeom prst="rect">
+            <a:avLst/>
+          </a:prstGeom>
+          <a:noFill/>
+          <a:ln w="9525">
+            <a:noFill/>
+            <a:miter lim="800000"/>
+            <a:headEnd/>
+            <a:tailEnd/>
+          </a:ln>
+          <a:effectLst/>
+        </p:spPr>
+        <p:txBody>
+          <a:bodyPr wrap="none" lIns="0" tIns="0" rIns="0" bIns="0" rtlCol="0" anchor="ctr" anchorCtr="0">
+            <a:spAutoFit/>
+          </a:bodyPr>
+          <a:lstStyle/>
+          <a:p>
+            <a:pPr marL="285750" marR="0" indent="-285750" defTabSz="914400" eaLnBrk="0" fontAlgn="auto" latinLnBrk="0" hangingPunct="0">
+              <a:spcBef>
+                <a:spcPts val="0"/>
+              </a:spcBef>
+              <a:spcAft>
+                <a:spcPts val="300"/>
+              </a:spcAft>
+              <a:buClr>
+                <a:schemeClr val="accent1"/>
+              </a:buClr>
+              <a:buSzTx/>
+              <a:buFont typeface="Arial" panose="020B0604020202020204" pitchFamily="34" charset="0"/>
+              <a:buChar char="›"/>
+              <a:tabLst/>
+            </a:pPr>
+            <a:r>
+              <a:rPr lang="de-DE" sz="1400" kern="0" dirty="0" smtClean="0">
+                <a:latin typeface="Arial" panose="020B0604020202020204" pitchFamily="34" charset="0"/>
+                <a:ea typeface="Verdana" pitchFamily="34" charset="0"/>
+                <a:cs typeface="Arial" panose="020B0604020202020204" pitchFamily="34" charset="0"/>
+              </a:rPr>
+              <a:t>PO: Portable optimized</a:t>
+            </a:r>
+          </a:p>
+          <a:p>
+            <a:pPr marL="285750" marR="0" indent="-285750" defTabSz="914400" eaLnBrk="0" fontAlgn="auto" latinLnBrk="0" hangingPunct="0">
+              <a:spcBef>
+                <a:spcPts val="0"/>
+              </a:spcBef>
+              <a:spcAft>
+                <a:spcPts val="300"/>
+              </a:spcAft>
+              <a:buClr>
+                <a:schemeClr val="accent1"/>
+              </a:buClr>
+              <a:buSzTx/>
+              <a:buFont typeface="Arial" panose="020B0604020202020204" pitchFamily="34" charset="0"/>
+              <a:buChar char="›"/>
+              <a:tabLst/>
+            </a:pPr>
+            <a:r>
+              <a:rPr lang="de-DE" sz="1400" kern="0" dirty="0" smtClean="0">
+                <a:latin typeface="Arial" panose="020B0604020202020204" pitchFamily="34" charset="0"/>
+                <a:ea typeface="Verdana" pitchFamily="34" charset="0"/>
+                <a:cs typeface="Arial" panose="020B0604020202020204" pitchFamily="34" charset="0"/>
+              </a:rPr>
+              <a:t>Optimizations: </a:t>
+            </a:r>
+          </a:p>
+          <a:p>
+            <a:pPr marL="742950" lvl="1" indent="-285750" eaLnBrk="0" fontAlgn="auto" hangingPunct="0">
+              <a:spcBef>
+                <a:spcPts val="0"/>
+              </a:spcBef>
+              <a:spcAft>
+                <a:spcPts val="300"/>
+              </a:spcAft>
+              <a:buClr>
+                <a:schemeClr val="accent1"/>
+              </a:buClr>
+              <a:buFont typeface="Arial" panose="020B0604020202020204" pitchFamily="34" charset="0"/>
+              <a:buChar char="›"/>
+            </a:pPr>
+            <a:r>
+              <a:rPr lang="de-DE" sz="1100" kern="0" dirty="0" smtClean="0">
+                <a:latin typeface="Arial" panose="020B0604020202020204" pitchFamily="34" charset="0"/>
+                <a:ea typeface="Verdana" pitchFamily="34" charset="0"/>
+                <a:cs typeface="Arial" panose="020B0604020202020204" pitchFamily="34" charset="0"/>
+              </a:rPr>
+              <a:t>Precomputations(PC)</a:t>
+            </a:r>
+          </a:p>
+          <a:p>
+            <a:pPr marL="742950" lvl="1" indent="-285750" eaLnBrk="0" fontAlgn="auto" hangingPunct="0">
+              <a:spcBef>
+                <a:spcPts val="0"/>
+              </a:spcBef>
+              <a:spcAft>
+                <a:spcPts val="300"/>
+              </a:spcAft>
+              <a:buClr>
+                <a:schemeClr val="accent1"/>
+              </a:buClr>
+              <a:buFont typeface="Arial" panose="020B0604020202020204" pitchFamily="34" charset="0"/>
+              <a:buChar char="›"/>
+            </a:pPr>
+            <a:r>
+              <a:rPr lang="de-DE" sz="1100" kern="0" dirty="0" smtClean="0">
+                <a:latin typeface="Arial" panose="020B0604020202020204" pitchFamily="34" charset="0"/>
+                <a:ea typeface="Verdana" pitchFamily="34" charset="0"/>
+                <a:cs typeface="Arial" panose="020B0604020202020204" pitchFamily="34" charset="0"/>
+              </a:rPr>
+              <a:t>Loop Variables(Loop)</a:t>
+            </a:r>
+          </a:p>
+          <a:p>
+            <a:pPr marL="742950" lvl="1" indent="-285750" eaLnBrk="0" fontAlgn="auto" hangingPunct="0">
+              <a:spcBef>
+                <a:spcPts val="0"/>
+              </a:spcBef>
+              <a:spcAft>
+                <a:spcPts val="300"/>
+              </a:spcAft>
+              <a:buClr>
+                <a:schemeClr val="accent1"/>
+              </a:buClr>
+              <a:buFont typeface="Arial" panose="020B0604020202020204" pitchFamily="34" charset="0"/>
+              <a:buChar char="›"/>
+            </a:pPr>
+            <a:r>
+              <a:rPr lang="de-DE" sz="1100" kern="0" dirty="0" smtClean="0">
+                <a:latin typeface="Arial" panose="020B0604020202020204" pitchFamily="34" charset="0"/>
+                <a:ea typeface="Verdana" pitchFamily="34" charset="0"/>
+                <a:cs typeface="Arial" panose="020B0604020202020204" pitchFamily="34" charset="0"/>
+              </a:rPr>
+              <a:t>Filter consecutivity(Ficon)</a:t>
+            </a:r>
+          </a:p>
+          <a:p>
+            <a:pPr marL="742950" lvl="1" indent="-285750" eaLnBrk="0" fontAlgn="auto" hangingPunct="0">
+              <a:spcBef>
+                <a:spcPts val="0"/>
+              </a:spcBef>
+              <a:spcAft>
+                <a:spcPts val="300"/>
+              </a:spcAft>
+              <a:buClr>
+                <a:schemeClr val="accent1"/>
+              </a:buClr>
+              <a:buFont typeface="Arial" panose="020B0604020202020204" pitchFamily="34" charset="0"/>
+              <a:buChar char="›"/>
+            </a:pPr>
+            <a:r>
+              <a:rPr lang="de-DE" sz="1100" kern="0" dirty="0" smtClean="0">
+                <a:latin typeface="Arial" panose="020B0604020202020204" pitchFamily="34" charset="0"/>
+                <a:ea typeface="Verdana" pitchFamily="34" charset="0"/>
+                <a:cs typeface="Arial" panose="020B0604020202020204" pitchFamily="34" charset="0"/>
+              </a:rPr>
+              <a:t>Remove Conditionals (nocond)</a:t>
+            </a:r>
+            <a:endParaRPr lang="de-DE" sz="1100" kern="0" dirty="0" smtClean="0">
+              <a:latin typeface="Arial" panose="020B0604020202020204" pitchFamily="34" charset="0"/>
+              <a:ea typeface="Verdana" pitchFamily="34" charset="0"/>
+              <a:cs typeface="Arial" panose="020B0604020202020204" pitchFamily="34" charset="0"/>
+            </a:endParaRPr>
+          </a:p>
+        </p:txBody>
+      </p:sp>
+      <p:sp>
+        <p:nvSpPr>
+          <p:cNvPr id="11" name="TextBox 10"/>
+          <p:cNvSpPr txBox="1"/>
+          <p:nvPr/>
+        </p:nvSpPr>
+        <p:spPr bwMode="auto">
+          <a:xfrm>
+            <a:off x="755576" y="1124744"/>
+            <a:ext cx="1584176" cy="215444"/>
+          </a:xfrm>
+          <a:prstGeom prst="rect">
+            <a:avLst/>
+          </a:prstGeom>
+          <a:noFill/>
+          <a:ln w="9525">
+            <a:noFill/>
+            <a:miter lim="800000"/>
+            <a:headEnd/>
+            <a:tailEnd/>
+          </a:ln>
+          <a:effectLst/>
+        </p:spPr>
+        <p:txBody>
+          <a:bodyPr wrap="square" lIns="0" tIns="0" rIns="0" bIns="0" rtlCol="0" anchor="ctr" anchorCtr="0">
+            <a:spAutoFit/>
+          </a:bodyPr>
+          <a:lstStyle/>
+          <a:p>
+            <a:pPr marR="0" defTabSz="914400" eaLnBrk="0" fontAlgn="auto" latinLnBrk="0" hangingPunct="0">
+              <a:spcBef>
+                <a:spcPts val="0"/>
+              </a:spcBef>
+              <a:spcAft>
+                <a:spcPts val="300"/>
+              </a:spcAft>
+              <a:buClr>
+                <a:schemeClr val="accent1"/>
+              </a:buClr>
+              <a:buSzTx/>
+              <a:tabLst/>
+            </a:pPr>
+            <a:r>
+              <a:rPr lang="de-DE" sz="1400" kern="0" dirty="0" smtClean="0">
+                <a:solidFill>
+                  <a:srgbClr val="FF0000"/>
+                </a:solidFill>
+                <a:latin typeface="Arial" panose="020B0604020202020204" pitchFamily="34" charset="0"/>
+                <a:ea typeface="Verdana" pitchFamily="34" charset="0"/>
+                <a:cs typeface="Arial" panose="020B0604020202020204" pitchFamily="34" charset="0"/>
+              </a:rPr>
+              <a:t>On host computer</a:t>
+            </a:r>
+            <a:endParaRPr lang="de-DE" sz="1400" kern="0" dirty="0" smtClean="0">
+              <a:solidFill>
+                <a:srgbClr val="FF0000"/>
+              </a:solidFill>
+              <a:latin typeface="Arial" panose="020B0604020202020204" pitchFamily="34" charset="0"/>
+              <a:ea typeface="Verdana" pitchFamily="34" charset="0"/>
+              <a:cs typeface="Arial" panose="020B0604020202020204" pitchFamily="34" charset="0"/>
+            </a:endParaRPr>
+          </a:p>
+        </p:txBody>
+      </p:sp>
+    </p:spTree>
+    <p:extLst>
+      <p:ext uri="{BB962C8B-B14F-4D97-AF65-F5344CB8AC3E}">
+        <p14:creationId xmlns:p14="http://schemas.microsoft.com/office/powerpoint/2010/main" val="2060626036"/>
+      </p:ext>
+    </p:extLst>
+  </p:cSld>
+  <p:clrMapOvr>
+    <a:masterClrMapping/>
+  </p:clrMapOvr>
+</p:sld>
+</file>
+
+<file path=ppt/slides/slide11.xml><?xml version="1.0" encoding="utf-8"?>
+<p:sld xmlns:a="http://schemas.openxmlformats.org/drawingml/2006/main" xmlns:r="http://schemas.openxmlformats.org/officeDocument/2006/relationships" xmlns:p="http://schemas.openxmlformats.org/presentationml/2006/main">
+  <p:cSld>
+    <p:spTree>
+      <p:nvGrpSpPr>
+        <p:cNvPr id="1" name=""/>
+        <p:cNvGrpSpPr/>
+        <p:nvPr/>
+      </p:nvGrpSpPr>
+      <p:grpSpPr>
+        <a:xfrm>
+          <a:off x="0" y="0"/>
+          <a:ext cx="0" cy="0"/>
+          <a:chOff x="0" y="0"/>
+          <a:chExt cx="0" cy="0"/>
+        </a:xfrm>
+      </p:grpSpPr>
+      <p:sp>
+        <p:nvSpPr>
+          <p:cNvPr id="2" name="Footer Placeholder 1"/>
+          <p:cNvSpPr>
+            <a:spLocks noGrp="1"/>
+          </p:cNvSpPr>
+          <p:nvPr>
+            <p:ph type="ftr" sz="quarter" idx="16"/>
+          </p:nvPr>
+        </p:nvSpPr>
+        <p:spPr/>
+        <p:txBody>
+          <a:bodyPr/>
+          <a:lstStyle/>
+          <a:p>
+            <a:r>
+              <a:rPr lang="en-US" smtClean="0"/>
+              <a:t>Copyright © Infineon Technologies AG 2020. All rights reserved.</a:t>
+            </a:r>
+            <a:endParaRPr lang="de-DE" dirty="0"/>
+          </a:p>
+        </p:txBody>
+      </p:sp>
+      <p:sp>
+        <p:nvSpPr>
+          <p:cNvPr id="3" name="Slide Number Placeholder 2"/>
+          <p:cNvSpPr>
+            <a:spLocks noGrp="1"/>
+          </p:cNvSpPr>
+          <p:nvPr>
+            <p:ph type="sldNum" sz="quarter" idx="14"/>
+          </p:nvPr>
+        </p:nvSpPr>
+        <p:spPr/>
+        <p:txBody>
+          <a:bodyPr/>
+          <a:lstStyle/>
+          <a:p>
+            <a:fld id="{97555E91-926B-4C96-90B6-D75C3A27DF23}" type="slidenum">
+              <a:rPr lang="de-DE" smtClean="0"/>
+              <a:pPr/>
+              <a:t>11</a:t>
+            </a:fld>
+            <a:endParaRPr lang="de-DE" dirty="0"/>
+          </a:p>
+        </p:txBody>
+      </p:sp>
+      <p:sp>
+        <p:nvSpPr>
+          <p:cNvPr id="4" name="Title 3"/>
+          <p:cNvSpPr>
+            <a:spLocks noGrp="1"/>
+          </p:cNvSpPr>
+          <p:nvPr>
+            <p:ph type="title"/>
+          </p:nvPr>
+        </p:nvSpPr>
+        <p:spPr/>
+        <p:txBody>
+          <a:bodyPr/>
+          <a:lstStyle/>
+          <a:p>
+            <a:r>
+              <a:rPr lang="de-DE" dirty="0" smtClean="0"/>
+              <a:t>Benchmarks UInt8</a:t>
+            </a:r>
+            <a:endParaRPr lang="de-DE" dirty="0"/>
+          </a:p>
+        </p:txBody>
+      </p:sp>
+      <p:sp>
+        <p:nvSpPr>
+          <p:cNvPr id="6" name="Date Placeholder 5"/>
+          <p:cNvSpPr>
+            <a:spLocks noGrp="1"/>
+          </p:cNvSpPr>
+          <p:nvPr>
+            <p:ph type="dt" sz="half" idx="15"/>
+          </p:nvPr>
+        </p:nvSpPr>
+        <p:spPr/>
+        <p:txBody>
+          <a:bodyPr/>
+          <a:lstStyle/>
+          <a:p>
+            <a:r>
+              <a:rPr lang="de-DE" smtClean="0"/>
+              <a:t>2020-05-14             </a:t>
+            </a:r>
+            <a:r>
+              <a:rPr lang="de-DE" b="1" smtClean="0"/>
+              <a:t>restricted</a:t>
+            </a:r>
+            <a:endParaRPr lang="de-DE" b="1" dirty="0"/>
+          </a:p>
+        </p:txBody>
+      </p:sp>
+      <p:pic>
+        <p:nvPicPr>
+          <p:cNvPr id="8" name="Picture 7"/>
+          <p:cNvPicPr>
+            <a:picLocks noChangeAspect="1"/>
+          </p:cNvPicPr>
+          <p:nvPr/>
+        </p:nvPicPr>
+        <p:blipFill>
+          <a:blip r:embed="rId2">
+            <a:extLst>
+              <a:ext uri="{28A0092B-C50C-407E-A947-70E740481C1C}">
+                <a14:useLocalDpi xmlns:a14="http://schemas.microsoft.com/office/drawing/2010/main" val="0"/>
+              </a:ext>
+            </a:extLst>
+          </a:blip>
+          <a:stretch>
+            <a:fillRect/>
+          </a:stretch>
+        </p:blipFill>
+        <p:spPr>
+          <a:xfrm>
+            <a:off x="914392" y="1600196"/>
+            <a:ext cx="7315215" cy="3657607"/>
+          </a:xfrm>
+          <a:prstGeom prst="rect">
+            <a:avLst/>
+          </a:prstGeom>
+        </p:spPr>
+      </p:pic>
+      <p:sp>
+        <p:nvSpPr>
+          <p:cNvPr id="9" name="TextBox 8"/>
+          <p:cNvSpPr txBox="1"/>
+          <p:nvPr/>
+        </p:nvSpPr>
+        <p:spPr bwMode="auto">
+          <a:xfrm>
+            <a:off x="6156176" y="5157192"/>
+            <a:ext cx="2688236" cy="1300356"/>
+          </a:xfrm>
+          <a:prstGeom prst="rect">
+            <a:avLst/>
+          </a:prstGeom>
+          <a:noFill/>
+          <a:ln w="9525">
+            <a:noFill/>
+            <a:miter lim="800000"/>
+            <a:headEnd/>
+            <a:tailEnd/>
+          </a:ln>
+          <a:effectLst/>
+        </p:spPr>
+        <p:txBody>
+          <a:bodyPr wrap="none" lIns="0" tIns="0" rIns="0" bIns="0" rtlCol="0" anchor="ctr" anchorCtr="0">
+            <a:spAutoFit/>
+          </a:bodyPr>
+          <a:lstStyle/>
+          <a:p>
+            <a:pPr marL="285750" marR="0" indent="-285750" defTabSz="914400" eaLnBrk="0" fontAlgn="auto" latinLnBrk="0" hangingPunct="0">
+              <a:spcBef>
+                <a:spcPts val="0"/>
+              </a:spcBef>
+              <a:spcAft>
+                <a:spcPts val="300"/>
+              </a:spcAft>
+              <a:buClr>
+                <a:schemeClr val="accent1"/>
+              </a:buClr>
+              <a:buSzTx/>
+              <a:buFont typeface="Arial" panose="020B0604020202020204" pitchFamily="34" charset="0"/>
+              <a:buChar char="›"/>
+              <a:tabLst/>
+            </a:pPr>
+            <a:r>
+              <a:rPr lang="de-DE" sz="1400" kern="0" dirty="0" smtClean="0">
+                <a:latin typeface="Arial" panose="020B0604020202020204" pitchFamily="34" charset="0"/>
+                <a:ea typeface="Verdana" pitchFamily="34" charset="0"/>
+                <a:cs typeface="Arial" panose="020B0604020202020204" pitchFamily="34" charset="0"/>
+              </a:rPr>
+              <a:t>PO: Portable optimized</a:t>
+            </a:r>
+          </a:p>
+          <a:p>
+            <a:pPr marL="285750" marR="0" indent="-285750" defTabSz="914400" eaLnBrk="0" fontAlgn="auto" latinLnBrk="0" hangingPunct="0">
+              <a:spcBef>
+                <a:spcPts val="0"/>
+              </a:spcBef>
+              <a:spcAft>
+                <a:spcPts val="300"/>
+              </a:spcAft>
+              <a:buClr>
+                <a:schemeClr val="accent1"/>
+              </a:buClr>
+              <a:buSzTx/>
+              <a:buFont typeface="Arial" panose="020B0604020202020204" pitchFamily="34" charset="0"/>
+              <a:buChar char="›"/>
+              <a:tabLst/>
+            </a:pPr>
+            <a:r>
+              <a:rPr lang="de-DE" sz="1400" kern="0" dirty="0" smtClean="0">
+                <a:latin typeface="Arial" panose="020B0604020202020204" pitchFamily="34" charset="0"/>
+                <a:ea typeface="Verdana" pitchFamily="34" charset="0"/>
+                <a:cs typeface="Arial" panose="020B0604020202020204" pitchFamily="34" charset="0"/>
+              </a:rPr>
+              <a:t>Optimizations: </a:t>
+            </a:r>
+          </a:p>
+          <a:p>
+            <a:pPr marL="742950" lvl="1" indent="-285750" eaLnBrk="0" fontAlgn="auto" hangingPunct="0">
+              <a:spcBef>
+                <a:spcPts val="0"/>
+              </a:spcBef>
+              <a:spcAft>
+                <a:spcPts val="300"/>
+              </a:spcAft>
+              <a:buClr>
+                <a:schemeClr val="accent1"/>
+              </a:buClr>
+              <a:buFont typeface="Arial" panose="020B0604020202020204" pitchFamily="34" charset="0"/>
+              <a:buChar char="›"/>
+            </a:pPr>
+            <a:r>
+              <a:rPr lang="de-DE" sz="1100" kern="0" dirty="0" smtClean="0">
+                <a:latin typeface="Arial" panose="020B0604020202020204" pitchFamily="34" charset="0"/>
+                <a:ea typeface="Verdana" pitchFamily="34" charset="0"/>
+                <a:cs typeface="Arial" panose="020B0604020202020204" pitchFamily="34" charset="0"/>
+              </a:rPr>
+              <a:t>Precomputations(PC)</a:t>
+            </a:r>
+          </a:p>
+          <a:p>
+            <a:pPr marL="742950" lvl="1" indent="-285750" eaLnBrk="0" fontAlgn="auto" hangingPunct="0">
+              <a:spcBef>
+                <a:spcPts val="0"/>
+              </a:spcBef>
+              <a:spcAft>
+                <a:spcPts val="300"/>
+              </a:spcAft>
+              <a:buClr>
+                <a:schemeClr val="accent1"/>
+              </a:buClr>
+              <a:buFont typeface="Arial" panose="020B0604020202020204" pitchFamily="34" charset="0"/>
+              <a:buChar char="›"/>
+            </a:pPr>
+            <a:r>
+              <a:rPr lang="de-DE" sz="1100" kern="0" dirty="0" smtClean="0">
+                <a:latin typeface="Arial" panose="020B0604020202020204" pitchFamily="34" charset="0"/>
+                <a:ea typeface="Verdana" pitchFamily="34" charset="0"/>
+                <a:cs typeface="Arial" panose="020B0604020202020204" pitchFamily="34" charset="0"/>
+              </a:rPr>
+              <a:t>Loop Variables(Loop)</a:t>
+            </a:r>
+          </a:p>
+          <a:p>
+            <a:pPr marL="742950" lvl="1" indent="-285750" eaLnBrk="0" fontAlgn="auto" hangingPunct="0">
+              <a:spcBef>
+                <a:spcPts val="0"/>
+              </a:spcBef>
+              <a:spcAft>
+                <a:spcPts val="300"/>
+              </a:spcAft>
+              <a:buClr>
+                <a:schemeClr val="accent1"/>
+              </a:buClr>
+              <a:buFont typeface="Arial" panose="020B0604020202020204" pitchFamily="34" charset="0"/>
+              <a:buChar char="›"/>
+            </a:pPr>
+            <a:r>
+              <a:rPr lang="de-DE" sz="1100" kern="0" dirty="0" smtClean="0">
+                <a:latin typeface="Arial" panose="020B0604020202020204" pitchFamily="34" charset="0"/>
+                <a:ea typeface="Verdana" pitchFamily="34" charset="0"/>
+                <a:cs typeface="Arial" panose="020B0604020202020204" pitchFamily="34" charset="0"/>
+              </a:rPr>
+              <a:t>Filter consecutivity(Ficon)</a:t>
+            </a:r>
+          </a:p>
+          <a:p>
+            <a:pPr marL="742950" lvl="1" indent="-285750" eaLnBrk="0" fontAlgn="auto" hangingPunct="0">
+              <a:spcBef>
+                <a:spcPts val="0"/>
+              </a:spcBef>
+              <a:spcAft>
+                <a:spcPts val="300"/>
+              </a:spcAft>
+              <a:buClr>
+                <a:schemeClr val="accent1"/>
+              </a:buClr>
+              <a:buFont typeface="Arial" panose="020B0604020202020204" pitchFamily="34" charset="0"/>
+              <a:buChar char="›"/>
+            </a:pPr>
+            <a:r>
+              <a:rPr lang="de-DE" sz="1100" kern="0" dirty="0" smtClean="0">
+                <a:latin typeface="Arial" panose="020B0604020202020204" pitchFamily="34" charset="0"/>
+                <a:ea typeface="Verdana" pitchFamily="34" charset="0"/>
+                <a:cs typeface="Arial" panose="020B0604020202020204" pitchFamily="34" charset="0"/>
+              </a:rPr>
+              <a:t>Remove Conditionals (nocond)</a:t>
+            </a:r>
+            <a:endParaRPr lang="de-DE" sz="1100" kern="0" dirty="0" smtClean="0">
+              <a:latin typeface="Arial" panose="020B0604020202020204" pitchFamily="34" charset="0"/>
+              <a:ea typeface="Verdana" pitchFamily="34" charset="0"/>
+              <a:cs typeface="Arial" panose="020B0604020202020204" pitchFamily="34" charset="0"/>
+            </a:endParaRPr>
+          </a:p>
+        </p:txBody>
+      </p:sp>
+      <p:sp>
+        <p:nvSpPr>
+          <p:cNvPr id="10" name="TextBox 9"/>
+          <p:cNvSpPr txBox="1"/>
+          <p:nvPr/>
+        </p:nvSpPr>
+        <p:spPr bwMode="auto">
+          <a:xfrm>
+            <a:off x="755576" y="1124744"/>
+            <a:ext cx="1584176" cy="215444"/>
+          </a:xfrm>
+          <a:prstGeom prst="rect">
+            <a:avLst/>
+          </a:prstGeom>
+          <a:noFill/>
+          <a:ln w="9525">
+            <a:noFill/>
+            <a:miter lim="800000"/>
+            <a:headEnd/>
+            <a:tailEnd/>
+          </a:ln>
+          <a:effectLst/>
+        </p:spPr>
+        <p:txBody>
+          <a:bodyPr wrap="square" lIns="0" tIns="0" rIns="0" bIns="0" rtlCol="0" anchor="ctr" anchorCtr="0">
+            <a:spAutoFit/>
+          </a:bodyPr>
+          <a:lstStyle/>
+          <a:p>
+            <a:pPr marR="0" defTabSz="914400" eaLnBrk="0" fontAlgn="auto" latinLnBrk="0" hangingPunct="0">
+              <a:spcBef>
+                <a:spcPts val="0"/>
+              </a:spcBef>
+              <a:spcAft>
+                <a:spcPts val="300"/>
+              </a:spcAft>
+              <a:buClr>
+                <a:schemeClr val="accent1"/>
+              </a:buClr>
+              <a:buSzTx/>
+              <a:tabLst/>
+            </a:pPr>
+            <a:r>
+              <a:rPr lang="de-DE" sz="1400" kern="0" dirty="0" smtClean="0">
+                <a:solidFill>
+                  <a:srgbClr val="FF0000"/>
+                </a:solidFill>
+                <a:latin typeface="Arial" panose="020B0604020202020204" pitchFamily="34" charset="0"/>
+                <a:ea typeface="Verdana" pitchFamily="34" charset="0"/>
+                <a:cs typeface="Arial" panose="020B0604020202020204" pitchFamily="34" charset="0"/>
+              </a:rPr>
+              <a:t>On host computer</a:t>
+            </a:r>
+            <a:endParaRPr lang="de-DE" sz="1400" kern="0" dirty="0" smtClean="0">
+              <a:solidFill>
+                <a:srgbClr val="FF0000"/>
+              </a:solidFill>
+              <a:latin typeface="Arial" panose="020B0604020202020204" pitchFamily="34" charset="0"/>
+              <a:ea typeface="Verdana" pitchFamily="34" charset="0"/>
+              <a:cs typeface="Arial" panose="020B0604020202020204" pitchFamily="34" charset="0"/>
+            </a:endParaRPr>
+          </a:p>
+        </p:txBody>
+      </p:sp>
+    </p:spTree>
+    <p:extLst>
+      <p:ext uri="{BB962C8B-B14F-4D97-AF65-F5344CB8AC3E}">
+        <p14:creationId xmlns:p14="http://schemas.microsoft.com/office/powerpoint/2010/main" val="1464056729"/>
+      </p:ext>
+    </p:extLst>
+  </p:cSld>
+  <p:clrMapOvr>
+    <a:masterClrMapping/>
+  </p:clrMapOvr>
+</p:sld>
+</file>
+
+<file path=ppt/slides/slide12.xml><?xml version="1.0" encoding="utf-8"?>
+<p:sld xmlns:a="http://schemas.openxmlformats.org/drawingml/2006/main" xmlns:r="http://schemas.openxmlformats.org/officeDocument/2006/relationships" xmlns:p="http://schemas.openxmlformats.org/presentationml/2006/main">
+  <p:cSld>
+    <p:spTree>
+      <p:nvGrpSpPr>
+        <p:cNvPr id="1" name=""/>
+        <p:cNvGrpSpPr/>
+        <p:nvPr/>
+      </p:nvGrpSpPr>
+      <p:grpSpPr>
+        <a:xfrm>
+          <a:off x="0" y="0"/>
+          <a:ext cx="0" cy="0"/>
+          <a:chOff x="0" y="0"/>
+          <a:chExt cx="0" cy="0"/>
+        </a:xfrm>
+      </p:grpSpPr>
+      <p:sp>
+        <p:nvSpPr>
+          <p:cNvPr id="2" name="Footer Placeholder 1"/>
+          <p:cNvSpPr>
+            <a:spLocks noGrp="1"/>
+          </p:cNvSpPr>
+          <p:nvPr>
+            <p:ph type="ftr" sz="quarter" idx="16"/>
+          </p:nvPr>
+        </p:nvSpPr>
+        <p:spPr/>
+        <p:txBody>
+          <a:bodyPr/>
+          <a:lstStyle/>
+          <a:p>
+            <a:r>
+              <a:rPr lang="en-US" smtClean="0"/>
+              <a:t>Copyright © Infineon Technologies AG 2020. All rights reserved.</a:t>
+            </a:r>
+            <a:endParaRPr lang="de-DE" dirty="0"/>
+          </a:p>
+        </p:txBody>
+      </p:sp>
+      <p:sp>
+        <p:nvSpPr>
+          <p:cNvPr id="3" name="Slide Number Placeholder 2"/>
+          <p:cNvSpPr>
+            <a:spLocks noGrp="1"/>
+          </p:cNvSpPr>
+          <p:nvPr>
+            <p:ph type="sldNum" sz="quarter" idx="14"/>
+          </p:nvPr>
+        </p:nvSpPr>
+        <p:spPr/>
+        <p:txBody>
+          <a:bodyPr/>
+          <a:lstStyle/>
+          <a:p>
+            <a:fld id="{97555E91-926B-4C96-90B6-D75C3A27DF23}" type="slidenum">
+              <a:rPr lang="de-DE" smtClean="0"/>
+              <a:pPr/>
+              <a:t>12</a:t>
+            </a:fld>
+            <a:endParaRPr lang="de-DE" dirty="0"/>
+          </a:p>
+        </p:txBody>
+      </p:sp>
+      <p:sp>
+        <p:nvSpPr>
+          <p:cNvPr id="4" name="Title 3"/>
+          <p:cNvSpPr>
+            <a:spLocks noGrp="1"/>
+          </p:cNvSpPr>
+          <p:nvPr>
+            <p:ph type="title"/>
+          </p:nvPr>
+        </p:nvSpPr>
+        <p:spPr/>
+        <p:txBody>
+          <a:bodyPr/>
+          <a:lstStyle/>
+          <a:p>
+            <a:r>
+              <a:rPr lang="de-DE" dirty="0" smtClean="0"/>
+              <a:t>Benchmarks RISC V</a:t>
+            </a:r>
+            <a:endParaRPr lang="de-DE" dirty="0"/>
+          </a:p>
+        </p:txBody>
+      </p:sp>
+      <p:sp>
+        <p:nvSpPr>
+          <p:cNvPr id="6" name="Date Placeholder 5"/>
+          <p:cNvSpPr>
+            <a:spLocks noGrp="1"/>
+          </p:cNvSpPr>
+          <p:nvPr>
+            <p:ph type="dt" sz="half" idx="15"/>
+          </p:nvPr>
+        </p:nvSpPr>
+        <p:spPr/>
+        <p:txBody>
+          <a:bodyPr/>
+          <a:lstStyle/>
+          <a:p>
+            <a:r>
+              <a:rPr lang="de-DE" smtClean="0"/>
+              <a:t>2020-05-14             </a:t>
+            </a:r>
+            <a:r>
+              <a:rPr lang="de-DE" b="1" smtClean="0"/>
+              <a:t>restricted</a:t>
+            </a:r>
+            <a:endParaRPr lang="de-DE" b="1" dirty="0"/>
+          </a:p>
+        </p:txBody>
+      </p:sp>
+      <p:graphicFrame>
+        <p:nvGraphicFramePr>
+          <p:cNvPr id="7" name="Table 6"/>
+          <p:cNvGraphicFramePr>
+            <a:graphicFrameLocks noGrp="1"/>
+          </p:cNvGraphicFramePr>
+          <p:nvPr>
+            <p:extLst>
+              <p:ext uri="{D42A27DB-BD31-4B8C-83A1-F6EECF244321}">
+                <p14:modId xmlns:p14="http://schemas.microsoft.com/office/powerpoint/2010/main" val="2260692950"/>
+              </p:ext>
+            </p:extLst>
+          </p:nvPr>
+        </p:nvGraphicFramePr>
+        <p:xfrm>
+          <a:off x="1524000" y="1397000"/>
+          <a:ext cx="6096000" cy="741680"/>
+        </p:xfrm>
+        <a:graphic>
+          <a:graphicData uri="http://schemas.openxmlformats.org/drawingml/2006/table">
+            <a:tbl>
+              <a:tblPr firstRow="1" bandRow="1">
+                <a:tableStyleId>{5C22544A-7EE6-4342-B048-85BDC9FD1C3A}</a:tableStyleId>
+              </a:tblPr>
+              <a:tblGrid>
+                <a:gridCol w="2032000">
+                  <a:extLst>
+                    <a:ext uri="{9D8B030D-6E8A-4147-A177-3AD203B41FA5}">
+                      <a16:colId xmlns:a16="http://schemas.microsoft.com/office/drawing/2014/main" val="3730919925"/>
+                    </a:ext>
+                  </a:extLst>
+                </a:gridCol>
+                <a:gridCol w="2032000">
+                  <a:extLst>
+                    <a:ext uri="{9D8B030D-6E8A-4147-A177-3AD203B41FA5}">
+                      <a16:colId xmlns:a16="http://schemas.microsoft.com/office/drawing/2014/main" val="1304653223"/>
+                    </a:ext>
+                  </a:extLst>
+                </a:gridCol>
+                <a:gridCol w="2032000">
+                  <a:extLst>
+                    <a:ext uri="{9D8B030D-6E8A-4147-A177-3AD203B41FA5}">
+                      <a16:colId xmlns:a16="http://schemas.microsoft.com/office/drawing/2014/main" val="581916988"/>
+                    </a:ext>
+                  </a:extLst>
+                </a:gridCol>
+              </a:tblGrid>
+              <a:tr h="370840">
+                <a:tc>
+                  <a:txBody>
+                    <a:bodyPr/>
+                    <a:lstStyle/>
+                    <a:p>
+                      <a:r>
+                        <a:rPr lang="de-DE" dirty="0" smtClean="0"/>
+                        <a:t>UInt8</a:t>
+                      </a:r>
+                      <a:endParaRPr lang="de-DE" dirty="0"/>
+                    </a:p>
+                  </a:txBody>
+                  <a:tcPr/>
+                </a:tc>
+                <a:tc>
+                  <a:txBody>
+                    <a:bodyPr/>
+                    <a:lstStyle/>
+                    <a:p>
+                      <a:r>
+                        <a:rPr lang="de-DE" dirty="0" smtClean="0"/>
+                        <a:t>Reference</a:t>
+                      </a:r>
+                      <a:endParaRPr lang="de-DE" dirty="0"/>
+                    </a:p>
+                  </a:txBody>
+                  <a:tcPr/>
+                </a:tc>
+                <a:tc>
+                  <a:txBody>
+                    <a:bodyPr/>
+                    <a:lstStyle/>
+                    <a:p>
+                      <a:r>
+                        <a:rPr lang="de-DE" dirty="0" smtClean="0"/>
+                        <a:t>Port. Optimized</a:t>
+                      </a:r>
+                      <a:endParaRPr lang="de-DE" dirty="0"/>
+                    </a:p>
+                  </a:txBody>
+                  <a:tcPr/>
+                </a:tc>
+                <a:extLst>
+                  <a:ext uri="{0D108BD9-81ED-4DB2-BD59-A6C34878D82A}">
+                    <a16:rowId xmlns:a16="http://schemas.microsoft.com/office/drawing/2014/main" val="2447228543"/>
+                  </a:ext>
+                </a:extLst>
+              </a:tr>
+              <a:tr h="370840">
+                <a:tc>
+                  <a:txBody>
+                    <a:bodyPr/>
+                    <a:lstStyle/>
+                    <a:p>
+                      <a:r>
+                        <a:rPr lang="de-DE" dirty="0" smtClean="0"/>
+                        <a:t>Avg Time</a:t>
+                      </a:r>
+                      <a:endParaRPr lang="de-DE" dirty="0"/>
+                    </a:p>
+                  </a:txBody>
+                  <a:tcPr/>
+                </a:tc>
+                <a:tc>
+                  <a:txBody>
+                    <a:bodyPr/>
+                    <a:lstStyle/>
+                    <a:p>
+                      <a:r>
+                        <a:rPr lang="de-DE" dirty="0" smtClean="0"/>
+                        <a:t>7360</a:t>
+                      </a:r>
+                      <a:endParaRPr lang="de-DE" dirty="0"/>
+                    </a:p>
+                  </a:txBody>
+                  <a:tcPr/>
+                </a:tc>
+                <a:tc>
+                  <a:txBody>
+                    <a:bodyPr/>
+                    <a:lstStyle/>
+                    <a:p>
+                      <a:r>
+                        <a:rPr lang="de-DE" dirty="0" smtClean="0"/>
+                        <a:t>1187</a:t>
+                      </a:r>
+                      <a:endParaRPr lang="de-DE" dirty="0"/>
+                    </a:p>
+                  </a:txBody>
+                  <a:tcPr/>
+                </a:tc>
+                <a:extLst>
+                  <a:ext uri="{0D108BD9-81ED-4DB2-BD59-A6C34878D82A}">
+                    <a16:rowId xmlns:a16="http://schemas.microsoft.com/office/drawing/2014/main" val="1962285556"/>
+                  </a:ext>
+                </a:extLst>
+              </a:tr>
+            </a:tbl>
+          </a:graphicData>
+        </a:graphic>
+      </p:graphicFrame>
+      <p:graphicFrame>
+        <p:nvGraphicFramePr>
+          <p:cNvPr id="9" name="Table 8"/>
+          <p:cNvGraphicFramePr>
+            <a:graphicFrameLocks noGrp="1"/>
+          </p:cNvGraphicFramePr>
+          <p:nvPr>
+            <p:extLst>
+              <p:ext uri="{D42A27DB-BD31-4B8C-83A1-F6EECF244321}">
+                <p14:modId xmlns:p14="http://schemas.microsoft.com/office/powerpoint/2010/main" val="532712159"/>
+              </p:ext>
+            </p:extLst>
+          </p:nvPr>
+        </p:nvGraphicFramePr>
+        <p:xfrm>
+          <a:off x="1524000" y="2745140"/>
+          <a:ext cx="6096000" cy="741680"/>
+        </p:xfrm>
+        <a:graphic>
+          <a:graphicData uri="http://schemas.openxmlformats.org/drawingml/2006/table">
+            <a:tbl>
+              <a:tblPr firstRow="1" bandRow="1">
+                <a:tableStyleId>{5C22544A-7EE6-4342-B048-85BDC9FD1C3A}</a:tableStyleId>
+              </a:tblPr>
+              <a:tblGrid>
+                <a:gridCol w="2032000">
+                  <a:extLst>
+                    <a:ext uri="{9D8B030D-6E8A-4147-A177-3AD203B41FA5}">
+                      <a16:colId xmlns:a16="http://schemas.microsoft.com/office/drawing/2014/main" val="3730919925"/>
+                    </a:ext>
+                  </a:extLst>
+                </a:gridCol>
+                <a:gridCol w="2032000">
+                  <a:extLst>
+                    <a:ext uri="{9D8B030D-6E8A-4147-A177-3AD203B41FA5}">
+                      <a16:colId xmlns:a16="http://schemas.microsoft.com/office/drawing/2014/main" val="1304653223"/>
+                    </a:ext>
+                  </a:extLst>
+                </a:gridCol>
+                <a:gridCol w="2032000">
+                  <a:extLst>
+                    <a:ext uri="{9D8B030D-6E8A-4147-A177-3AD203B41FA5}">
+                      <a16:colId xmlns:a16="http://schemas.microsoft.com/office/drawing/2014/main" val="581916988"/>
+                    </a:ext>
+                  </a:extLst>
+                </a:gridCol>
+              </a:tblGrid>
+              <a:tr h="370840">
+                <a:tc>
+                  <a:txBody>
+                    <a:bodyPr/>
+                    <a:lstStyle/>
+                    <a:p>
+                      <a:r>
+                        <a:rPr lang="de-DE" dirty="0" smtClean="0"/>
+                        <a:t>Int8</a:t>
+                      </a:r>
+                      <a:endParaRPr lang="de-DE" dirty="0"/>
+                    </a:p>
+                  </a:txBody>
+                  <a:tcPr/>
+                </a:tc>
+                <a:tc>
+                  <a:txBody>
+                    <a:bodyPr/>
+                    <a:lstStyle/>
+                    <a:p>
+                      <a:r>
+                        <a:rPr lang="de-DE" dirty="0" smtClean="0"/>
+                        <a:t>Reference</a:t>
+                      </a:r>
+                      <a:endParaRPr lang="de-DE" dirty="0"/>
+                    </a:p>
+                  </a:txBody>
+                  <a:tcPr/>
+                </a:tc>
+                <a:tc>
+                  <a:txBody>
+                    <a:bodyPr/>
+                    <a:lstStyle/>
+                    <a:p>
+                      <a:r>
+                        <a:rPr lang="de-DE" dirty="0" smtClean="0"/>
+                        <a:t>Port. Optimized</a:t>
+                      </a:r>
+                      <a:endParaRPr lang="de-DE" dirty="0"/>
+                    </a:p>
+                  </a:txBody>
+                  <a:tcPr/>
+                </a:tc>
+                <a:extLst>
+                  <a:ext uri="{0D108BD9-81ED-4DB2-BD59-A6C34878D82A}">
+                    <a16:rowId xmlns:a16="http://schemas.microsoft.com/office/drawing/2014/main" val="2447228543"/>
+                  </a:ext>
+                </a:extLst>
+              </a:tr>
+              <a:tr h="370840">
+                <a:tc>
+                  <a:txBody>
+                    <a:bodyPr/>
+                    <a:lstStyle/>
+                    <a:p>
+                      <a:r>
+                        <a:rPr lang="de-DE" dirty="0" smtClean="0"/>
+                        <a:t>Avg Time</a:t>
+                      </a:r>
+                      <a:endParaRPr lang="de-DE" dirty="0"/>
+                    </a:p>
+                  </a:txBody>
+                  <a:tcPr/>
+                </a:tc>
+                <a:tc>
+                  <a:txBody>
+                    <a:bodyPr/>
+                    <a:lstStyle/>
+                    <a:p>
+                      <a:r>
+                        <a:rPr lang="de-DE" dirty="0" smtClean="0"/>
+                        <a:t>7053</a:t>
+                      </a:r>
+                      <a:endParaRPr lang="de-DE" dirty="0"/>
+                    </a:p>
+                  </a:txBody>
+                  <a:tcPr/>
+                </a:tc>
+                <a:tc>
+                  <a:txBody>
+                    <a:bodyPr/>
+                    <a:lstStyle/>
+                    <a:p>
+                      <a:r>
+                        <a:rPr lang="de-DE" dirty="0" smtClean="0"/>
+                        <a:t>1306</a:t>
+                      </a:r>
+                      <a:endParaRPr lang="de-DE" dirty="0"/>
+                    </a:p>
+                  </a:txBody>
+                  <a:tcPr/>
+                </a:tc>
+                <a:extLst>
+                  <a:ext uri="{0D108BD9-81ED-4DB2-BD59-A6C34878D82A}">
+                    <a16:rowId xmlns:a16="http://schemas.microsoft.com/office/drawing/2014/main" val="1962285556"/>
+                  </a:ext>
+                </a:extLst>
+              </a:tr>
+            </a:tbl>
+          </a:graphicData>
+        </a:graphic>
+      </p:graphicFrame>
+    </p:spTree>
+    <p:extLst>
+      <p:ext uri="{BB962C8B-B14F-4D97-AF65-F5344CB8AC3E}">
+        <p14:creationId xmlns:p14="http://schemas.microsoft.com/office/powerpoint/2010/main" val="2544778390"/>
+      </p:ext>
+    </p:extLst>
+  </p:cSld>
+  <p:clrMapOvr>
+    <a:masterClrMapping/>
+  </p:clrMapOvr>
+</p:sld>
+</file>
+
+<file path=ppt/slides/slide13.xml><?xml version="1.0" encoding="utf-8"?>
+<p:sld xmlns:a="http://schemas.openxmlformats.org/drawingml/2006/main" xmlns:r="http://schemas.openxmlformats.org/officeDocument/2006/relationships" xmlns:p="http://schemas.openxmlformats.org/presentationml/2006/main">
+  <p:cSld>
+    <p:spTree>
+      <p:nvGrpSpPr>
+        <p:cNvPr id="1" name=""/>
+        <p:cNvGrpSpPr/>
+        <p:nvPr/>
+      </p:nvGrpSpPr>
+      <p:grpSpPr>
+        <a:xfrm>
+          <a:off x="0" y="0"/>
+          <a:ext cx="0" cy="0"/>
+          <a:chOff x="0" y="0"/>
+          <a:chExt cx="0" cy="0"/>
+        </a:xfrm>
+      </p:grpSpPr>
+      <p:sp>
+        <p:nvSpPr>
+          <p:cNvPr id="5" name="Text Placeholder 4"/>
+          <p:cNvSpPr>
+            <a:spLocks noGrp="1"/>
+          </p:cNvSpPr>
+          <p:nvPr>
+            <p:ph type="body" sz="quarter" idx="13"/>
+          </p:nvPr>
+        </p:nvSpPr>
+        <p:spPr/>
+        <p:txBody>
+          <a:bodyPr/>
+          <a:lstStyle/>
+          <a:p>
+            <a:r>
+              <a:rPr lang="de-DE" dirty="0" smtClean="0"/>
+              <a:t>Depthwise Conv Layer (WIP)</a:t>
+            </a:r>
+            <a:endParaRPr lang="de-DE" dirty="0"/>
+          </a:p>
+        </p:txBody>
+      </p:sp>
+      <p:sp>
+        <p:nvSpPr>
+          <p:cNvPr id="4" name="Date Placeholder 3"/>
+          <p:cNvSpPr>
+            <a:spLocks noGrp="1"/>
+          </p:cNvSpPr>
+          <p:nvPr>
+            <p:ph type="dt" sz="half" idx="15"/>
+          </p:nvPr>
+        </p:nvSpPr>
+        <p:spPr/>
+        <p:txBody>
+          <a:bodyPr/>
+          <a:lstStyle/>
+          <a:p>
+            <a:r>
+              <a:rPr lang="de-DE" smtClean="0"/>
+              <a:t>- restricted -</a:t>
+            </a:r>
+            <a:endParaRPr lang="de-DE"/>
+          </a:p>
+        </p:txBody>
+      </p:sp>
+    </p:spTree>
+    <p:extLst>
+      <p:ext uri="{BB962C8B-B14F-4D97-AF65-F5344CB8AC3E}">
+        <p14:creationId xmlns:p14="http://schemas.microsoft.com/office/powerpoint/2010/main" val="128789200"/>
+      </p:ext>
+    </p:extLst>
+  </p:cSld>
+  <p:clrMapOvr>
+    <a:masterClrMapping/>
+  </p:clrMapOvr>
+</p:sld>
+</file>
+
+<file path=ppt/slides/slide14.xml><?xml version="1.0" encoding="utf-8"?>
 <p:sld xmlns:a="http://schemas.openxmlformats.org/drawingml/2006/main" xmlns:r="http://schemas.openxmlformats.org/officeDocument/2006/relationships" xmlns:p="http://schemas.openxmlformats.org/presentationml/2006/main">
   <p:cSld>
     <p:spTree>
@@ -11161,6 +12472,82 @@
       </p:grpSpPr>
       <p:sp>
         <p:nvSpPr>
+          <p:cNvPr id="5" name="Text Placeholder 4"/>
+          <p:cNvSpPr>
+            <a:spLocks noGrp="1"/>
+          </p:cNvSpPr>
+          <p:nvPr>
+            <p:ph type="body" sz="quarter" idx="13"/>
+          </p:nvPr>
+        </p:nvSpPr>
+        <p:spPr/>
+        <p:txBody>
+          <a:bodyPr/>
+          <a:lstStyle/>
+          <a:p>
+            <a:r>
+              <a:rPr lang="de-DE" dirty="0" smtClean="0"/>
+              <a:t>Conv Layer</a:t>
+            </a:r>
+            <a:endParaRPr lang="de-DE" dirty="0"/>
+          </a:p>
+        </p:txBody>
+      </p:sp>
+      <p:sp>
+        <p:nvSpPr>
+          <p:cNvPr id="4" name="Date Placeholder 3"/>
+          <p:cNvSpPr>
+            <a:spLocks noGrp="1"/>
+          </p:cNvSpPr>
+          <p:nvPr>
+            <p:ph type="dt" sz="half" idx="15"/>
+          </p:nvPr>
+        </p:nvSpPr>
+        <p:spPr/>
+        <p:txBody>
+          <a:bodyPr/>
+          <a:lstStyle/>
+          <a:p>
+            <a:r>
+              <a:rPr lang="de-DE" smtClean="0"/>
+              <a:t>- restricted -</a:t>
+            </a:r>
+            <a:endParaRPr lang="de-DE"/>
+          </a:p>
+        </p:txBody>
+      </p:sp>
+    </p:spTree>
+    <p:extLst>
+      <p:ext uri="{BB962C8B-B14F-4D97-AF65-F5344CB8AC3E}">
+        <p14:creationId xmlns:p14="http://schemas.microsoft.com/office/powerpoint/2010/main" val="1427259565"/>
+      </p:ext>
+    </p:extLst>
+  </p:cSld>
+  <p:clrMapOvr>
+    <a:masterClrMapping/>
+  </p:clrMapOvr>
+</p:sld>
+</file>
+
+<file path=ppt/slides/slide3.xml><?xml version="1.0" encoding="utf-8"?>
+<p:sld xmlns:a="http://schemas.openxmlformats.org/drawingml/2006/main" xmlns:r="http://schemas.openxmlformats.org/officeDocument/2006/relationships" xmlns:p="http://schemas.openxmlformats.org/presentationml/2006/main">
+  <p:cSld>
+    <p:spTree>
+      <p:nvGrpSpPr>
+        <p:cNvPr id="1" name=""/>
+        <p:cNvGrpSpPr/>
+        <p:nvPr/>
+      </p:nvGrpSpPr>
+      <p:grpSpPr>
+        <a:xfrm>
+          <a:off x="0" y="0"/>
+          <a:ext cx="0" cy="0"/>
+          <a:chOff x="0" y="0"/>
+          <a:chExt cx="0" cy="0"/>
+        </a:xfrm>
+      </p:grpSpPr>
+      <p:sp>
+        <p:nvSpPr>
           <p:cNvPr id="2" name="Footer Placeholder 1"/>
           <p:cNvSpPr>
             <a:spLocks noGrp="1"/>
@@ -11200,7 +12587,7 @@
             <a:fld id="{97555E91-926B-4C96-90B6-D75C3A27DF23}" type="slidenum">
               <a:rPr lang="de-DE" smtClean="0"/>
               <a:pPr/>
-              <a:t>2</a:t>
+              <a:t>3</a:t>
             </a:fld>
             <a:endParaRPr lang="de-DE" dirty="0"/>
           </a:p>
@@ -11363,11 +12750,6 @@
               </a:rPr>
               <a:t>using dot product</a:t>
             </a:r>
-            <a:endParaRPr lang="de-DE" sz="1400" kern="0" dirty="0" smtClean="0">
-              <a:latin typeface="Arial" panose="020B0604020202020204" pitchFamily="34" charset="0"/>
-              <a:ea typeface="Verdana" pitchFamily="34" charset="0"/>
-              <a:cs typeface="Arial" panose="020B0604020202020204" pitchFamily="34" charset="0"/>
-            </a:endParaRPr>
           </a:p>
         </p:txBody>
       </p:sp>
@@ -11424,14 +12806,6 @@
               </a:rPr>
               <a:t>Input_x</a:t>
             </a:r>
-            <a:endParaRPr lang="de-DE" sz="1400" kern="0" dirty="0" smtClean="0">
-              <a:solidFill>
-                <a:srgbClr val="FF0000"/>
-              </a:solidFill>
-              <a:latin typeface="Arial" panose="020B0604020202020204" pitchFamily="34" charset="0"/>
-              <a:ea typeface="Verdana" pitchFamily="34" charset="0"/>
-              <a:cs typeface="Arial" panose="020B0604020202020204" pitchFamily="34" charset="0"/>
-            </a:endParaRPr>
           </a:p>
         </p:txBody>
       </p:sp>
@@ -11488,14 +12862,6 @@
               </a:rPr>
               <a:t>Input_y</a:t>
             </a:r>
-            <a:endParaRPr lang="de-DE" sz="1400" kern="0" dirty="0" smtClean="0">
-              <a:solidFill>
-                <a:srgbClr val="FF0000"/>
-              </a:solidFill>
-              <a:latin typeface="Arial" panose="020B0604020202020204" pitchFamily="34" charset="0"/>
-              <a:ea typeface="Verdana" pitchFamily="34" charset="0"/>
-              <a:cs typeface="Arial" panose="020B0604020202020204" pitchFamily="34" charset="0"/>
-            </a:endParaRPr>
           </a:p>
         </p:txBody>
       </p:sp>
@@ -11552,14 +12918,6 @@
               </a:rPr>
               <a:t>Input_c</a:t>
             </a:r>
-            <a:endParaRPr lang="de-DE" sz="1400" kern="0" dirty="0" smtClean="0">
-              <a:solidFill>
-                <a:srgbClr val="FF0000"/>
-              </a:solidFill>
-              <a:latin typeface="Arial" panose="020B0604020202020204" pitchFamily="34" charset="0"/>
-              <a:ea typeface="Verdana" pitchFamily="34" charset="0"/>
-              <a:cs typeface="Arial" panose="020B0604020202020204" pitchFamily="34" charset="0"/>
-            </a:endParaRPr>
           </a:p>
         </p:txBody>
       </p:sp>
@@ -11614,27 +12972,8 @@
                 <a:ea typeface="Verdana" pitchFamily="34" charset="0"/>
                 <a:cs typeface="Arial" panose="020B0604020202020204" pitchFamily="34" charset="0"/>
               </a:rPr>
-              <a:t>filter</a:t>
-            </a:r>
-            <a:r>
-              <a:rPr lang="de-DE" sz="1400" kern="0" dirty="0" smtClean="0">
-                <a:solidFill>
-                  <a:srgbClr val="FF0000"/>
-                </a:solidFill>
-                <a:latin typeface="Arial" panose="020B0604020202020204" pitchFamily="34" charset="0"/>
-                <a:ea typeface="Verdana" pitchFamily="34" charset="0"/>
-                <a:cs typeface="Arial" panose="020B0604020202020204" pitchFamily="34" charset="0"/>
-              </a:rPr>
-              <a:t>_x</a:t>
-            </a:r>
-            <a:endParaRPr lang="de-DE" sz="1400" kern="0" dirty="0" smtClean="0">
-              <a:solidFill>
-                <a:srgbClr val="FF0000"/>
-              </a:solidFill>
-              <a:latin typeface="Arial" panose="020B0604020202020204" pitchFamily="34" charset="0"/>
-              <a:ea typeface="Verdana" pitchFamily="34" charset="0"/>
-              <a:cs typeface="Arial" panose="020B0604020202020204" pitchFamily="34" charset="0"/>
-            </a:endParaRPr>
+              <a:t>filter_x</a:t>
+            </a:r>
           </a:p>
         </p:txBody>
       </p:sp>
@@ -11691,14 +13030,6 @@
               </a:rPr>
               <a:t>filter_y</a:t>
             </a:r>
-            <a:endParaRPr lang="de-DE" sz="1400" kern="0" dirty="0" smtClean="0">
-              <a:solidFill>
-                <a:srgbClr val="FF0000"/>
-              </a:solidFill>
-              <a:latin typeface="Arial" panose="020B0604020202020204" pitchFamily="34" charset="0"/>
-              <a:ea typeface="Verdana" pitchFamily="34" charset="0"/>
-              <a:cs typeface="Arial" panose="020B0604020202020204" pitchFamily="34" charset="0"/>
-            </a:endParaRPr>
           </a:p>
         </p:txBody>
       </p:sp>
@@ -11755,14 +13086,6 @@
               </a:rPr>
               <a:t>Input_c</a:t>
             </a:r>
-            <a:endParaRPr lang="de-DE" sz="1400" kern="0" dirty="0" smtClean="0">
-              <a:solidFill>
-                <a:srgbClr val="FF0000"/>
-              </a:solidFill>
-              <a:latin typeface="Arial" panose="020B0604020202020204" pitchFamily="34" charset="0"/>
-              <a:ea typeface="Verdana" pitchFamily="34" charset="0"/>
-              <a:cs typeface="Arial" panose="020B0604020202020204" pitchFamily="34" charset="0"/>
-            </a:endParaRPr>
           </a:p>
         </p:txBody>
       </p:sp>
@@ -11851,11 +13174,6 @@
               </a:rPr>
               <a:t>equal</a:t>
             </a:r>
-            <a:endParaRPr lang="de-DE" sz="1400" kern="0" dirty="0" smtClean="0">
-              <a:latin typeface="Arial" panose="020B0604020202020204" pitchFamily="34" charset="0"/>
-              <a:ea typeface="Verdana" pitchFamily="34" charset="0"/>
-              <a:cs typeface="Arial" panose="020B0604020202020204" pitchFamily="34" charset="0"/>
-            </a:endParaRPr>
           </a:p>
         </p:txBody>
       </p:sp>
@@ -11907,21 +13225,8 @@
                 <a:ea typeface="Verdana" pitchFamily="34" charset="0"/>
                 <a:cs typeface="Arial" panose="020B0604020202020204" pitchFamily="34" charset="0"/>
               </a:rPr>
-              <a:t>O</a:t>
-            </a:r>
-            <a:r>
-              <a:rPr lang="de-DE" sz="1400" kern="0" dirty="0" smtClean="0">
-                <a:latin typeface="Arial" panose="020B0604020202020204" pitchFamily="34" charset="0"/>
-                <a:ea typeface="Verdana" pitchFamily="34" charset="0"/>
-                <a:cs typeface="Arial" panose="020B0604020202020204" pitchFamily="34" charset="0"/>
-              </a:rPr>
-              <a:t>ne output neuron</a:t>
-            </a:r>
-            <a:endParaRPr lang="de-DE" sz="1400" kern="0" dirty="0" smtClean="0">
-              <a:latin typeface="Arial" panose="020B0604020202020204" pitchFamily="34" charset="0"/>
-              <a:ea typeface="Verdana" pitchFamily="34" charset="0"/>
-              <a:cs typeface="Arial" panose="020B0604020202020204" pitchFamily="34" charset="0"/>
-            </a:endParaRPr>
+              <a:t>One output neuron</a:t>
+            </a:r>
           </a:p>
         </p:txBody>
       </p:sp>
@@ -11929,529 +13234,6 @@
     <p:extLst>
       <p:ext uri="{BB962C8B-B14F-4D97-AF65-F5344CB8AC3E}">
         <p14:creationId xmlns:p14="http://schemas.microsoft.com/office/powerpoint/2010/main" val="1342000372"/>
-      </p:ext>
-    </p:extLst>
-  </p:cSld>
-  <p:clrMapOvr>
-    <a:masterClrMapping/>
-  </p:clrMapOvr>
-  <p:timing>
-    <p:tnLst>
-      <p:par>
-        <p:cTn id="1" dur="indefinite" restart="never" nodeType="tmRoot"/>
-      </p:par>
-    </p:tnLst>
-  </p:timing>
-</p:sld>
-</file>
-
-<file path=ppt/slides/slide3.xml><?xml version="1.0" encoding="utf-8"?>
-<p:sld xmlns:a="http://schemas.openxmlformats.org/drawingml/2006/main" xmlns:r="http://schemas.openxmlformats.org/officeDocument/2006/relationships" xmlns:p="http://schemas.openxmlformats.org/presentationml/2006/main">
-  <p:cSld>
-    <p:spTree>
-      <p:nvGrpSpPr>
-        <p:cNvPr id="1" name=""/>
-        <p:cNvGrpSpPr/>
-        <p:nvPr/>
-      </p:nvGrpSpPr>
-      <p:grpSpPr>
-        <a:xfrm>
-          <a:off x="0" y="0"/>
-          <a:ext cx="0" cy="0"/>
-          <a:chOff x="0" y="0"/>
-          <a:chExt cx="0" cy="0"/>
-        </a:xfrm>
-      </p:grpSpPr>
-      <p:sp>
-        <p:nvSpPr>
-          <p:cNvPr id="2" name="Footer Placeholder 1"/>
-          <p:cNvSpPr>
-            <a:spLocks noGrp="1"/>
-          </p:cNvSpPr>
-          <p:nvPr>
-            <p:ph type="ftr" sz="quarter" idx="16"/>
-          </p:nvPr>
-        </p:nvSpPr>
-        <p:spPr/>
-        <p:txBody>
-          <a:bodyPr/>
-          <a:lstStyle/>
-          <a:p>
-            <a:r>
-              <a:rPr lang="en-US" smtClean="0"/>
-              <a:t>Copyright © Infineon Technologies AG 2020. All rights reserved.</a:t>
-            </a:r>
-            <a:endParaRPr lang="de-DE" dirty="0"/>
-          </a:p>
-        </p:txBody>
-      </p:sp>
-      <p:sp>
-        <p:nvSpPr>
-          <p:cNvPr id="3" name="Slide Number Placeholder 2"/>
-          <p:cNvSpPr>
-            <a:spLocks noGrp="1"/>
-          </p:cNvSpPr>
-          <p:nvPr>
-            <p:ph type="sldNum" sz="quarter" idx="14"/>
-          </p:nvPr>
-        </p:nvSpPr>
-        <p:spPr/>
-        <p:txBody>
-          <a:bodyPr/>
-          <a:lstStyle/>
-          <a:p>
-            <a:fld id="{97555E91-926B-4C96-90B6-D75C3A27DF23}" type="slidenum">
-              <a:rPr lang="de-DE" smtClean="0"/>
-              <a:pPr/>
-              <a:t>3</a:t>
-            </a:fld>
-            <a:endParaRPr lang="de-DE" dirty="0"/>
-          </a:p>
-        </p:txBody>
-      </p:sp>
-      <p:sp>
-        <p:nvSpPr>
-          <p:cNvPr id="4" name="Title 3"/>
-          <p:cNvSpPr>
-            <a:spLocks noGrp="1"/>
-          </p:cNvSpPr>
-          <p:nvPr>
-            <p:ph type="title"/>
-          </p:nvPr>
-        </p:nvSpPr>
-        <p:spPr/>
-        <p:txBody>
-          <a:bodyPr/>
-          <a:lstStyle/>
-          <a:p>
-            <a:r>
-              <a:rPr lang="de-DE" dirty="0" smtClean="0"/>
-              <a:t>Convolutional layers</a:t>
-            </a:r>
-            <a:endParaRPr lang="de-DE" dirty="0"/>
-          </a:p>
-        </p:txBody>
-      </p:sp>
-      <p:sp>
-        <p:nvSpPr>
-          <p:cNvPr id="6" name="Date Placeholder 5"/>
-          <p:cNvSpPr>
-            <a:spLocks noGrp="1"/>
-          </p:cNvSpPr>
-          <p:nvPr>
-            <p:ph type="dt" sz="half" idx="15"/>
-          </p:nvPr>
-        </p:nvSpPr>
-        <p:spPr/>
-        <p:txBody>
-          <a:bodyPr/>
-          <a:lstStyle/>
-          <a:p>
-            <a:r>
-              <a:rPr lang="de-DE" smtClean="0"/>
-              <a:t>2020-05-14             </a:t>
-            </a:r>
-            <a:r>
-              <a:rPr lang="de-DE" b="1" smtClean="0"/>
-              <a:t>restricted</a:t>
-            </a:r>
-            <a:endParaRPr lang="de-DE" b="1" dirty="0"/>
-          </a:p>
-        </p:txBody>
-      </p:sp>
-      <p:pic>
-        <p:nvPicPr>
-          <p:cNvPr id="2050" name="Picture 2" descr="https://tum-ai.com/assets/img/Untitled%20Diagram(1).png"/>
-          <p:cNvPicPr>
-            <a:picLocks noChangeAspect="1" noChangeArrowheads="1"/>
-          </p:cNvPicPr>
-          <p:nvPr/>
-        </p:nvPicPr>
-        <p:blipFill>
-          <a:blip r:embed="rId2">
-            <a:extLst>
-              <a:ext uri="{28A0092B-C50C-407E-A947-70E740481C1C}">
-                <a14:useLocalDpi xmlns:a14="http://schemas.microsoft.com/office/drawing/2010/main" val="0"/>
-              </a:ext>
-            </a:extLst>
-          </a:blip>
-          <a:srcRect/>
-          <a:stretch>
-            <a:fillRect/>
-          </a:stretch>
-        </p:blipFill>
-        <p:spPr bwMode="auto">
-          <a:xfrm>
-            <a:off x="1228725" y="1196752"/>
-            <a:ext cx="6686550" cy="3629025"/>
-          </a:xfrm>
-          <a:prstGeom prst="rect">
-            <a:avLst/>
-          </a:prstGeom>
-          <a:noFill/>
-          <a:extLst>
-            <a:ext uri="{909E8E84-426E-40DD-AFC4-6F175D3DCCD1}">
-              <a14:hiddenFill xmlns:a14="http://schemas.microsoft.com/office/drawing/2010/main">
-                <a:solidFill>
-                  <a:srgbClr val="FFFFFF"/>
-                </a:solidFill>
-              </a14:hiddenFill>
-            </a:ext>
-          </a:extLst>
-        </p:spPr>
-      </p:pic>
-      <p:sp>
-        <p:nvSpPr>
-          <p:cNvPr id="7" name="TextBox 6"/>
-          <p:cNvSpPr txBox="1"/>
-          <p:nvPr/>
-        </p:nvSpPr>
-        <p:spPr bwMode="auto">
-          <a:xfrm>
-            <a:off x="571359" y="2132856"/>
-            <a:ext cx="397545" cy="215444"/>
-          </a:xfrm>
-          <a:prstGeom prst="rect">
-            <a:avLst/>
-          </a:prstGeom>
-          <a:noFill/>
-          <a:ln w="9525">
-            <a:noFill/>
-            <a:miter lim="800000"/>
-            <a:headEnd/>
-            <a:tailEnd/>
-          </a:ln>
-          <a:effectLst/>
-        </p:spPr>
-        <p:txBody>
-          <a:bodyPr wrap="none" lIns="0" tIns="0" rIns="0" bIns="0" rtlCol="0" anchor="ctr" anchorCtr="0">
-            <a:spAutoFit/>
-          </a:bodyPr>
-          <a:lstStyle/>
-          <a:p>
-            <a:pPr marR="0" defTabSz="914400" eaLnBrk="0" fontAlgn="auto" latinLnBrk="0" hangingPunct="0">
-              <a:spcBef>
-                <a:spcPts val="0"/>
-              </a:spcBef>
-              <a:spcAft>
-                <a:spcPts val="300"/>
-              </a:spcAft>
-              <a:buClr>
-                <a:schemeClr val="accent1"/>
-              </a:buClr>
-              <a:buSzTx/>
-              <a:tabLst/>
-            </a:pPr>
-            <a:r>
-              <a:rPr lang="de-DE" sz="1400" kern="0" dirty="0" smtClean="0">
-                <a:latin typeface="Arial" panose="020B0604020202020204" pitchFamily="34" charset="0"/>
-                <a:ea typeface="Verdana" pitchFamily="34" charset="0"/>
-                <a:cs typeface="Arial" panose="020B0604020202020204" pitchFamily="34" charset="0"/>
-              </a:rPr>
-              <a:t>Input</a:t>
-            </a:r>
-          </a:p>
-        </p:txBody>
-      </p:sp>
-      <p:sp>
-        <p:nvSpPr>
-          <p:cNvPr id="16" name="TextBox 15"/>
-          <p:cNvSpPr txBox="1"/>
-          <p:nvPr/>
-        </p:nvSpPr>
-        <p:spPr bwMode="auto">
-          <a:xfrm>
-            <a:off x="3059832" y="4005064"/>
-            <a:ext cx="537006" cy="215444"/>
-          </a:xfrm>
-          <a:prstGeom prst="rect">
-            <a:avLst/>
-          </a:prstGeom>
-          <a:noFill/>
-          <a:ln w="9525">
-            <a:noFill/>
-            <a:miter lim="800000"/>
-            <a:headEnd/>
-            <a:tailEnd/>
-          </a:ln>
-          <a:effectLst/>
-        </p:spPr>
-        <p:txBody>
-          <a:bodyPr wrap="none" lIns="0" tIns="0" rIns="0" bIns="0" rtlCol="0" anchor="ctr" anchorCtr="0">
-            <a:spAutoFit/>
-          </a:bodyPr>
-          <a:lstStyle/>
-          <a:p>
-            <a:pPr marR="0" defTabSz="914400" eaLnBrk="0" fontAlgn="auto" latinLnBrk="0" hangingPunct="0">
-              <a:spcBef>
-                <a:spcPts val="0"/>
-              </a:spcBef>
-              <a:spcAft>
-                <a:spcPts val="300"/>
-              </a:spcAft>
-              <a:buClr>
-                <a:schemeClr val="accent1"/>
-              </a:buClr>
-              <a:buSzTx/>
-              <a:tabLst/>
-            </a:pPr>
-            <a:r>
-              <a:rPr lang="de-DE" sz="1400" kern="0" dirty="0" smtClean="0">
-                <a:latin typeface="Arial" panose="020B0604020202020204" pitchFamily="34" charset="0"/>
-                <a:ea typeface="Verdana" pitchFamily="34" charset="0"/>
-                <a:cs typeface="Arial" panose="020B0604020202020204" pitchFamily="34" charset="0"/>
-              </a:rPr>
-              <a:t>Output</a:t>
-            </a:r>
-            <a:endParaRPr lang="de-DE" sz="1400" kern="0" dirty="0" smtClean="0">
-              <a:latin typeface="Arial" panose="020B0604020202020204" pitchFamily="34" charset="0"/>
-              <a:ea typeface="Verdana" pitchFamily="34" charset="0"/>
-              <a:cs typeface="Arial" panose="020B0604020202020204" pitchFamily="34" charset="0"/>
-            </a:endParaRPr>
-          </a:p>
-        </p:txBody>
-      </p:sp>
-      <p:sp>
-        <p:nvSpPr>
-          <p:cNvPr id="17" name="TextBox 16"/>
-          <p:cNvSpPr txBox="1"/>
-          <p:nvPr/>
-        </p:nvSpPr>
-        <p:spPr bwMode="auto">
-          <a:xfrm>
-            <a:off x="251520" y="3212976"/>
-            <a:ext cx="2232248" cy="169277"/>
-          </a:xfrm>
-          <a:prstGeom prst="rect">
-            <a:avLst/>
-          </a:prstGeom>
-          <a:noFill/>
-          <a:ln w="9525">
-            <a:noFill/>
-            <a:miter lim="800000"/>
-            <a:headEnd/>
-            <a:tailEnd/>
-          </a:ln>
-          <a:effectLst/>
-        </p:spPr>
-        <p:txBody>
-          <a:bodyPr wrap="square" lIns="0" tIns="0" rIns="0" bIns="0" rtlCol="0" anchor="ctr" anchorCtr="0">
-            <a:spAutoFit/>
-          </a:bodyPr>
-          <a:lstStyle/>
-          <a:p>
-            <a:pPr marR="0" defTabSz="914400" eaLnBrk="0" fontAlgn="auto" latinLnBrk="0" hangingPunct="0">
-              <a:spcBef>
-                <a:spcPts val="0"/>
-              </a:spcBef>
-              <a:spcAft>
-                <a:spcPts val="300"/>
-              </a:spcAft>
-              <a:buClr>
-                <a:schemeClr val="accent1"/>
-              </a:buClr>
-              <a:buSzTx/>
-              <a:tabLst/>
-            </a:pPr>
-            <a:r>
-              <a:rPr lang="de-DE" sz="1100" kern="0" dirty="0" smtClean="0">
-                <a:latin typeface="Arial" panose="020B0604020202020204" pitchFamily="34" charset="0"/>
-                <a:ea typeface="Verdana" pitchFamily="34" charset="0"/>
-                <a:cs typeface="Arial" panose="020B0604020202020204" pitchFamily="34" charset="0"/>
-              </a:rPr>
-              <a:t>Input_x * Input_y * Input_c</a:t>
-            </a:r>
-          </a:p>
-        </p:txBody>
-      </p:sp>
-      <p:sp>
-        <p:nvSpPr>
-          <p:cNvPr id="18" name="TextBox 17"/>
-          <p:cNvSpPr txBox="1"/>
-          <p:nvPr/>
-        </p:nvSpPr>
-        <p:spPr bwMode="auto">
-          <a:xfrm>
-            <a:off x="4860036" y="4741138"/>
-            <a:ext cx="2232248" cy="169277"/>
-          </a:xfrm>
-          <a:prstGeom prst="rect">
-            <a:avLst/>
-          </a:prstGeom>
-          <a:noFill/>
-          <a:ln w="9525">
-            <a:noFill/>
-            <a:miter lim="800000"/>
-            <a:headEnd/>
-            <a:tailEnd/>
-          </a:ln>
-          <a:effectLst/>
-        </p:spPr>
-        <p:txBody>
-          <a:bodyPr wrap="square" lIns="0" tIns="0" rIns="0" bIns="0" rtlCol="0" anchor="ctr" anchorCtr="0">
-            <a:spAutoFit/>
-          </a:bodyPr>
-          <a:lstStyle/>
-          <a:p>
-            <a:pPr marR="0" defTabSz="914400" eaLnBrk="0" fontAlgn="auto" latinLnBrk="0" hangingPunct="0">
-              <a:spcBef>
-                <a:spcPts val="0"/>
-              </a:spcBef>
-              <a:spcAft>
-                <a:spcPts val="300"/>
-              </a:spcAft>
-              <a:buClr>
-                <a:schemeClr val="accent1"/>
-              </a:buClr>
-              <a:buSzTx/>
-              <a:tabLst/>
-            </a:pPr>
-            <a:r>
-              <a:rPr lang="de-DE" sz="1100" kern="0" dirty="0" smtClean="0">
-                <a:latin typeface="Arial" panose="020B0604020202020204" pitchFamily="34" charset="0"/>
-                <a:ea typeface="Verdana" pitchFamily="34" charset="0"/>
-                <a:cs typeface="Arial" panose="020B0604020202020204" pitchFamily="34" charset="0"/>
-              </a:rPr>
-              <a:t>Out_x * Out_y * 1</a:t>
-            </a:r>
-          </a:p>
-        </p:txBody>
-      </p:sp>
-      <p:sp>
-        <p:nvSpPr>
-          <p:cNvPr id="12" name="TextBox 11"/>
-          <p:cNvSpPr txBox="1"/>
-          <p:nvPr/>
-        </p:nvSpPr>
-        <p:spPr bwMode="auto">
-          <a:xfrm>
-            <a:off x="1564141" y="5449791"/>
-            <a:ext cx="3528388" cy="469359"/>
-          </a:xfrm>
-          <a:prstGeom prst="rect">
-            <a:avLst/>
-          </a:prstGeom>
-          <a:noFill/>
-          <a:ln w="9525">
-            <a:noFill/>
-            <a:miter lim="800000"/>
-            <a:headEnd/>
-            <a:tailEnd/>
-          </a:ln>
-          <a:effectLst/>
-        </p:spPr>
-        <p:txBody>
-          <a:bodyPr wrap="square" lIns="0" tIns="0" rIns="0" bIns="0" rtlCol="0" anchor="ctr" anchorCtr="0">
-            <a:spAutoFit/>
-          </a:bodyPr>
-          <a:lstStyle/>
-          <a:p>
-            <a:pPr marL="285750" marR="0" indent="-285750" defTabSz="914400" eaLnBrk="0" fontAlgn="auto" latinLnBrk="0" hangingPunct="0">
-              <a:spcBef>
-                <a:spcPts val="0"/>
-              </a:spcBef>
-              <a:spcAft>
-                <a:spcPts val="300"/>
-              </a:spcAft>
-              <a:buClr>
-                <a:schemeClr val="accent1"/>
-              </a:buClr>
-              <a:buSzTx/>
-              <a:buFont typeface="Arial" panose="020B0604020202020204" pitchFamily="34" charset="0"/>
-              <a:buChar char="›"/>
-              <a:tabLst/>
-            </a:pPr>
-            <a:r>
-              <a:rPr lang="de-DE" sz="1400" kern="0" dirty="0" smtClean="0">
-                <a:latin typeface="Arial" panose="020B0604020202020204" pitchFamily="34" charset="0"/>
-                <a:ea typeface="Verdana" pitchFamily="34" charset="0"/>
-                <a:cs typeface="Arial" panose="020B0604020202020204" pitchFamily="34" charset="0"/>
-              </a:rPr>
-              <a:t>Out_x = (Input_x – Filter_x + 1) / stride</a:t>
-            </a:r>
-          </a:p>
-          <a:p>
-            <a:pPr marL="285750" indent="-285750" eaLnBrk="0" fontAlgn="auto" hangingPunct="0">
-              <a:spcBef>
-                <a:spcPts val="0"/>
-              </a:spcBef>
-              <a:spcAft>
-                <a:spcPts val="300"/>
-              </a:spcAft>
-              <a:buClr>
-                <a:schemeClr val="accent1"/>
-              </a:buClr>
-              <a:buFont typeface="Arial" panose="020B0604020202020204" pitchFamily="34" charset="0"/>
-              <a:buChar char="›"/>
-            </a:pPr>
-            <a:r>
-              <a:rPr lang="de-DE" sz="1400" kern="0" dirty="0" smtClean="0">
-                <a:latin typeface="Arial" panose="020B0604020202020204" pitchFamily="34" charset="0"/>
-                <a:ea typeface="Verdana" pitchFamily="34" charset="0"/>
-                <a:cs typeface="Arial" panose="020B0604020202020204" pitchFamily="34" charset="0"/>
-              </a:rPr>
-              <a:t>Out_y </a:t>
-            </a:r>
-            <a:r>
-              <a:rPr lang="de-DE" sz="1400" kern="0" dirty="0">
-                <a:latin typeface="Arial" panose="020B0604020202020204" pitchFamily="34" charset="0"/>
-                <a:ea typeface="Verdana" pitchFamily="34" charset="0"/>
-                <a:cs typeface="Arial" panose="020B0604020202020204" pitchFamily="34" charset="0"/>
-              </a:rPr>
-              <a:t>= (</a:t>
-            </a:r>
-            <a:r>
-              <a:rPr lang="de-DE" sz="1400" kern="0" dirty="0" smtClean="0">
-                <a:latin typeface="Arial" panose="020B0604020202020204" pitchFamily="34" charset="0"/>
-                <a:ea typeface="Verdana" pitchFamily="34" charset="0"/>
-                <a:cs typeface="Arial" panose="020B0604020202020204" pitchFamily="34" charset="0"/>
-              </a:rPr>
-              <a:t>Input_y </a:t>
-            </a:r>
-            <a:r>
-              <a:rPr lang="de-DE" sz="1400" kern="0" dirty="0">
-                <a:latin typeface="Arial" panose="020B0604020202020204" pitchFamily="34" charset="0"/>
-                <a:ea typeface="Verdana" pitchFamily="34" charset="0"/>
-                <a:cs typeface="Arial" panose="020B0604020202020204" pitchFamily="34" charset="0"/>
-              </a:rPr>
-              <a:t>– </a:t>
-            </a:r>
-            <a:r>
-              <a:rPr lang="de-DE" sz="1400" kern="0" dirty="0" smtClean="0">
-                <a:latin typeface="Arial" panose="020B0604020202020204" pitchFamily="34" charset="0"/>
-                <a:ea typeface="Verdana" pitchFamily="34" charset="0"/>
-                <a:cs typeface="Arial" panose="020B0604020202020204" pitchFamily="34" charset="0"/>
-              </a:rPr>
-              <a:t>Filter_y </a:t>
-            </a:r>
-            <a:r>
-              <a:rPr lang="de-DE" sz="1400" kern="0" dirty="0">
-                <a:latin typeface="Arial" panose="020B0604020202020204" pitchFamily="34" charset="0"/>
-                <a:ea typeface="Verdana" pitchFamily="34" charset="0"/>
-                <a:cs typeface="Arial" panose="020B0604020202020204" pitchFamily="34" charset="0"/>
-              </a:rPr>
-              <a:t>+ 1) / </a:t>
-            </a:r>
-            <a:r>
-              <a:rPr lang="de-DE" sz="1400" kern="0" dirty="0" smtClean="0">
-                <a:latin typeface="Arial" panose="020B0604020202020204" pitchFamily="34" charset="0"/>
-                <a:ea typeface="Verdana" pitchFamily="34" charset="0"/>
-                <a:cs typeface="Arial" panose="020B0604020202020204" pitchFamily="34" charset="0"/>
-              </a:rPr>
-              <a:t>stride</a:t>
-            </a:r>
-            <a:endParaRPr lang="de-DE" sz="1400" kern="0" dirty="0">
-              <a:latin typeface="Arial" panose="020B0604020202020204" pitchFamily="34" charset="0"/>
-              <a:ea typeface="Verdana" pitchFamily="34" charset="0"/>
-              <a:cs typeface="Arial" panose="020B0604020202020204" pitchFamily="34" charset="0"/>
-            </a:endParaRPr>
-          </a:p>
-        </p:txBody>
-      </p:sp>
-    </p:spTree>
-    <p:extLst>
-      <p:ext uri="{BB962C8B-B14F-4D97-AF65-F5344CB8AC3E}">
-        <p14:creationId xmlns:p14="http://schemas.microsoft.com/office/powerpoint/2010/main" val="1140550618"/>
       </p:ext>
     </p:extLst>
   </p:cSld>
@@ -12726,11 +13508,6 @@
               </a:rPr>
               <a:t>Output</a:t>
             </a:r>
-            <a:endParaRPr lang="de-DE" sz="1400" kern="0" dirty="0" smtClean="0">
-              <a:latin typeface="Arial" panose="020B0604020202020204" pitchFamily="34" charset="0"/>
-              <a:ea typeface="Verdana" pitchFamily="34" charset="0"/>
-              <a:cs typeface="Arial" panose="020B0604020202020204" pitchFamily="34" charset="0"/>
-            </a:endParaRPr>
           </a:p>
         </p:txBody>
       </p:sp>
@@ -12835,24 +13612,8 @@
                 <a:ea typeface="Verdana" pitchFamily="34" charset="0"/>
                 <a:cs typeface="Arial" panose="020B0604020202020204" pitchFamily="34" charset="0"/>
               </a:rPr>
-              <a:t>Out_x * Out_y * </a:t>
-            </a:r>
-            <a:r>
-              <a:rPr lang="de-DE" sz="1100" kern="0" dirty="0" smtClean="0">
-                <a:solidFill>
-                  <a:srgbClr val="FF0000"/>
-                </a:solidFill>
-                <a:latin typeface="Arial" panose="020B0604020202020204" pitchFamily="34" charset="0"/>
-                <a:ea typeface="Verdana" pitchFamily="34" charset="0"/>
-                <a:cs typeface="Arial" panose="020B0604020202020204" pitchFamily="34" charset="0"/>
-              </a:rPr>
-              <a:t>n</a:t>
-            </a:r>
-            <a:endParaRPr lang="de-DE" sz="1100" kern="0" dirty="0" smtClean="0">
-              <a:latin typeface="Arial" panose="020B0604020202020204" pitchFamily="34" charset="0"/>
-              <a:ea typeface="Verdana" pitchFamily="34" charset="0"/>
-              <a:cs typeface="Arial" panose="020B0604020202020204" pitchFamily="34" charset="0"/>
-            </a:endParaRPr>
+              <a:t>Out_x * Out_y * 1</a:t>
+            </a:r>
           </a:p>
         </p:txBody>
       </p:sp>
@@ -12987,138 +13748,10 @@
           </a:p>
         </p:txBody>
       </p:sp>
-      <p:sp>
-        <p:nvSpPr>
-          <p:cNvPr id="5" name="TextBox 4"/>
-          <p:cNvSpPr txBox="1"/>
-          <p:nvPr/>
-        </p:nvSpPr>
-        <p:spPr bwMode="auto">
-          <a:xfrm>
-            <a:off x="5724128" y="4467122"/>
-            <a:ext cx="1899559" cy="215444"/>
-          </a:xfrm>
-          <a:prstGeom prst="rect">
-            <a:avLst/>
-          </a:prstGeom>
-          <a:noFill/>
-          <a:ln w="9525">
-            <a:noFill/>
-            <a:miter lim="800000"/>
-            <a:headEnd/>
-            <a:tailEnd/>
-          </a:ln>
-          <a:effectLst/>
-        </p:spPr>
-        <p:txBody>
-          <a:bodyPr wrap="none" lIns="0" tIns="0" rIns="0" bIns="0" rtlCol="0" anchor="ctr" anchorCtr="0">
-            <a:spAutoFit/>
-          </a:bodyPr>
-          <a:lstStyle/>
-          <a:p>
-            <a:pPr marR="0" defTabSz="914400" eaLnBrk="0" fontAlgn="auto" latinLnBrk="0" hangingPunct="0">
-              <a:spcBef>
-                <a:spcPts val="0"/>
-              </a:spcBef>
-              <a:spcAft>
-                <a:spcPts val="300"/>
-              </a:spcAft>
-              <a:buClr>
-                <a:schemeClr val="accent1"/>
-              </a:buClr>
-              <a:buSzTx/>
-              <a:tabLst/>
-            </a:pPr>
-            <a:r>
-              <a:rPr lang="de-DE" sz="1400" kern="0" dirty="0" smtClean="0">
-                <a:solidFill>
-                  <a:srgbClr val="FF0000"/>
-                </a:solidFill>
-                <a:latin typeface="Arial" panose="020B0604020202020204" pitchFamily="34" charset="0"/>
-                <a:ea typeface="Verdana" pitchFamily="34" charset="0"/>
-                <a:cs typeface="Arial" panose="020B0604020202020204" pitchFamily="34" charset="0"/>
-              </a:rPr>
-              <a:t>Multiple Filters (n filters)</a:t>
-            </a:r>
-            <a:endParaRPr lang="de-DE" sz="1400" kern="0" dirty="0" smtClean="0">
-              <a:solidFill>
-                <a:srgbClr val="FF0000"/>
-              </a:solidFill>
-              <a:latin typeface="Arial" panose="020B0604020202020204" pitchFamily="34" charset="0"/>
-              <a:ea typeface="Verdana" pitchFamily="34" charset="0"/>
-              <a:cs typeface="Arial" panose="020B0604020202020204" pitchFamily="34" charset="0"/>
-            </a:endParaRPr>
-          </a:p>
-        </p:txBody>
-      </p:sp>
-      <p:sp>
-        <p:nvSpPr>
-          <p:cNvPr id="8" name="TextBox 7"/>
-          <p:cNvSpPr txBox="1"/>
-          <p:nvPr/>
-        </p:nvSpPr>
-        <p:spPr bwMode="auto">
-          <a:xfrm>
-            <a:off x="6564102" y="6010726"/>
-            <a:ext cx="2119170" cy="215444"/>
-          </a:xfrm>
-          <a:prstGeom prst="rect">
-            <a:avLst/>
-          </a:prstGeom>
-          <a:noFill/>
-          <a:ln w="9525">
-            <a:noFill/>
-            <a:miter lim="800000"/>
-            <a:headEnd/>
-            <a:tailEnd/>
-          </a:ln>
-          <a:effectLst/>
-        </p:spPr>
-        <p:txBody>
-          <a:bodyPr wrap="none" lIns="0" tIns="0" rIns="0" bIns="0" rtlCol="0" anchor="ctr" anchorCtr="0">
-            <a:spAutoFit/>
-          </a:bodyPr>
-          <a:lstStyle/>
-          <a:p>
-            <a:pPr marR="0" defTabSz="914400" eaLnBrk="0" fontAlgn="auto" latinLnBrk="0" hangingPunct="0">
-              <a:spcBef>
-                <a:spcPts val="0"/>
-              </a:spcBef>
-              <a:spcAft>
-                <a:spcPts val="300"/>
-              </a:spcAft>
-              <a:buClr>
-                <a:schemeClr val="accent1"/>
-              </a:buClr>
-              <a:buSzTx/>
-              <a:tabLst/>
-            </a:pPr>
-            <a:r>
-              <a:rPr lang="de-DE" sz="1400" kern="0" dirty="0" smtClean="0">
-                <a:solidFill>
-                  <a:srgbClr val="FF0000"/>
-                </a:solidFill>
-                <a:latin typeface="Arial" panose="020B0604020202020204" pitchFamily="34" charset="0"/>
-                <a:ea typeface="Verdana" pitchFamily="34" charset="0"/>
-                <a:cs typeface="Arial" panose="020B0604020202020204" pitchFamily="34" charset="0"/>
-              </a:rPr>
-              <a:t>Batches not mentioned yet</a:t>
-            </a:r>
-            <a:endParaRPr lang="de-DE" sz="1400" kern="0" dirty="0" smtClean="0">
-              <a:solidFill>
-                <a:srgbClr val="FF0000"/>
-              </a:solidFill>
-              <a:latin typeface="Arial" panose="020B0604020202020204" pitchFamily="34" charset="0"/>
-              <a:ea typeface="Verdana" pitchFamily="34" charset="0"/>
-              <a:cs typeface="Arial" panose="020B0604020202020204" pitchFamily="34" charset="0"/>
-            </a:endParaRPr>
-          </a:p>
-        </p:txBody>
-      </p:sp>
     </p:spTree>
     <p:extLst>
       <p:ext uri="{BB962C8B-B14F-4D97-AF65-F5344CB8AC3E}">
-        <p14:creationId xmlns:p14="http://schemas.microsoft.com/office/powerpoint/2010/main" val="2060663336"/>
+        <p14:creationId xmlns:p14="http://schemas.microsoft.com/office/powerpoint/2010/main" val="1140550618"/>
       </p:ext>
     </p:extLst>
   </p:cSld>
@@ -13215,14 +13848,660 @@
           <a:lstStyle/>
           <a:p>
             <a:r>
+              <a:rPr lang="de-DE" dirty="0" smtClean="0"/>
+              <a:t>Convolutional layers</a:t>
+            </a:r>
+            <a:endParaRPr lang="de-DE" dirty="0"/>
+          </a:p>
+        </p:txBody>
+      </p:sp>
+      <p:sp>
+        <p:nvSpPr>
+          <p:cNvPr id="6" name="Date Placeholder 5"/>
+          <p:cNvSpPr>
+            <a:spLocks noGrp="1"/>
+          </p:cNvSpPr>
+          <p:nvPr>
+            <p:ph type="dt" sz="half" idx="15"/>
+          </p:nvPr>
+        </p:nvSpPr>
+        <p:spPr/>
+        <p:txBody>
+          <a:bodyPr/>
+          <a:lstStyle/>
+          <a:p>
+            <a:r>
+              <a:rPr lang="de-DE" smtClean="0"/>
+              <a:t>2020-05-14             </a:t>
+            </a:r>
+            <a:r>
+              <a:rPr lang="de-DE" b="1" smtClean="0"/>
+              <a:t>restricted</a:t>
+            </a:r>
+            <a:endParaRPr lang="de-DE" b="1" dirty="0"/>
+          </a:p>
+        </p:txBody>
+      </p:sp>
+      <p:pic>
+        <p:nvPicPr>
+          <p:cNvPr id="2050" name="Picture 2" descr="https://tum-ai.com/assets/img/Untitled%20Diagram(1).png"/>
+          <p:cNvPicPr>
+            <a:picLocks noChangeAspect="1" noChangeArrowheads="1"/>
+          </p:cNvPicPr>
+          <p:nvPr/>
+        </p:nvPicPr>
+        <p:blipFill>
+          <a:blip r:embed="rId2">
+            <a:extLst>
+              <a:ext uri="{28A0092B-C50C-407E-A947-70E740481C1C}">
+                <a14:useLocalDpi xmlns:a14="http://schemas.microsoft.com/office/drawing/2010/main" val="0"/>
+              </a:ext>
+            </a:extLst>
+          </a:blip>
+          <a:srcRect/>
+          <a:stretch>
+            <a:fillRect/>
+          </a:stretch>
+        </p:blipFill>
+        <p:spPr bwMode="auto">
+          <a:xfrm>
+            <a:off x="1228725" y="1196752"/>
+            <a:ext cx="6686550" cy="3629025"/>
+          </a:xfrm>
+          <a:prstGeom prst="rect">
+            <a:avLst/>
+          </a:prstGeom>
+          <a:noFill/>
+          <a:extLst>
+            <a:ext uri="{909E8E84-426E-40DD-AFC4-6F175D3DCCD1}">
+              <a14:hiddenFill xmlns:a14="http://schemas.microsoft.com/office/drawing/2010/main">
+                <a:solidFill>
+                  <a:srgbClr val="FFFFFF"/>
+                </a:solidFill>
+              </a14:hiddenFill>
+            </a:ext>
+          </a:extLst>
+        </p:spPr>
+      </p:pic>
+      <p:sp>
+        <p:nvSpPr>
+          <p:cNvPr id="7" name="TextBox 6"/>
+          <p:cNvSpPr txBox="1"/>
+          <p:nvPr/>
+        </p:nvSpPr>
+        <p:spPr bwMode="auto">
+          <a:xfrm>
+            <a:off x="571359" y="2132856"/>
+            <a:ext cx="397545" cy="215444"/>
+          </a:xfrm>
+          <a:prstGeom prst="rect">
+            <a:avLst/>
+          </a:prstGeom>
+          <a:noFill/>
+          <a:ln w="9525">
+            <a:noFill/>
+            <a:miter lim="800000"/>
+            <a:headEnd/>
+            <a:tailEnd/>
+          </a:ln>
+          <a:effectLst/>
+        </p:spPr>
+        <p:txBody>
+          <a:bodyPr wrap="none" lIns="0" tIns="0" rIns="0" bIns="0" rtlCol="0" anchor="ctr" anchorCtr="0">
+            <a:spAutoFit/>
+          </a:bodyPr>
+          <a:lstStyle/>
+          <a:p>
+            <a:pPr marR="0" defTabSz="914400" eaLnBrk="0" fontAlgn="auto" latinLnBrk="0" hangingPunct="0">
+              <a:spcBef>
+                <a:spcPts val="0"/>
+              </a:spcBef>
+              <a:spcAft>
+                <a:spcPts val="300"/>
+              </a:spcAft>
+              <a:buClr>
+                <a:schemeClr val="accent1"/>
+              </a:buClr>
+              <a:buSzTx/>
+              <a:tabLst/>
+            </a:pPr>
+            <a:r>
+              <a:rPr lang="de-DE" sz="1400" kern="0" dirty="0" smtClean="0">
+                <a:latin typeface="Arial" panose="020B0604020202020204" pitchFamily="34" charset="0"/>
+                <a:ea typeface="Verdana" pitchFamily="34" charset="0"/>
+                <a:cs typeface="Arial" panose="020B0604020202020204" pitchFamily="34" charset="0"/>
+              </a:rPr>
+              <a:t>Input</a:t>
+            </a:r>
+          </a:p>
+        </p:txBody>
+      </p:sp>
+      <p:sp>
+        <p:nvSpPr>
+          <p:cNvPr id="16" name="TextBox 15"/>
+          <p:cNvSpPr txBox="1"/>
+          <p:nvPr/>
+        </p:nvSpPr>
+        <p:spPr bwMode="auto">
+          <a:xfrm>
+            <a:off x="3059832" y="4005064"/>
+            <a:ext cx="537006" cy="215444"/>
+          </a:xfrm>
+          <a:prstGeom prst="rect">
+            <a:avLst/>
+          </a:prstGeom>
+          <a:noFill/>
+          <a:ln w="9525">
+            <a:noFill/>
+            <a:miter lim="800000"/>
+            <a:headEnd/>
+            <a:tailEnd/>
+          </a:ln>
+          <a:effectLst/>
+        </p:spPr>
+        <p:txBody>
+          <a:bodyPr wrap="none" lIns="0" tIns="0" rIns="0" bIns="0" rtlCol="0" anchor="ctr" anchorCtr="0">
+            <a:spAutoFit/>
+          </a:bodyPr>
+          <a:lstStyle/>
+          <a:p>
+            <a:pPr marR="0" defTabSz="914400" eaLnBrk="0" fontAlgn="auto" latinLnBrk="0" hangingPunct="0">
+              <a:spcBef>
+                <a:spcPts val="0"/>
+              </a:spcBef>
+              <a:spcAft>
+                <a:spcPts val="300"/>
+              </a:spcAft>
+              <a:buClr>
+                <a:schemeClr val="accent1"/>
+              </a:buClr>
+              <a:buSzTx/>
+              <a:tabLst/>
+            </a:pPr>
+            <a:r>
+              <a:rPr lang="de-DE" sz="1400" kern="0" dirty="0" smtClean="0">
+                <a:latin typeface="Arial" panose="020B0604020202020204" pitchFamily="34" charset="0"/>
+                <a:ea typeface="Verdana" pitchFamily="34" charset="0"/>
+                <a:cs typeface="Arial" panose="020B0604020202020204" pitchFamily="34" charset="0"/>
+              </a:rPr>
+              <a:t>Output</a:t>
+            </a:r>
+          </a:p>
+        </p:txBody>
+      </p:sp>
+      <p:sp>
+        <p:nvSpPr>
+          <p:cNvPr id="17" name="TextBox 16"/>
+          <p:cNvSpPr txBox="1"/>
+          <p:nvPr/>
+        </p:nvSpPr>
+        <p:spPr bwMode="auto">
+          <a:xfrm>
+            <a:off x="251520" y="3212976"/>
+            <a:ext cx="2232248" cy="169277"/>
+          </a:xfrm>
+          <a:prstGeom prst="rect">
+            <a:avLst/>
+          </a:prstGeom>
+          <a:noFill/>
+          <a:ln w="9525">
+            <a:noFill/>
+            <a:miter lim="800000"/>
+            <a:headEnd/>
+            <a:tailEnd/>
+          </a:ln>
+          <a:effectLst/>
+        </p:spPr>
+        <p:txBody>
+          <a:bodyPr wrap="square" lIns="0" tIns="0" rIns="0" bIns="0" rtlCol="0" anchor="ctr" anchorCtr="0">
+            <a:spAutoFit/>
+          </a:bodyPr>
+          <a:lstStyle/>
+          <a:p>
+            <a:pPr marR="0" defTabSz="914400" eaLnBrk="0" fontAlgn="auto" latinLnBrk="0" hangingPunct="0">
+              <a:spcBef>
+                <a:spcPts val="0"/>
+              </a:spcBef>
+              <a:spcAft>
+                <a:spcPts val="300"/>
+              </a:spcAft>
+              <a:buClr>
+                <a:schemeClr val="accent1"/>
+              </a:buClr>
+              <a:buSzTx/>
+              <a:tabLst/>
+            </a:pPr>
+            <a:r>
+              <a:rPr lang="de-DE" sz="1100" kern="0" dirty="0" smtClean="0">
+                <a:latin typeface="Arial" panose="020B0604020202020204" pitchFamily="34" charset="0"/>
+                <a:ea typeface="Verdana" pitchFamily="34" charset="0"/>
+                <a:cs typeface="Arial" panose="020B0604020202020204" pitchFamily="34" charset="0"/>
+              </a:rPr>
+              <a:t>Input_x * Input_y * Input_c</a:t>
+            </a:r>
+          </a:p>
+        </p:txBody>
+      </p:sp>
+      <p:sp>
+        <p:nvSpPr>
+          <p:cNvPr id="18" name="TextBox 17"/>
+          <p:cNvSpPr txBox="1"/>
+          <p:nvPr/>
+        </p:nvSpPr>
+        <p:spPr bwMode="auto">
+          <a:xfrm>
+            <a:off x="4860036" y="4741138"/>
+            <a:ext cx="2232248" cy="169277"/>
+          </a:xfrm>
+          <a:prstGeom prst="rect">
+            <a:avLst/>
+          </a:prstGeom>
+          <a:noFill/>
+          <a:ln w="9525">
+            <a:noFill/>
+            <a:miter lim="800000"/>
+            <a:headEnd/>
+            <a:tailEnd/>
+          </a:ln>
+          <a:effectLst/>
+        </p:spPr>
+        <p:txBody>
+          <a:bodyPr wrap="square" lIns="0" tIns="0" rIns="0" bIns="0" rtlCol="0" anchor="ctr" anchorCtr="0">
+            <a:spAutoFit/>
+          </a:bodyPr>
+          <a:lstStyle/>
+          <a:p>
+            <a:pPr marR="0" defTabSz="914400" eaLnBrk="0" fontAlgn="auto" latinLnBrk="0" hangingPunct="0">
+              <a:spcBef>
+                <a:spcPts val="0"/>
+              </a:spcBef>
+              <a:spcAft>
+                <a:spcPts val="300"/>
+              </a:spcAft>
+              <a:buClr>
+                <a:schemeClr val="accent1"/>
+              </a:buClr>
+              <a:buSzTx/>
+              <a:tabLst/>
+            </a:pPr>
+            <a:r>
+              <a:rPr lang="de-DE" sz="1100" kern="0" dirty="0" smtClean="0">
+                <a:latin typeface="Arial" panose="020B0604020202020204" pitchFamily="34" charset="0"/>
+                <a:ea typeface="Verdana" pitchFamily="34" charset="0"/>
+                <a:cs typeface="Arial" panose="020B0604020202020204" pitchFamily="34" charset="0"/>
+              </a:rPr>
+              <a:t>Out_x * Out_y * </a:t>
+            </a:r>
+            <a:r>
+              <a:rPr lang="de-DE" sz="1100" kern="0" dirty="0" smtClean="0">
+                <a:solidFill>
+                  <a:srgbClr val="FF0000"/>
+                </a:solidFill>
+                <a:latin typeface="Arial" panose="020B0604020202020204" pitchFamily="34" charset="0"/>
+                <a:ea typeface="Verdana" pitchFamily="34" charset="0"/>
+                <a:cs typeface="Arial" panose="020B0604020202020204" pitchFamily="34" charset="0"/>
+              </a:rPr>
+              <a:t>n</a:t>
+            </a:r>
+            <a:endParaRPr lang="de-DE" sz="1100" kern="0" dirty="0" smtClean="0">
+              <a:latin typeface="Arial" panose="020B0604020202020204" pitchFamily="34" charset="0"/>
+              <a:ea typeface="Verdana" pitchFamily="34" charset="0"/>
+              <a:cs typeface="Arial" panose="020B0604020202020204" pitchFamily="34" charset="0"/>
+            </a:endParaRPr>
+          </a:p>
+        </p:txBody>
+      </p:sp>
+      <p:sp>
+        <p:nvSpPr>
+          <p:cNvPr id="12" name="TextBox 11"/>
+          <p:cNvSpPr txBox="1"/>
+          <p:nvPr/>
+        </p:nvSpPr>
+        <p:spPr bwMode="auto">
+          <a:xfrm>
+            <a:off x="1564141" y="5449791"/>
+            <a:ext cx="3528388" cy="469359"/>
+          </a:xfrm>
+          <a:prstGeom prst="rect">
+            <a:avLst/>
+          </a:prstGeom>
+          <a:noFill/>
+          <a:ln w="9525">
+            <a:noFill/>
+            <a:miter lim="800000"/>
+            <a:headEnd/>
+            <a:tailEnd/>
+          </a:ln>
+          <a:effectLst/>
+        </p:spPr>
+        <p:txBody>
+          <a:bodyPr wrap="square" lIns="0" tIns="0" rIns="0" bIns="0" rtlCol="0" anchor="ctr" anchorCtr="0">
+            <a:spAutoFit/>
+          </a:bodyPr>
+          <a:lstStyle/>
+          <a:p>
+            <a:pPr marL="285750" marR="0" indent="-285750" defTabSz="914400" eaLnBrk="0" fontAlgn="auto" latinLnBrk="0" hangingPunct="0">
+              <a:spcBef>
+                <a:spcPts val="0"/>
+              </a:spcBef>
+              <a:spcAft>
+                <a:spcPts val="300"/>
+              </a:spcAft>
+              <a:buClr>
+                <a:schemeClr val="accent1"/>
+              </a:buClr>
+              <a:buSzTx/>
+              <a:buFont typeface="Arial" panose="020B0604020202020204" pitchFamily="34" charset="0"/>
+              <a:buChar char="›"/>
+              <a:tabLst/>
+            </a:pPr>
+            <a:r>
+              <a:rPr lang="de-DE" sz="1400" kern="0" dirty="0" smtClean="0">
+                <a:latin typeface="Arial" panose="020B0604020202020204" pitchFamily="34" charset="0"/>
+                <a:ea typeface="Verdana" pitchFamily="34" charset="0"/>
+                <a:cs typeface="Arial" panose="020B0604020202020204" pitchFamily="34" charset="0"/>
+              </a:rPr>
+              <a:t>Out_x = (Input_x – Filter_x + 1) / stride</a:t>
+            </a:r>
+          </a:p>
+          <a:p>
+            <a:pPr marL="285750" indent="-285750" eaLnBrk="0" fontAlgn="auto" hangingPunct="0">
+              <a:spcBef>
+                <a:spcPts val="0"/>
+              </a:spcBef>
+              <a:spcAft>
+                <a:spcPts val="300"/>
+              </a:spcAft>
+              <a:buClr>
+                <a:schemeClr val="accent1"/>
+              </a:buClr>
+              <a:buFont typeface="Arial" panose="020B0604020202020204" pitchFamily="34" charset="0"/>
+              <a:buChar char="›"/>
+            </a:pPr>
+            <a:r>
+              <a:rPr lang="de-DE" sz="1400" kern="0" dirty="0" smtClean="0">
+                <a:latin typeface="Arial" panose="020B0604020202020204" pitchFamily="34" charset="0"/>
+                <a:ea typeface="Verdana" pitchFamily="34" charset="0"/>
+                <a:cs typeface="Arial" panose="020B0604020202020204" pitchFamily="34" charset="0"/>
+              </a:rPr>
+              <a:t>Out_y </a:t>
+            </a:r>
+            <a:r>
+              <a:rPr lang="de-DE" sz="1400" kern="0" dirty="0">
+                <a:latin typeface="Arial" panose="020B0604020202020204" pitchFamily="34" charset="0"/>
+                <a:ea typeface="Verdana" pitchFamily="34" charset="0"/>
+                <a:cs typeface="Arial" panose="020B0604020202020204" pitchFamily="34" charset="0"/>
+              </a:rPr>
+              <a:t>= (</a:t>
+            </a:r>
+            <a:r>
+              <a:rPr lang="de-DE" sz="1400" kern="0" dirty="0" smtClean="0">
+                <a:latin typeface="Arial" panose="020B0604020202020204" pitchFamily="34" charset="0"/>
+                <a:ea typeface="Verdana" pitchFamily="34" charset="0"/>
+                <a:cs typeface="Arial" panose="020B0604020202020204" pitchFamily="34" charset="0"/>
+              </a:rPr>
+              <a:t>Input_y </a:t>
+            </a:r>
+            <a:r>
+              <a:rPr lang="de-DE" sz="1400" kern="0" dirty="0">
+                <a:latin typeface="Arial" panose="020B0604020202020204" pitchFamily="34" charset="0"/>
+                <a:ea typeface="Verdana" pitchFamily="34" charset="0"/>
+                <a:cs typeface="Arial" panose="020B0604020202020204" pitchFamily="34" charset="0"/>
+              </a:rPr>
+              <a:t>– </a:t>
+            </a:r>
+            <a:r>
+              <a:rPr lang="de-DE" sz="1400" kern="0" dirty="0" smtClean="0">
+                <a:latin typeface="Arial" panose="020B0604020202020204" pitchFamily="34" charset="0"/>
+                <a:ea typeface="Verdana" pitchFamily="34" charset="0"/>
+                <a:cs typeface="Arial" panose="020B0604020202020204" pitchFamily="34" charset="0"/>
+              </a:rPr>
+              <a:t>Filter_y </a:t>
+            </a:r>
+            <a:r>
+              <a:rPr lang="de-DE" sz="1400" kern="0" dirty="0">
+                <a:latin typeface="Arial" panose="020B0604020202020204" pitchFamily="34" charset="0"/>
+                <a:ea typeface="Verdana" pitchFamily="34" charset="0"/>
+                <a:cs typeface="Arial" panose="020B0604020202020204" pitchFamily="34" charset="0"/>
+              </a:rPr>
+              <a:t>+ 1) / </a:t>
+            </a:r>
+            <a:r>
+              <a:rPr lang="de-DE" sz="1400" kern="0" dirty="0" smtClean="0">
+                <a:latin typeface="Arial" panose="020B0604020202020204" pitchFamily="34" charset="0"/>
+                <a:ea typeface="Verdana" pitchFamily="34" charset="0"/>
+                <a:cs typeface="Arial" panose="020B0604020202020204" pitchFamily="34" charset="0"/>
+              </a:rPr>
+              <a:t>stride</a:t>
+            </a:r>
+            <a:endParaRPr lang="de-DE" sz="1400" kern="0" dirty="0">
+              <a:latin typeface="Arial" panose="020B0604020202020204" pitchFamily="34" charset="0"/>
+              <a:ea typeface="Verdana" pitchFamily="34" charset="0"/>
+              <a:cs typeface="Arial" panose="020B0604020202020204" pitchFamily="34" charset="0"/>
+            </a:endParaRPr>
+          </a:p>
+        </p:txBody>
+      </p:sp>
+      <p:sp>
+        <p:nvSpPr>
+          <p:cNvPr id="5" name="TextBox 4"/>
+          <p:cNvSpPr txBox="1"/>
+          <p:nvPr/>
+        </p:nvSpPr>
+        <p:spPr bwMode="auto">
+          <a:xfrm>
+            <a:off x="5724128" y="4467122"/>
+            <a:ext cx="1899559" cy="215444"/>
+          </a:xfrm>
+          <a:prstGeom prst="rect">
+            <a:avLst/>
+          </a:prstGeom>
+          <a:noFill/>
+          <a:ln w="9525">
+            <a:noFill/>
+            <a:miter lim="800000"/>
+            <a:headEnd/>
+            <a:tailEnd/>
+          </a:ln>
+          <a:effectLst/>
+        </p:spPr>
+        <p:txBody>
+          <a:bodyPr wrap="none" lIns="0" tIns="0" rIns="0" bIns="0" rtlCol="0" anchor="ctr" anchorCtr="0">
+            <a:spAutoFit/>
+          </a:bodyPr>
+          <a:lstStyle/>
+          <a:p>
+            <a:pPr marR="0" defTabSz="914400" eaLnBrk="0" fontAlgn="auto" latinLnBrk="0" hangingPunct="0">
+              <a:spcBef>
+                <a:spcPts val="0"/>
+              </a:spcBef>
+              <a:spcAft>
+                <a:spcPts val="300"/>
+              </a:spcAft>
+              <a:buClr>
+                <a:schemeClr val="accent1"/>
+              </a:buClr>
+              <a:buSzTx/>
+              <a:tabLst/>
+            </a:pPr>
+            <a:r>
+              <a:rPr lang="de-DE" sz="1400" kern="0" dirty="0" smtClean="0">
+                <a:solidFill>
+                  <a:srgbClr val="FF0000"/>
+                </a:solidFill>
+                <a:latin typeface="Arial" panose="020B0604020202020204" pitchFamily="34" charset="0"/>
+                <a:ea typeface="Verdana" pitchFamily="34" charset="0"/>
+                <a:cs typeface="Arial" panose="020B0604020202020204" pitchFamily="34" charset="0"/>
+              </a:rPr>
+              <a:t>Multiple Filters (n filters)</a:t>
+            </a:r>
+          </a:p>
+        </p:txBody>
+      </p:sp>
+      <p:sp>
+        <p:nvSpPr>
+          <p:cNvPr id="8" name="TextBox 7"/>
+          <p:cNvSpPr txBox="1"/>
+          <p:nvPr/>
+        </p:nvSpPr>
+        <p:spPr bwMode="auto">
+          <a:xfrm>
+            <a:off x="6564102" y="6010726"/>
+            <a:ext cx="2119170" cy="215444"/>
+          </a:xfrm>
+          <a:prstGeom prst="rect">
+            <a:avLst/>
+          </a:prstGeom>
+          <a:noFill/>
+          <a:ln w="9525">
+            <a:noFill/>
+            <a:miter lim="800000"/>
+            <a:headEnd/>
+            <a:tailEnd/>
+          </a:ln>
+          <a:effectLst/>
+        </p:spPr>
+        <p:txBody>
+          <a:bodyPr wrap="none" lIns="0" tIns="0" rIns="0" bIns="0" rtlCol="0" anchor="ctr" anchorCtr="0">
+            <a:spAutoFit/>
+          </a:bodyPr>
+          <a:lstStyle/>
+          <a:p>
+            <a:pPr marR="0" defTabSz="914400" eaLnBrk="0" fontAlgn="auto" latinLnBrk="0" hangingPunct="0">
+              <a:spcBef>
+                <a:spcPts val="0"/>
+              </a:spcBef>
+              <a:spcAft>
+                <a:spcPts val="300"/>
+              </a:spcAft>
+              <a:buClr>
+                <a:schemeClr val="accent1"/>
+              </a:buClr>
+              <a:buSzTx/>
+              <a:tabLst/>
+            </a:pPr>
+            <a:r>
+              <a:rPr lang="de-DE" sz="1400" kern="0" dirty="0" smtClean="0">
+                <a:solidFill>
+                  <a:srgbClr val="FF0000"/>
+                </a:solidFill>
+                <a:latin typeface="Arial" panose="020B0604020202020204" pitchFamily="34" charset="0"/>
+                <a:ea typeface="Verdana" pitchFamily="34" charset="0"/>
+                <a:cs typeface="Arial" panose="020B0604020202020204" pitchFamily="34" charset="0"/>
+              </a:rPr>
+              <a:t>Batches not mentioned yet</a:t>
+            </a:r>
+          </a:p>
+        </p:txBody>
+      </p:sp>
+    </p:spTree>
+    <p:extLst>
+      <p:ext uri="{BB962C8B-B14F-4D97-AF65-F5344CB8AC3E}">
+        <p14:creationId xmlns:p14="http://schemas.microsoft.com/office/powerpoint/2010/main" val="2060663336"/>
+      </p:ext>
+    </p:extLst>
+  </p:cSld>
+  <p:clrMapOvr>
+    <a:masterClrMapping/>
+  </p:clrMapOvr>
+  <p:timing>
+    <p:tnLst>
+      <p:par>
+        <p:cTn id="1" dur="indefinite" restart="never" nodeType="tmRoot"/>
+      </p:par>
+    </p:tnLst>
+  </p:timing>
+</p:sld>
+</file>
+
+<file path=ppt/slides/slide6.xml><?xml version="1.0" encoding="utf-8"?>
+<p:sld xmlns:a="http://schemas.openxmlformats.org/drawingml/2006/main" xmlns:r="http://schemas.openxmlformats.org/officeDocument/2006/relationships" xmlns:p="http://schemas.openxmlformats.org/presentationml/2006/main">
+  <p:cSld>
+    <p:spTree>
+      <p:nvGrpSpPr>
+        <p:cNvPr id="1" name=""/>
+        <p:cNvGrpSpPr/>
+        <p:nvPr/>
+      </p:nvGrpSpPr>
+      <p:grpSpPr>
+        <a:xfrm>
+          <a:off x="0" y="0"/>
+          <a:ext cx="0" cy="0"/>
+          <a:chOff x="0" y="0"/>
+          <a:chExt cx="0" cy="0"/>
+        </a:xfrm>
+      </p:grpSpPr>
+      <p:sp>
+        <p:nvSpPr>
+          <p:cNvPr id="2" name="Footer Placeholder 1"/>
+          <p:cNvSpPr>
+            <a:spLocks noGrp="1"/>
+          </p:cNvSpPr>
+          <p:nvPr>
+            <p:ph type="ftr" sz="quarter" idx="16"/>
+          </p:nvPr>
+        </p:nvSpPr>
+        <p:spPr/>
+        <p:txBody>
+          <a:bodyPr/>
+          <a:lstStyle/>
+          <a:p>
+            <a:r>
+              <a:rPr lang="en-US" smtClean="0"/>
+              <a:t>Copyright © Infineon Technologies AG 2020. All rights reserved.</a:t>
+            </a:r>
+            <a:endParaRPr lang="de-DE" dirty="0"/>
+          </a:p>
+        </p:txBody>
+      </p:sp>
+      <p:sp>
+        <p:nvSpPr>
+          <p:cNvPr id="3" name="Slide Number Placeholder 2"/>
+          <p:cNvSpPr>
+            <a:spLocks noGrp="1"/>
+          </p:cNvSpPr>
+          <p:nvPr>
+            <p:ph type="sldNum" sz="quarter" idx="14"/>
+          </p:nvPr>
+        </p:nvSpPr>
+        <p:spPr/>
+        <p:txBody>
+          <a:bodyPr/>
+          <a:lstStyle/>
+          <a:p>
+            <a:fld id="{97555E91-926B-4C96-90B6-D75C3A27DF23}" type="slidenum">
+              <a:rPr lang="de-DE" smtClean="0"/>
+              <a:pPr/>
+              <a:t>6</a:t>
+            </a:fld>
+            <a:endParaRPr lang="de-DE" dirty="0"/>
+          </a:p>
+        </p:txBody>
+      </p:sp>
+      <p:sp>
+        <p:nvSpPr>
+          <p:cNvPr id="4" name="Title 3"/>
+          <p:cNvSpPr>
+            <a:spLocks noGrp="1"/>
+          </p:cNvSpPr>
+          <p:nvPr>
+            <p:ph type="title"/>
+          </p:nvPr>
+        </p:nvSpPr>
+        <p:spPr/>
+        <p:txBody>
+          <a:bodyPr/>
+          <a:lstStyle/>
+          <a:p>
+            <a:r>
               <a:rPr lang="de-DE" dirty="0"/>
               <a:t>FLOAT Convolutional layer calculations</a:t>
             </a:r>
           </a:p>
         </p:txBody>
       </p:sp>
-      <mc:AlternateContent xmlns:mc="http://schemas.openxmlformats.org/markup-compatibility/2006">
-        <mc:Choice xmlns:a14="http://schemas.microsoft.com/office/drawing/2010/main" Requires="a14">
+      <mc:AlternateContent xmlns:mc="http://schemas.openxmlformats.org/markup-compatibility/2006" xmlns:a14="http://schemas.microsoft.com/office/drawing/2010/main">
+        <mc:Choice Requires="a14">
           <p:sp>
             <p:nvSpPr>
               <p:cNvPr id="5" name="Content Placeholder 4"/>
@@ -13386,7 +14665,14 @@
                                     <a:latin typeface="Cambria Math" panose="02040503050406030204" pitchFamily="18" charset="0"/>
                                     <a:ea typeface="Cambria Math" panose="02040503050406030204" pitchFamily="18" charset="0"/>
                                   </a:rPr>
-                                  <m:t>𝑓𝑖𝑙𝑡𝑒</m:t>
+                                  <m:t>𝑓</m:t>
+                                </m:r>
+                                <m:r>
+                                  <a:rPr lang="de-DE" b="0" i="1" smtClean="0">
+                                    <a:latin typeface="Cambria Math" panose="02040503050406030204" pitchFamily="18" charset="0"/>
+                                    <a:ea typeface="Cambria Math" panose="02040503050406030204" pitchFamily="18" charset="0"/>
+                                  </a:rPr>
+                                  <m:t>𝑖𝑙𝑡𝑒</m:t>
                                 </m:r>
                                 <m:sSub>
                                   <m:sSubPr>
@@ -13445,7 +14731,14 @@
                                         <a:latin typeface="Cambria Math" panose="02040503050406030204" pitchFamily="18" charset="0"/>
                                         <a:ea typeface="Cambria Math" panose="02040503050406030204" pitchFamily="18" charset="0"/>
                                       </a:rPr>
-                                      <m:t>𝑖𝑛𝑝𝑢</m:t>
+                                      <m:t>𝑖</m:t>
+                                    </m:r>
+                                    <m:r>
+                                      <a:rPr lang="de-DE" b="0" i="1" smtClean="0">
+                                        <a:latin typeface="Cambria Math" panose="02040503050406030204" pitchFamily="18" charset="0"/>
+                                        <a:ea typeface="Cambria Math" panose="02040503050406030204" pitchFamily="18" charset="0"/>
+                                      </a:rPr>
+                                      <m:t>𝑛𝑝𝑢</m:t>
                                     </m:r>
                                     <m:sSub>
                                       <m:sSubPr>
@@ -13667,7 +14960,7 @@
             </p:txBody>
           </p:sp>
         </mc:Choice>
-        <mc:Fallback>
+        <mc:Fallback xmlns="">
           <p:sp>
             <p:nvSpPr>
               <p:cNvPr id="5" name="Content Placeholder 4"/>
@@ -13748,7 +15041,7 @@
 </p:sld>
 </file>
 
-<file path=ppt/slides/slide6.xml><?xml version="1.0" encoding="utf-8"?>
+<file path=ppt/slides/slide7.xml><?xml version="1.0" encoding="utf-8"?>
 <p:sld xmlns:a="http://schemas.openxmlformats.org/drawingml/2006/main" xmlns:r="http://schemas.openxmlformats.org/officeDocument/2006/relationships" xmlns:p="http://schemas.openxmlformats.org/presentationml/2006/main">
   <p:cSld>
     <p:spTree>
@@ -13854,7 +15147,7 @@
         </p:nvSpPr>
         <p:spPr bwMode="auto">
           <a:xfrm>
-            <a:off x="4868840" y="3892259"/>
+            <a:off x="4839856" y="3950759"/>
             <a:ext cx="3569888" cy="723275"/>
           </a:xfrm>
           <a:prstGeom prst="rect">
@@ -13919,7 +15212,20 @@
                 <a:ea typeface="Verdana" pitchFamily="34" charset="0"/>
                 <a:cs typeface="Arial" panose="020B0604020202020204" pitchFamily="34" charset="0"/>
               </a:rPr>
-              <a:t>Always the same (can be precomputed)</a:t>
+              <a:t>Always the same </a:t>
+            </a:r>
+            <a:r>
+              <a:rPr lang="de-DE" sz="1400" kern="0" dirty="0" smtClean="0">
+                <a:solidFill>
+                  <a:schemeClr val="accent4">
+                    <a:lumMod val="75000"/>
+                  </a:schemeClr>
+                </a:solidFill>
+                <a:latin typeface="Arial" panose="020B0604020202020204" pitchFamily="34" charset="0"/>
+                <a:ea typeface="Verdana" pitchFamily="34" charset="0"/>
+                <a:cs typeface="Arial" panose="020B0604020202020204" pitchFamily="34" charset="0"/>
+              </a:rPr>
+              <a:t>(can be precomputed)</a:t>
             </a:r>
           </a:p>
           <a:p>
@@ -14091,15 +15397,7 @@
                 <a:ea typeface="Verdana" pitchFamily="34" charset="0"/>
                 <a:cs typeface="Arial" panose="020B0604020202020204" pitchFamily="34" charset="0"/>
               </a:rPr>
-              <a:t>Should only be computed </a:t>
-            </a:r>
-            <a:r>
-              <a:rPr lang="de-DE" sz="1400" kern="0" dirty="0" smtClean="0">
-                <a:latin typeface="Arial" panose="020B0604020202020204" pitchFamily="34" charset="0"/>
-                <a:ea typeface="Verdana" pitchFamily="34" charset="0"/>
-                <a:cs typeface="Arial" panose="020B0604020202020204" pitchFamily="34" charset="0"/>
-              </a:rPr>
-              <a:t>once</a:t>
+              <a:t>Should only be computed once</a:t>
             </a:r>
           </a:p>
           <a:p>
@@ -14129,14 +15427,6 @@
               </a:rPr>
               <a:t>Not worth optimizing</a:t>
             </a:r>
-            <a:endParaRPr lang="de-DE" sz="1400" kern="0" dirty="0" smtClean="0">
-              <a:solidFill>
-                <a:srgbClr val="FF0000"/>
-              </a:solidFill>
-              <a:latin typeface="Arial" panose="020B0604020202020204" pitchFamily="34" charset="0"/>
-              <a:ea typeface="Verdana" pitchFamily="34" charset="0"/>
-              <a:cs typeface="Arial" panose="020B0604020202020204" pitchFamily="34" charset="0"/>
-            </a:endParaRPr>
           </a:p>
         </p:txBody>
       </p:sp>
@@ -14303,7 +15593,7 @@
             <a:fld id="{97555E91-926B-4C96-90B6-D75C3A27DF23}" type="slidenum">
               <a:rPr lang="de-DE" smtClean="0"/>
               <a:pPr/>
-              <a:t>6</a:t>
+              <a:t>7</a:t>
             </a:fld>
             <a:endParaRPr lang="de-DE" dirty="0"/>
           </a:p>
@@ -15702,7 +16992,7 @@
 </p:sld>
 </file>
 
-<file path=ppt/slides/slide7.xml><?xml version="1.0" encoding="utf-8"?>
+<file path=ppt/slides/slide8.xml><?xml version="1.0" encoding="utf-8"?>
 <p:sld xmlns:a="http://schemas.openxmlformats.org/drawingml/2006/main" xmlns:r="http://schemas.openxmlformats.org/officeDocument/2006/relationships" xmlns:p="http://schemas.openxmlformats.org/presentationml/2006/main">
   <p:cSld>
     <p:spTree>
@@ -15727,7 +17017,7 @@
         </p:nvSpPr>
         <p:spPr bwMode="auto">
           <a:xfrm>
-            <a:off x="1923002" y="3212976"/>
+            <a:off x="1923002" y="3501008"/>
             <a:ext cx="5328592" cy="564791"/>
           </a:xfrm>
           <a:prstGeom prst="rect">
@@ -15797,7 +17087,7 @@
             <a:fld id="{97555E91-926B-4C96-90B6-D75C3A27DF23}" type="slidenum">
               <a:rPr lang="de-DE" smtClean="0"/>
               <a:pPr/>
-              <a:t>7</a:t>
+              <a:t>8</a:t>
             </a:fld>
             <a:endParaRPr lang="de-DE" dirty="0"/>
           </a:p>
@@ -15846,8 +17136,19 @@
               <a:p>
                 <a:r>
                   <a:rPr lang="de-DE" dirty="0"/>
-                  <a:t>ConvPerChannel function in internal/reference/integer_ops/conv.h is used!!!</a:t>
+                  <a:t>ConvPerChannel function in internal/reference/integer_ops/conv.h is used</a:t>
                 </a:r>
+                <a:r>
+                  <a:rPr lang="de-DE" dirty="0" smtClean="0"/>
+                  <a:t>!!!</a:t>
+                </a:r>
+              </a:p>
+              <a:p>
+                <a:r>
+                  <a:rPr lang="de-DE" dirty="0" smtClean="0"/>
+                  <a:t>Filter offset is assumed to be 0</a:t>
+                </a:r>
+                <a:endParaRPr lang="de-DE" dirty="0"/>
               </a:p>
               <a:p>
                 <a:r>
@@ -16493,7 +17794,7 @@
         </p:nvSpPr>
         <p:spPr>
           <a:xfrm rot="5400000">
-            <a:off x="5562113" y="2392702"/>
+            <a:off x="5562113" y="2637795"/>
             <a:ext cx="270236" cy="3040366"/>
           </a:xfrm>
           <a:prstGeom prst="rightBrace">
@@ -16537,7 +17838,7 @@
         </p:nvSpPr>
         <p:spPr bwMode="auto">
           <a:xfrm>
-            <a:off x="4475170" y="4129964"/>
+            <a:off x="4475170" y="4361909"/>
             <a:ext cx="4002602" cy="723275"/>
           </a:xfrm>
           <a:prstGeom prst="rect">
@@ -16640,7 +17941,7 @@
         </p:nvSpPr>
         <p:spPr>
           <a:xfrm rot="5400000">
-            <a:off x="2871254" y="2726317"/>
+            <a:off x="2871254" y="2987302"/>
             <a:ext cx="270236" cy="2341352"/>
           </a:xfrm>
           <a:prstGeom prst="rightBrace">
@@ -16684,7 +17985,7 @@
         </p:nvSpPr>
         <p:spPr bwMode="auto">
           <a:xfrm>
-            <a:off x="1923002" y="4129964"/>
+            <a:off x="1923002" y="4400381"/>
             <a:ext cx="2372566" cy="684803"/>
           </a:xfrm>
           <a:prstGeom prst="rect">
@@ -16774,160 +18075,6 @@
 </p:sld>
 </file>
 
-<file path=ppt/slides/slide8.xml><?xml version="1.0" encoding="utf-8"?>
-<p:sld xmlns:a="http://schemas.openxmlformats.org/drawingml/2006/main" xmlns:r="http://schemas.openxmlformats.org/officeDocument/2006/relationships" xmlns:p="http://schemas.openxmlformats.org/presentationml/2006/main">
-  <p:cSld>
-    <p:spTree>
-      <p:nvGrpSpPr>
-        <p:cNvPr id="1" name=""/>
-        <p:cNvGrpSpPr/>
-        <p:nvPr/>
-      </p:nvGrpSpPr>
-      <p:grpSpPr>
-        <a:xfrm>
-          <a:off x="0" y="0"/>
-          <a:ext cx="0" cy="0"/>
-          <a:chOff x="0" y="0"/>
-          <a:chExt cx="0" cy="0"/>
-        </a:xfrm>
-      </p:grpSpPr>
-      <p:sp>
-        <p:nvSpPr>
-          <p:cNvPr id="2" name="Footer Placeholder 1"/>
-          <p:cNvSpPr>
-            <a:spLocks noGrp="1"/>
-          </p:cNvSpPr>
-          <p:nvPr>
-            <p:ph type="ftr" sz="quarter" idx="16"/>
-          </p:nvPr>
-        </p:nvSpPr>
-        <p:spPr/>
-        <p:txBody>
-          <a:bodyPr/>
-          <a:lstStyle/>
-          <a:p>
-            <a:r>
-              <a:rPr lang="en-US" smtClean="0"/>
-              <a:t>Copyright © Infineon Technologies AG 2020. All rights reserved.</a:t>
-            </a:r>
-            <a:endParaRPr lang="de-DE" dirty="0"/>
-          </a:p>
-        </p:txBody>
-      </p:sp>
-      <p:sp>
-        <p:nvSpPr>
-          <p:cNvPr id="3" name="Slide Number Placeholder 2"/>
-          <p:cNvSpPr>
-            <a:spLocks noGrp="1"/>
-          </p:cNvSpPr>
-          <p:nvPr>
-            <p:ph type="sldNum" sz="quarter" idx="14"/>
-          </p:nvPr>
-        </p:nvSpPr>
-        <p:spPr/>
-        <p:txBody>
-          <a:bodyPr/>
-          <a:lstStyle/>
-          <a:p>
-            <a:fld id="{97555E91-926B-4C96-90B6-D75C3A27DF23}" type="slidenum">
-              <a:rPr lang="de-DE" smtClean="0"/>
-              <a:pPr/>
-              <a:t>8</a:t>
-            </a:fld>
-            <a:endParaRPr lang="de-DE" dirty="0"/>
-          </a:p>
-        </p:txBody>
-      </p:sp>
-      <p:sp>
-        <p:nvSpPr>
-          <p:cNvPr id="4" name="Title 3"/>
-          <p:cNvSpPr>
-            <a:spLocks noGrp="1"/>
-          </p:cNvSpPr>
-          <p:nvPr>
-            <p:ph type="title"/>
-          </p:nvPr>
-        </p:nvSpPr>
-        <p:spPr/>
-        <p:txBody>
-          <a:bodyPr/>
-          <a:lstStyle/>
-          <a:p>
-            <a:r>
-              <a:rPr lang="de-DE" dirty="0" smtClean="0"/>
-              <a:t>Other </a:t>
-            </a:r>
-            <a:r>
-              <a:rPr lang="de-DE" dirty="0" smtClean="0"/>
-              <a:t>optimizations I made</a:t>
-            </a:r>
-            <a:endParaRPr lang="de-DE" dirty="0"/>
-          </a:p>
-        </p:txBody>
-      </p:sp>
-      <p:sp>
-        <p:nvSpPr>
-          <p:cNvPr id="5" name="Content Placeholder 4"/>
-          <p:cNvSpPr>
-            <a:spLocks noGrp="1"/>
-          </p:cNvSpPr>
-          <p:nvPr>
-            <p:ph sz="quarter" idx="13"/>
-          </p:nvPr>
-        </p:nvSpPr>
-        <p:spPr/>
-        <p:txBody>
-          <a:bodyPr/>
-          <a:lstStyle/>
-          <a:p>
-            <a:r>
-              <a:rPr lang="de-DE" dirty="0" smtClean="0"/>
-              <a:t>Dynamic memory allocation of OpData members for Conv layer</a:t>
-            </a:r>
-            <a:endParaRPr lang="de-DE" dirty="0"/>
-          </a:p>
-        </p:txBody>
-      </p:sp>
-      <p:sp>
-        <p:nvSpPr>
-          <p:cNvPr id="6" name="Date Placeholder 5"/>
-          <p:cNvSpPr>
-            <a:spLocks noGrp="1"/>
-          </p:cNvSpPr>
-          <p:nvPr>
-            <p:ph type="dt" sz="half" idx="15"/>
-          </p:nvPr>
-        </p:nvSpPr>
-        <p:spPr/>
-        <p:txBody>
-          <a:bodyPr/>
-          <a:lstStyle/>
-          <a:p>
-            <a:r>
-              <a:rPr lang="de-DE" smtClean="0"/>
-              <a:t>2020-05-14             </a:t>
-            </a:r>
-            <a:r>
-              <a:rPr lang="de-DE" b="1" smtClean="0"/>
-              <a:t>restricted</a:t>
-            </a:r>
-            <a:endParaRPr lang="de-DE" b="1" dirty="0"/>
-          </a:p>
-        </p:txBody>
-      </p:sp>
-    </p:spTree>
-    <p:extLst>
-      <p:ext uri="{BB962C8B-B14F-4D97-AF65-F5344CB8AC3E}">
-        <p14:creationId xmlns:p14="http://schemas.microsoft.com/office/powerpoint/2010/main" val="1284297645"/>
-      </p:ext>
-    </p:extLst>
-  </p:cSld>
-  <p:clrMapOvr>
-    <a:masterClrMapping/>
-  </p:clrMapOvr>
-</p:sld>
-</file>
-
 <file path=ppt/slides/slide9.xml><?xml version="1.0" encoding="utf-8"?>
 <p:sld xmlns:a="http://schemas.openxmlformats.org/drawingml/2006/main" xmlns:r="http://schemas.openxmlformats.org/officeDocument/2006/relationships" xmlns:p="http://schemas.openxmlformats.org/presentationml/2006/main">
   <p:cSld>
@@ -17009,7 +18156,11 @@
           <a:p>
             <a:r>
               <a:rPr lang="de-DE" dirty="0" smtClean="0"/>
-              <a:t>Benchmarks</a:t>
+              <a:t>All </a:t>
+            </a:r>
+            <a:r>
+              <a:rPr lang="de-DE" dirty="0" smtClean="0"/>
+              <a:t>optimizations I made</a:t>
             </a:r>
             <a:endParaRPr lang="de-DE" dirty="0"/>
           </a:p>
@@ -17030,13 +18181,80 @@
           <a:bodyPr/>
           <a:lstStyle/>
           <a:p>
-            <a:pPr marL="0" indent="0">
-              <a:buNone/>
-            </a:pPr>
             <a:r>
               <a:rPr lang="de-DE" dirty="0" smtClean="0"/>
-              <a:t>TODO</a:t>
-            </a:r>
+              <a:t>Dynamic memory allocation of OpData </a:t>
+            </a:r>
+            <a:r>
+              <a:rPr lang="de-DE" dirty="0" smtClean="0"/>
+              <a:t>members</a:t>
+            </a:r>
+          </a:p>
+          <a:p>
+            <a:r>
+              <a:rPr lang="de-DE" dirty="0" smtClean="0"/>
+              <a:t>Moved CalculateOpData function call to Prepare phase</a:t>
+            </a:r>
+            <a:endParaRPr lang="de-DE" dirty="0" smtClean="0"/>
+          </a:p>
+          <a:p>
+            <a:r>
+              <a:rPr lang="de-DE" dirty="0" smtClean="0"/>
+              <a:t>Precomputation of Sum-of-filters Factor</a:t>
+            </a:r>
+          </a:p>
+          <a:p>
+            <a:r>
+              <a:rPr lang="de-DE" dirty="0" smtClean="0"/>
+              <a:t>Precomputation of Sum-of-inputs Factor (not worth)</a:t>
+            </a:r>
+          </a:p>
+          <a:p>
+            <a:r>
+              <a:rPr lang="de-DE" dirty="0" smtClean="0"/>
+              <a:t>Loop variable optimization</a:t>
+            </a:r>
+          </a:p>
+          <a:p>
+            <a:r>
+              <a:rPr lang="de-DE" dirty="0" smtClean="0"/>
+              <a:t>Using filter consecutivity </a:t>
+            </a:r>
+          </a:p>
+          <a:p>
+            <a:r>
+              <a:rPr lang="de-DE" dirty="0" smtClean="0"/>
+              <a:t>Removing conditional statements </a:t>
+            </a:r>
+            <a:endParaRPr lang="de-DE" dirty="0">
+              <a:sym typeface="Wingdings" panose="05000000000000000000" pitchFamily="2" charset="2"/>
+            </a:endParaRPr>
+          </a:p>
+          <a:p>
+            <a:pPr lvl="2"/>
+            <a:r>
+              <a:rPr lang="de-DE" dirty="0" smtClean="0">
+                <a:sym typeface="Wingdings" panose="05000000000000000000" pitchFamily="2" charset="2"/>
+              </a:rPr>
+              <a:t>Causes problems if dilation factor is not 1</a:t>
+            </a:r>
+          </a:p>
+          <a:p>
+            <a:pPr lvl="2"/>
+            <a:r>
+              <a:rPr lang="de-DE" dirty="0" smtClean="0">
+                <a:sym typeface="Wingdings" panose="05000000000000000000" pitchFamily="2" charset="2"/>
+              </a:rPr>
+              <a:t> If dilation factor is not one, reference implementation is used</a:t>
+            </a:r>
+            <a:endParaRPr lang="de-DE" dirty="0" smtClean="0">
+              <a:sym typeface="Wingdings" panose="05000000000000000000" pitchFamily="2" charset="2"/>
+            </a:endParaRPr>
+          </a:p>
+          <a:p>
+            <a:endParaRPr lang="de-DE" dirty="0" smtClean="0"/>
+          </a:p>
+          <a:p>
             <a:endParaRPr lang="de-DE" dirty="0"/>
           </a:p>
         </p:txBody>
@@ -17071,7 +18289,7 @@
     </p:spTree>
     <p:extLst>
       <p:ext uri="{BB962C8B-B14F-4D97-AF65-F5344CB8AC3E}">
-        <p14:creationId xmlns:p14="http://schemas.microsoft.com/office/powerpoint/2010/main" val="2060626036"/>
+        <p14:creationId xmlns:p14="http://schemas.microsoft.com/office/powerpoint/2010/main" val="1284297645"/>
       </p:ext>
     </p:extLst>
   </p:cSld>
@@ -17868,16 +19086,35 @@
 </file>
 
 <file path=customXml/item2.xml><?xml version="1.0" encoding="utf-8"?>
-<ct:contentTypeSchema xmlns:ct="http://schemas.microsoft.com/office/2006/metadata/contentType" xmlns:ma="http://schemas.microsoft.com/office/2006/metadata/properties/metaAttributes" ct:_="" ma:_="" ma:contentTypeName="Document" ma:contentTypeID="0x0101004D9AADCFE3553C468B49D9321F68C9B4" ma:contentTypeVersion="1" ma:contentTypeDescription="Create a new document." ma:contentTypeScope="" ma:versionID="c1938d2157578a9de987048eaba51acb">
-  <xsd:schema xmlns:xsd="http://www.w3.org/2001/XMLSchema" xmlns:xs="http://www.w3.org/2001/XMLSchema" xmlns:p="http://schemas.microsoft.com/office/2006/metadata/properties" xmlns:ns2="3fc2b1c9-6e47-482a-bbfa-32c294909efa" targetNamespace="http://schemas.microsoft.com/office/2006/metadata/properties" ma:root="true" ma:fieldsID="12a7820e62e35f111912cd81cc305268" ns2:_="">
-    <xsd:import namespace="3fc2b1c9-6e47-482a-bbfa-32c294909efa"/>
+<p:properties xmlns:p="http://schemas.microsoft.com/office/2006/metadata/properties" xmlns:xsi="http://www.w3.org/2001/XMLSchema-instance" xmlns:pc="http://schemas.microsoft.com/office/infopath/2007/PartnerControls">
+  <documentManagement>
+    <Ver xmlns="a709603d-609a-478b-a91d-3c5e984c0e79">0</Ver>
+  </documentManagement>
+</p:properties>
+</file>
+
+<file path=customXml/item3.xml><?xml version="1.0" encoding="utf-8"?>
+<?mso-contentType ?>
+<FormTemplates xmlns="http://schemas.microsoft.com/sharepoint/v3/contenttype/forms">
+  <Display>DocumentLibraryForm</Display>
+  <Edit>DocumentLibraryForm</Edit>
+  <New>DocumentLibraryForm</New>
+</FormTemplates>
+</file>
+
+<file path=customXml/item4.xml><?xml version="1.0" encoding="utf-8"?>
+<ct:contentTypeSchema xmlns:ct="http://schemas.microsoft.com/office/2006/metadata/contentType" xmlns:ma="http://schemas.microsoft.com/office/2006/metadata/properties/metaAttributes" ct:_="" ma:_="" ma:contentTypeName="Document" ma:contentTypeID="0x010100A655AAE9148B404486CBFDD74AD2AA0B" ma:contentTypeVersion="2" ma:contentTypeDescription="Create a new document." ma:contentTypeScope="" ma:versionID="a24cc1775e4f53b56bd6bf310015a115">
+  <xsd:schema xmlns:xsd="http://www.w3.org/2001/XMLSchema" xmlns:xs="http://www.w3.org/2001/XMLSchema" xmlns:p="http://schemas.microsoft.com/office/2006/metadata/properties" xmlns:ns2="a709603d-609a-478b-a91d-3c5e984c0e79" xmlns:ns3="6ef45842-284e-44e4-b2db-1749e7948b44" targetNamespace="http://schemas.microsoft.com/office/2006/metadata/properties" ma:root="true" ma:fieldsID="f8923fe8aa0ace7ab58ef4ccc8b43a85" ns2:_="" ns3:_="">
+    <xsd:import namespace="a709603d-609a-478b-a91d-3c5e984c0e79"/>
+    <xsd:import namespace="6ef45842-284e-44e4-b2db-1749e7948b44"/>
     <xsd:element name="properties">
       <xsd:complexType>
         <xsd:sequence>
           <xsd:element name="documentManagement">
             <xsd:complexType>
               <xsd:all>
-                <xsd:element ref="ns2:SharedWithUsers" minOccurs="0"/>
+                <xsd:element ref="ns2:Ver" minOccurs="0"/>
+                <xsd:element ref="ns3:SharedWithUsers" minOccurs="0"/>
               </xsd:all>
             </xsd:complexType>
           </xsd:element>
@@ -17885,10 +19122,19 @@
       </xsd:complexType>
     </xsd:element>
   </xsd:schema>
-  <xsd:schema xmlns:xsd="http://www.w3.org/2001/XMLSchema" xmlns:xs="http://www.w3.org/2001/XMLSchema" xmlns:dms="http://schemas.microsoft.com/office/2006/documentManagement/types" xmlns:pc="http://schemas.microsoft.com/office/infopath/2007/PartnerControls" targetNamespace="3fc2b1c9-6e47-482a-bbfa-32c294909efa" elementFormDefault="qualified">
+  <xsd:schema xmlns:xsd="http://www.w3.org/2001/XMLSchema" xmlns:xs="http://www.w3.org/2001/XMLSchema" xmlns:dms="http://schemas.microsoft.com/office/2006/documentManagement/types" xmlns:pc="http://schemas.microsoft.com/office/infopath/2007/PartnerControls" targetNamespace="a709603d-609a-478b-a91d-3c5e984c0e79" elementFormDefault="qualified">
     <xsd:import namespace="http://schemas.microsoft.com/office/2006/documentManagement/types"/>
     <xsd:import namespace="http://schemas.microsoft.com/office/infopath/2007/PartnerControls"/>
-    <xsd:element name="SharedWithUsers" ma:index="8" nillable="true" ma:displayName="Shared With" ma:description="" ma:internalName="SharedWithUsers" ma:readOnly="true">
+    <xsd:element name="Ver" ma:index="8" nillable="true" ma:displayName="Ver" ma:default="0" ma:internalName="Ver" ma:percentage="FALSE">
+      <xsd:simpleType>
+        <xsd:restriction base="dms:Number"/>
+      </xsd:simpleType>
+    </xsd:element>
+  </xsd:schema>
+  <xsd:schema xmlns:xsd="http://www.w3.org/2001/XMLSchema" xmlns:xs="http://www.w3.org/2001/XMLSchema" xmlns:dms="http://schemas.microsoft.com/office/2006/documentManagement/types" xmlns:pc="http://schemas.microsoft.com/office/infopath/2007/PartnerControls" targetNamespace="6ef45842-284e-44e4-b2db-1749e7948b44" elementFormDefault="qualified">
+    <xsd:import namespace="http://schemas.microsoft.com/office/2006/documentManagement/types"/>
+    <xsd:import namespace="http://schemas.microsoft.com/office/infopath/2007/PartnerControls"/>
+    <xsd:element name="SharedWithUsers" ma:index="9" nillable="true" ma:displayName="Shared With" ma:description="" ma:internalName="SharedWithUsers" ma:readOnly="true">
       <xsd:complexType>
         <xsd:complexContent>
           <xsd:extension base="dms:UserMulti">
@@ -18007,21 +19253,6 @@
 </ct:contentTypeSchema>
 </file>
 
-<file path=customXml/item3.xml><?xml version="1.0" encoding="utf-8"?>
-<?mso-contentType ?>
-<FormTemplates xmlns="http://schemas.microsoft.com/sharepoint/v3/contenttype/forms">
-  <Display>DocumentLibraryForm</Display>
-  <Edit>DocumentLibraryForm</Edit>
-  <New>DocumentLibraryForm</New>
-</FormTemplates>
-</file>
-
-<file path=customXml/item4.xml><?xml version="1.0" encoding="utf-8"?>
-<p:properties xmlns:p="http://schemas.microsoft.com/office/2006/metadata/properties" xmlns:xsi="http://www.w3.org/2001/XMLSchema-instance" xmlns:pc="http://schemas.microsoft.com/office/infopath/2007/PartnerControls">
-  <documentManagement/>
-</p:properties>
-</file>
-
 <file path=customXml/itemProps1.xml><?xml version="1.0" encoding="utf-8"?>
 <ds:datastoreItem xmlns:ds="http://schemas.openxmlformats.org/officeDocument/2006/customXml" ds:itemID="{42931CA0-ADA0-422F-95DD-3CEB1C4304AE}">
   <ds:schemaRefs>
@@ -18031,18 +19262,6 @@
 </file>
 
 <file path=customXml/itemProps2.xml><?xml version="1.0" encoding="utf-8"?>
-<ds:datastoreItem xmlns:ds="http://schemas.openxmlformats.org/officeDocument/2006/customXml" ds:itemID="{43344E84-8535-4D58-815C-0B1746F653E8}"/>
-</file>
-
-<file path=customXml/itemProps3.xml><?xml version="1.0" encoding="utf-8"?>
-<ds:datastoreItem xmlns:ds="http://schemas.openxmlformats.org/officeDocument/2006/customXml" ds:itemID="{E19D554A-3A13-4E39-9B94-AB61644E2C9C}">
-  <ds:schemaRefs>
-    <ds:schemaRef ds:uri="http://schemas.microsoft.com/sharepoint/v3/contenttype/forms"/>
-  </ds:schemaRefs>
-</ds:datastoreItem>
-</file>
-
-<file path=customXml/itemProps4.xml><?xml version="1.0" encoding="utf-8"?>
 <ds:datastoreItem xmlns:ds="http://schemas.openxmlformats.org/officeDocument/2006/customXml" ds:itemID="{7BF5F9EF-BF04-400B-80E2-C3F54555D94E}">
   <ds:schemaRefs>
     <ds:schemaRef ds:uri="a709603d-609a-478b-a91d-3c5e984c0e79"/>
@@ -18057,4 +19276,31 @@
     <ds:schemaRef ds:uri="http://schemas.microsoft.com/office/2006/metadata/properties"/>
   </ds:schemaRefs>
 </ds:datastoreItem>
+</file>
+
+<file path=customXml/itemProps3.xml><?xml version="1.0" encoding="utf-8"?>
+<ds:datastoreItem xmlns:ds="http://schemas.openxmlformats.org/officeDocument/2006/customXml" ds:itemID="{E19D554A-3A13-4E39-9B94-AB61644E2C9C}">
+  <ds:schemaRefs>
+    <ds:schemaRef ds:uri="http://schemas.microsoft.com/sharepoint/v3/contenttype/forms"/>
+  </ds:schemaRefs>
+</ds:datastoreItem>
+</file>
+
+<file path=customXml/itemProps4.xml><?xml version="1.0" encoding="utf-8"?>
+<ds:datastoreItem xmlns:ds="http://schemas.openxmlformats.org/officeDocument/2006/customXml" ds:itemID="{5F931CDF-BDCC-468C-84F4-7D8E1215CB18}">
+  <ds:schemaRefs>
+    <ds:schemaRef ds:uri="http://schemas.microsoft.com/office/2006/metadata/contentType"/>
+    <ds:schemaRef ds:uri="http://schemas.microsoft.com/office/2006/metadata/properties/metaAttributes"/>
+    <ds:schemaRef ds:uri="http://www.w3.org/2001/XMLSchema"/>
+    <ds:schemaRef ds:uri="http://schemas.microsoft.com/office/2006/metadata/properties"/>
+    <ds:schemaRef ds:uri="a709603d-609a-478b-a91d-3c5e984c0e79"/>
+    <ds:schemaRef ds:uri="6ef45842-284e-44e4-b2db-1749e7948b44"/>
+    <ds:schemaRef ds:uri="http://schemas.microsoft.com/office/2006/documentManagement/types"/>
+    <ds:schemaRef ds:uri="http://schemas.microsoft.com/office/infopath/2007/PartnerControls"/>
+    <ds:schemaRef ds:uri="http://schemas.openxmlformats.org/package/2006/metadata/core-properties"/>
+    <ds:schemaRef ds:uri="http://purl.org/dc/elements/1.1/"/>
+    <ds:schemaRef ds:uri="http://purl.org/dc/terms/"/>
+    <ds:schemaRef ds:uri="http://schemas.microsoft.com/internal/obd"/>
+  </ds:schemaRefs>
+</ds:datastoreItem>
 </file>
</xml_diff>

<commit_message>
Added performance tests for padding implementations and adjusted documentation
</commit_message>
<xml_diff>
--- a/ifx_docu/NN Kernels/NN Kernels - Conv layer.pptx
+++ b/ifx_docu/NN Kernels/NN Kernels - Conv layer.pptx
@@ -5,10 +5,10 @@
     <p:sldMasterId id="2147483715" r:id="rId5"/>
   </p:sldMasterIdLst>
   <p:notesMasterIdLst>
-    <p:notesMasterId r:id="rId20"/>
+    <p:notesMasterId r:id="rId22"/>
   </p:notesMasterIdLst>
   <p:handoutMasterIdLst>
-    <p:handoutMasterId r:id="rId21"/>
+    <p:handoutMasterId r:id="rId23"/>
   </p:handoutMasterIdLst>
   <p:sldIdLst>
     <p:sldId id="318" r:id="rId6"/>
@@ -24,12 +24,14 @@
     <p:sldId id="337" r:id="rId16"/>
     <p:sldId id="336" r:id="rId17"/>
     <p:sldId id="339" r:id="rId18"/>
-    <p:sldId id="324" r:id="rId19"/>
+    <p:sldId id="340" r:id="rId19"/>
+    <p:sldId id="341" r:id="rId20"/>
+    <p:sldId id="324" r:id="rId21"/>
   </p:sldIdLst>
   <p:sldSz cx="9144000" cy="6858000" type="screen4x3"/>
   <p:notesSz cx="7099300" cy="10234613"/>
   <p:custDataLst>
-    <p:tags r:id="rId22"/>
+    <p:tags r:id="rId24"/>
   </p:custDataLst>
   <p:defaultTextStyle>
     <a:defPPr>
@@ -1321,7 +1323,7 @@
                 <a:cs typeface="Arial" panose="020B0604020202020204" pitchFamily="34" charset="0"/>
               </a:rPr>
               <a:pPr/>
-              <a:t>14</a:t>
+              <a:t>16</a:t>
             </a:fld>
             <a:endParaRPr lang="en-US">
               <a:latin typeface="Arial" panose="020B0604020202020204" pitchFamily="34" charset="0"/>
@@ -11028,15 +11030,7 @@
           <a:p>
             <a:r>
               <a:rPr lang="de-DE" dirty="0" smtClean="0"/>
-              <a:t>Convolutional </a:t>
-            </a:r>
-            <a:r>
-              <a:rPr lang="de-DE" dirty="0" smtClean="0"/>
-              <a:t>layers </a:t>
-            </a:r>
-            <a:r>
-              <a:rPr lang="de-DE" dirty="0" smtClean="0"/>
-              <a:t>optimization (Work in progress)</a:t>
+              <a:t>Convolutional layers optimization (Work in progress)</a:t>
             </a:r>
             <a:endParaRPr lang="de-DE" dirty="0"/>
           </a:p>
@@ -11432,11 +11426,6 @@
               </a:rPr>
               <a:t>Remove Conditionals (nocond)</a:t>
             </a:r>
-            <a:endParaRPr lang="de-DE" sz="1100" kern="0" dirty="0" smtClean="0">
-              <a:latin typeface="Arial" panose="020B0604020202020204" pitchFamily="34" charset="0"/>
-              <a:ea typeface="Verdana" pitchFamily="34" charset="0"/>
-              <a:cs typeface="Arial" panose="020B0604020202020204" pitchFamily="34" charset="0"/>
-            </a:endParaRPr>
           </a:p>
         </p:txBody>
       </p:sp>
@@ -11493,14 +11482,6 @@
               </a:rPr>
               <a:t>On host computer</a:t>
             </a:r>
-            <a:endParaRPr lang="de-DE" sz="1400" kern="0" dirty="0" smtClean="0">
-              <a:solidFill>
-                <a:srgbClr val="FF0000"/>
-              </a:solidFill>
-              <a:latin typeface="Arial" panose="020B0604020202020204" pitchFamily="34" charset="0"/>
-              <a:ea typeface="Verdana" pitchFamily="34" charset="0"/>
-              <a:cs typeface="Arial" panose="020B0604020202020204" pitchFamily="34" charset="0"/>
-            </a:endParaRPr>
           </a:p>
         </p:txBody>
       </p:sp>
@@ -11830,11 +11811,6 @@
               </a:rPr>
               <a:t>Remove Conditionals (nocond)</a:t>
             </a:r>
-            <a:endParaRPr lang="de-DE" sz="1100" kern="0" dirty="0" smtClean="0">
-              <a:latin typeface="Arial" panose="020B0604020202020204" pitchFamily="34" charset="0"/>
-              <a:ea typeface="Verdana" pitchFamily="34" charset="0"/>
-              <a:cs typeface="Arial" panose="020B0604020202020204" pitchFamily="34" charset="0"/>
-            </a:endParaRPr>
           </a:p>
         </p:txBody>
       </p:sp>
@@ -11891,14 +11867,6 @@
               </a:rPr>
               <a:t>On host computer</a:t>
             </a:r>
-            <a:endParaRPr lang="de-DE" sz="1400" kern="0" dirty="0" smtClean="0">
-              <a:solidFill>
-                <a:srgbClr val="FF0000"/>
-              </a:solidFill>
-              <a:latin typeface="Arial" panose="020B0604020202020204" pitchFamily="34" charset="0"/>
-              <a:ea typeface="Verdana" pitchFamily="34" charset="0"/>
-              <a:cs typeface="Arial" panose="020B0604020202020204" pitchFamily="34" charset="0"/>
-            </a:endParaRPr>
           </a:p>
         </p:txBody>
       </p:sp>
@@ -12038,7 +12006,7 @@
           <p:nvPr>
             <p:extLst>
               <p:ext uri="{D42A27DB-BD31-4B8C-83A1-F6EECF244321}">
-                <p14:modId xmlns:p14="http://schemas.microsoft.com/office/powerpoint/2010/main" val="2260692950"/>
+                <p14:modId xmlns:p14="http://schemas.microsoft.com/office/powerpoint/2010/main" val="3116290332"/>
               </p:ext>
             </p:extLst>
           </p:nvPr>
@@ -12147,7 +12115,7 @@
                     <a:p>
                       <a:r>
                         <a:rPr lang="de-DE" dirty="0" smtClean="0"/>
-                        <a:t>7360</a:t>
+                        <a:t>3278</a:t>
                       </a:r>
                       <a:endParaRPr lang="de-DE" dirty="0"/>
                     </a:p>
@@ -12161,7 +12129,7 @@
                     <a:p>
                       <a:r>
                         <a:rPr lang="de-DE" dirty="0" smtClean="0"/>
-                        <a:t>1187</a:t>
+                        <a:t>974</a:t>
                       </a:r>
                       <a:endParaRPr lang="de-DE" dirty="0"/>
                     </a:p>
@@ -12187,13 +12155,13 @@
           <p:nvPr>
             <p:extLst>
               <p:ext uri="{D42A27DB-BD31-4B8C-83A1-F6EECF244321}">
-                <p14:modId xmlns:p14="http://schemas.microsoft.com/office/powerpoint/2010/main" val="532712159"/>
+                <p14:modId xmlns:p14="http://schemas.microsoft.com/office/powerpoint/2010/main" val="3575441162"/>
               </p:ext>
             </p:extLst>
           </p:nvPr>
         </p:nvGraphicFramePr>
         <p:xfrm>
-          <a:off x="1524000" y="2745140"/>
+          <a:off x="1524000" y="2420888"/>
           <a:ext cx="6096000" cy="741680"/>
         </p:xfrm>
         <a:graphic>
@@ -12296,7 +12264,7 @@
                     <a:p>
                       <a:r>
                         <a:rPr lang="de-DE" dirty="0" smtClean="0"/>
-                        <a:t>7053</a:t>
+                        <a:t>3602</a:t>
                       </a:r>
                       <a:endParaRPr lang="de-DE" dirty="0"/>
                     </a:p>
@@ -12310,7 +12278,7 @@
                     <a:p>
                       <a:r>
                         <a:rPr lang="de-DE" dirty="0" smtClean="0"/>
-                        <a:t>1306</a:t>
+                        <a:t>1020</a:t>
                       </a:r>
                       <a:endParaRPr lang="de-DE" dirty="0"/>
                     </a:p>
@@ -12327,6 +12295,362 @@
           </a:graphicData>
         </a:graphic>
       </p:graphicFrame>
+      <p:graphicFrame>
+        <p:nvGraphicFramePr>
+          <p:cNvPr id="8" name="Table 7"/>
+          <p:cNvGraphicFramePr>
+            <a:graphicFrameLocks noGrp="1"/>
+          </p:cNvGraphicFramePr>
+          <p:nvPr>
+            <p:extLst>
+              <p:ext uri="{D42A27DB-BD31-4B8C-83A1-F6EECF244321}">
+                <p14:modId xmlns:p14="http://schemas.microsoft.com/office/powerpoint/2010/main" val="3444405857"/>
+              </p:ext>
+            </p:extLst>
+          </p:nvPr>
+        </p:nvGraphicFramePr>
+        <p:xfrm>
+          <a:off x="1524000" y="4061296"/>
+          <a:ext cx="6096000" cy="741680"/>
+        </p:xfrm>
+        <a:graphic>
+          <a:graphicData uri="http://schemas.openxmlformats.org/drawingml/2006/table">
+            <a:tbl>
+              <a:tblPr firstRow="1" bandRow="1">
+                <a:tableStyleId>{5C22544A-7EE6-4342-B048-85BDC9FD1C3A}</a:tableStyleId>
+              </a:tblPr>
+              <a:tblGrid>
+                <a:gridCol w="2032000">
+                  <a:extLst>
+                    <a:ext uri="{9D8B030D-6E8A-4147-A177-3AD203B41FA5}">
+                      <a16:colId xmlns:a16="http://schemas.microsoft.com/office/drawing/2014/main" val="3730919925"/>
+                    </a:ext>
+                  </a:extLst>
+                </a:gridCol>
+                <a:gridCol w="2032000">
+                  <a:extLst>
+                    <a:ext uri="{9D8B030D-6E8A-4147-A177-3AD203B41FA5}">
+                      <a16:colId xmlns:a16="http://schemas.microsoft.com/office/drawing/2014/main" val="1304653223"/>
+                    </a:ext>
+                  </a:extLst>
+                </a:gridCol>
+                <a:gridCol w="2032000">
+                  <a:extLst>
+                    <a:ext uri="{9D8B030D-6E8A-4147-A177-3AD203B41FA5}">
+                      <a16:colId xmlns:a16="http://schemas.microsoft.com/office/drawing/2014/main" val="581916988"/>
+                    </a:ext>
+                  </a:extLst>
+                </a:gridCol>
+              </a:tblGrid>
+              <a:tr h="370840">
+                <a:tc>
+                  <a:txBody>
+                    <a:bodyPr/>
+                    <a:lstStyle/>
+                    <a:p>
+                      <a:r>
+                        <a:rPr lang="de-DE" dirty="0" smtClean="0"/>
+                        <a:t>UInt8</a:t>
+                      </a:r>
+                      <a:endParaRPr lang="de-DE" dirty="0"/>
+                    </a:p>
+                  </a:txBody>
+                  <a:tcPr/>
+                </a:tc>
+                <a:tc>
+                  <a:txBody>
+                    <a:bodyPr/>
+                    <a:lstStyle/>
+                    <a:p>
+                      <a:r>
+                        <a:rPr lang="de-DE" dirty="0" smtClean="0"/>
+                        <a:t>Reference</a:t>
+                      </a:r>
+                      <a:endParaRPr lang="de-DE" dirty="0"/>
+                    </a:p>
+                  </a:txBody>
+                  <a:tcPr/>
+                </a:tc>
+                <a:tc>
+                  <a:txBody>
+                    <a:bodyPr/>
+                    <a:lstStyle/>
+                    <a:p>
+                      <a:r>
+                        <a:rPr lang="de-DE" dirty="0" smtClean="0"/>
+                        <a:t>Port. Optimized</a:t>
+                      </a:r>
+                      <a:endParaRPr lang="de-DE" dirty="0"/>
+                    </a:p>
+                  </a:txBody>
+                  <a:tcPr/>
+                </a:tc>
+                <a:extLst>
+                  <a:ext uri="{0D108BD9-81ED-4DB2-BD59-A6C34878D82A}">
+                    <a16:rowId xmlns:a16="http://schemas.microsoft.com/office/drawing/2014/main" val="2447228543"/>
+                  </a:ext>
+                </a:extLst>
+              </a:tr>
+              <a:tr h="370840">
+                <a:tc>
+                  <a:txBody>
+                    <a:bodyPr/>
+                    <a:lstStyle/>
+                    <a:p>
+                      <a:r>
+                        <a:rPr lang="de-DE" dirty="0" smtClean="0"/>
+                        <a:t>Avg Time</a:t>
+                      </a:r>
+                      <a:endParaRPr lang="de-DE" dirty="0"/>
+                    </a:p>
+                  </a:txBody>
+                  <a:tcPr/>
+                </a:tc>
+                <a:tc>
+                  <a:txBody>
+                    <a:bodyPr/>
+                    <a:lstStyle/>
+                    <a:p>
+                      <a:r>
+                        <a:rPr lang="de-DE" dirty="0" smtClean="0"/>
+                        <a:t>3006</a:t>
+                      </a:r>
+                      <a:endParaRPr lang="de-DE" dirty="0"/>
+                    </a:p>
+                  </a:txBody>
+                  <a:tcPr/>
+                </a:tc>
+                <a:tc>
+                  <a:txBody>
+                    <a:bodyPr/>
+                    <a:lstStyle/>
+                    <a:p>
+                      <a:r>
+                        <a:rPr lang="de-DE" dirty="0" smtClean="0"/>
+                        <a:t>1229</a:t>
+                      </a:r>
+                      <a:endParaRPr lang="de-DE" dirty="0"/>
+                    </a:p>
+                  </a:txBody>
+                  <a:tcPr/>
+                </a:tc>
+                <a:extLst>
+                  <a:ext uri="{0D108BD9-81ED-4DB2-BD59-A6C34878D82A}">
+                    <a16:rowId xmlns:a16="http://schemas.microsoft.com/office/drawing/2014/main" val="1962285556"/>
+                  </a:ext>
+                </a:extLst>
+              </a:tr>
+            </a:tbl>
+          </a:graphicData>
+        </a:graphic>
+      </p:graphicFrame>
+      <p:graphicFrame>
+        <p:nvGraphicFramePr>
+          <p:cNvPr id="10" name="Table 9"/>
+          <p:cNvGraphicFramePr>
+            <a:graphicFrameLocks noGrp="1"/>
+          </p:cNvGraphicFramePr>
+          <p:nvPr>
+            <p:extLst>
+              <p:ext uri="{D42A27DB-BD31-4B8C-83A1-F6EECF244321}">
+                <p14:modId xmlns:p14="http://schemas.microsoft.com/office/powerpoint/2010/main" val="674706391"/>
+              </p:ext>
+            </p:extLst>
+          </p:nvPr>
+        </p:nvGraphicFramePr>
+        <p:xfrm>
+          <a:off x="1524000" y="5085184"/>
+          <a:ext cx="6096000" cy="741680"/>
+        </p:xfrm>
+        <a:graphic>
+          <a:graphicData uri="http://schemas.openxmlformats.org/drawingml/2006/table">
+            <a:tbl>
+              <a:tblPr firstRow="1" bandRow="1">
+                <a:tableStyleId>{5C22544A-7EE6-4342-B048-85BDC9FD1C3A}</a:tableStyleId>
+              </a:tblPr>
+              <a:tblGrid>
+                <a:gridCol w="2032000">
+                  <a:extLst>
+                    <a:ext uri="{9D8B030D-6E8A-4147-A177-3AD203B41FA5}">
+                      <a16:colId xmlns:a16="http://schemas.microsoft.com/office/drawing/2014/main" val="3730919925"/>
+                    </a:ext>
+                  </a:extLst>
+                </a:gridCol>
+                <a:gridCol w="2032000">
+                  <a:extLst>
+                    <a:ext uri="{9D8B030D-6E8A-4147-A177-3AD203B41FA5}">
+                      <a16:colId xmlns:a16="http://schemas.microsoft.com/office/drawing/2014/main" val="1304653223"/>
+                    </a:ext>
+                  </a:extLst>
+                </a:gridCol>
+                <a:gridCol w="2032000">
+                  <a:extLst>
+                    <a:ext uri="{9D8B030D-6E8A-4147-A177-3AD203B41FA5}">
+                      <a16:colId xmlns:a16="http://schemas.microsoft.com/office/drawing/2014/main" val="581916988"/>
+                    </a:ext>
+                  </a:extLst>
+                </a:gridCol>
+              </a:tblGrid>
+              <a:tr h="370840">
+                <a:tc>
+                  <a:txBody>
+                    <a:bodyPr/>
+                    <a:lstStyle/>
+                    <a:p>
+                      <a:r>
+                        <a:rPr lang="de-DE" dirty="0" smtClean="0"/>
+                        <a:t>Int8</a:t>
+                      </a:r>
+                      <a:endParaRPr lang="de-DE" dirty="0"/>
+                    </a:p>
+                  </a:txBody>
+                  <a:tcPr/>
+                </a:tc>
+                <a:tc>
+                  <a:txBody>
+                    <a:bodyPr/>
+                    <a:lstStyle/>
+                    <a:p>
+                      <a:r>
+                        <a:rPr lang="de-DE" dirty="0" smtClean="0"/>
+                        <a:t>Reference</a:t>
+                      </a:r>
+                      <a:endParaRPr lang="de-DE" dirty="0"/>
+                    </a:p>
+                  </a:txBody>
+                  <a:tcPr/>
+                </a:tc>
+                <a:tc>
+                  <a:txBody>
+                    <a:bodyPr/>
+                    <a:lstStyle/>
+                    <a:p>
+                      <a:r>
+                        <a:rPr lang="de-DE" dirty="0" smtClean="0"/>
+                        <a:t>Port. Optimized</a:t>
+                      </a:r>
+                      <a:endParaRPr lang="de-DE" dirty="0"/>
+                    </a:p>
+                  </a:txBody>
+                  <a:tcPr/>
+                </a:tc>
+                <a:extLst>
+                  <a:ext uri="{0D108BD9-81ED-4DB2-BD59-A6C34878D82A}">
+                    <a16:rowId xmlns:a16="http://schemas.microsoft.com/office/drawing/2014/main" val="2447228543"/>
+                  </a:ext>
+                </a:extLst>
+              </a:tr>
+              <a:tr h="370840">
+                <a:tc>
+                  <a:txBody>
+                    <a:bodyPr/>
+                    <a:lstStyle/>
+                    <a:p>
+                      <a:r>
+                        <a:rPr lang="de-DE" dirty="0" smtClean="0"/>
+                        <a:t>Avg Time</a:t>
+                      </a:r>
+                      <a:endParaRPr lang="de-DE" dirty="0"/>
+                    </a:p>
+                  </a:txBody>
+                  <a:tcPr/>
+                </a:tc>
+                <a:tc>
+                  <a:txBody>
+                    <a:bodyPr/>
+                    <a:lstStyle/>
+                    <a:p>
+                      <a:r>
+                        <a:rPr lang="de-DE" dirty="0" smtClean="0"/>
+                        <a:t>3364</a:t>
+                      </a:r>
+                      <a:endParaRPr lang="de-DE" dirty="0"/>
+                    </a:p>
+                  </a:txBody>
+                  <a:tcPr/>
+                </a:tc>
+                <a:tc>
+                  <a:txBody>
+                    <a:bodyPr/>
+                    <a:lstStyle/>
+                    <a:p>
+                      <a:r>
+                        <a:rPr lang="de-DE" dirty="0" smtClean="0"/>
+                        <a:t>1089</a:t>
+                      </a:r>
+                      <a:endParaRPr lang="de-DE" dirty="0"/>
+                    </a:p>
+                  </a:txBody>
+                  <a:tcPr/>
+                </a:tc>
+                <a:extLst>
+                  <a:ext uri="{0D108BD9-81ED-4DB2-BD59-A6C34878D82A}">
+                    <a16:rowId xmlns:a16="http://schemas.microsoft.com/office/drawing/2014/main" val="1962285556"/>
+                  </a:ext>
+                </a:extLst>
+              </a:tr>
+            </a:tbl>
+          </a:graphicData>
+        </a:graphic>
+      </p:graphicFrame>
+      <p:sp>
+        <p:nvSpPr>
+          <p:cNvPr id="5" name="TextBox 4"/>
+          <p:cNvSpPr txBox="1"/>
+          <p:nvPr/>
+        </p:nvSpPr>
+        <p:spPr bwMode="auto">
+          <a:xfrm>
+            <a:off x="899592" y="3640589"/>
+            <a:ext cx="4219104" cy="276999"/>
+          </a:xfrm>
+          <a:prstGeom prst="rect">
+            <a:avLst/>
+          </a:prstGeom>
+          <a:noFill/>
+          <a:ln w="9525">
+            <a:noFill/>
+            <a:miter lim="800000"/>
+            <a:headEnd/>
+            <a:tailEnd/>
+          </a:ln>
+          <a:effectLst/>
+        </p:spPr>
+        <p:txBody>
+          <a:bodyPr wrap="none" lIns="0" tIns="0" rIns="0" bIns="0" rtlCol="0" anchor="ctr" anchorCtr="0">
+            <a:spAutoFit/>
+          </a:bodyPr>
+          <a:lstStyle/>
+          <a:p>
+            <a:pPr marR="0" defTabSz="914400" eaLnBrk="0" fontAlgn="auto" latinLnBrk="0" hangingPunct="0">
+              <a:spcBef>
+                <a:spcPts val="0"/>
+              </a:spcBef>
+              <a:spcAft>
+                <a:spcPts val="300"/>
+              </a:spcAft>
+              <a:buClr>
+                <a:schemeClr val="accent1"/>
+              </a:buClr>
+              <a:buSzTx/>
+              <a:tabLst/>
+            </a:pPr>
+            <a:r>
+              <a:rPr lang="de-DE" sz="1800" kern="0" dirty="0" smtClean="0">
+                <a:latin typeface="Arial" panose="020B0604020202020204" pitchFamily="34" charset="0"/>
+                <a:ea typeface="Verdana" pitchFamily="34" charset="0"/>
+                <a:cs typeface="Arial" panose="020B0604020202020204" pitchFamily="34" charset="0"/>
+              </a:rPr>
+              <a:t>With Padding (different values as above):</a:t>
+            </a:r>
+            <a:endParaRPr lang="de-DE" sz="1800" kern="0" dirty="0" smtClean="0">
+              <a:latin typeface="Arial" panose="020B0604020202020204" pitchFamily="34" charset="0"/>
+              <a:ea typeface="Verdana" pitchFamily="34" charset="0"/>
+              <a:cs typeface="Arial" panose="020B0604020202020204" pitchFamily="34" charset="0"/>
+            </a:endParaRPr>
+          </a:p>
+        </p:txBody>
+      </p:sp>
     </p:spTree>
     <p:extLst>
       <p:ext uri="{BB962C8B-B14F-4D97-AF65-F5344CB8AC3E}">
@@ -12417,6 +12741,2866 @@
 </file>
 
 <file path=ppt/slides/slide14.xml><?xml version="1.0" encoding="utf-8"?>
+<p:sld xmlns:a="http://schemas.openxmlformats.org/drawingml/2006/main" xmlns:r="http://schemas.openxmlformats.org/officeDocument/2006/relationships" xmlns:p="http://schemas.openxmlformats.org/presentationml/2006/main">
+  <p:cSld>
+    <p:spTree>
+      <p:nvGrpSpPr>
+        <p:cNvPr id="1" name=""/>
+        <p:cNvGrpSpPr/>
+        <p:nvPr/>
+      </p:nvGrpSpPr>
+      <p:grpSpPr>
+        <a:xfrm>
+          <a:off x="0" y="0"/>
+          <a:ext cx="0" cy="0"/>
+          <a:chOff x="0" y="0"/>
+          <a:chExt cx="0" cy="0"/>
+        </a:xfrm>
+      </p:grpSpPr>
+      <p:sp>
+        <p:nvSpPr>
+          <p:cNvPr id="2" name="Footer Placeholder 1"/>
+          <p:cNvSpPr>
+            <a:spLocks noGrp="1"/>
+          </p:cNvSpPr>
+          <p:nvPr>
+            <p:ph type="ftr" sz="quarter" idx="16"/>
+          </p:nvPr>
+        </p:nvSpPr>
+        <p:spPr/>
+        <p:txBody>
+          <a:bodyPr/>
+          <a:lstStyle/>
+          <a:p>
+            <a:r>
+              <a:rPr lang="en-US" smtClean="0"/>
+              <a:t>Copyright © Infineon Technologies AG 2020. All rights reserved.</a:t>
+            </a:r>
+            <a:endParaRPr lang="de-DE" dirty="0"/>
+          </a:p>
+        </p:txBody>
+      </p:sp>
+      <p:sp>
+        <p:nvSpPr>
+          <p:cNvPr id="3" name="Slide Number Placeholder 2"/>
+          <p:cNvSpPr>
+            <a:spLocks noGrp="1"/>
+          </p:cNvSpPr>
+          <p:nvPr>
+            <p:ph type="sldNum" sz="quarter" idx="14"/>
+          </p:nvPr>
+        </p:nvSpPr>
+        <p:spPr/>
+        <p:txBody>
+          <a:bodyPr/>
+          <a:lstStyle/>
+          <a:p>
+            <a:fld id="{97555E91-926B-4C96-90B6-D75C3A27DF23}" type="slidenum">
+              <a:rPr lang="de-DE" smtClean="0"/>
+              <a:pPr/>
+              <a:t>14</a:t>
+            </a:fld>
+            <a:endParaRPr lang="de-DE" dirty="0"/>
+          </a:p>
+        </p:txBody>
+      </p:sp>
+      <p:sp>
+        <p:nvSpPr>
+          <p:cNvPr id="4" name="Title 3"/>
+          <p:cNvSpPr>
+            <a:spLocks noGrp="1"/>
+          </p:cNvSpPr>
+          <p:nvPr>
+            <p:ph type="title"/>
+          </p:nvPr>
+        </p:nvSpPr>
+        <p:spPr/>
+        <p:txBody>
+          <a:bodyPr/>
+          <a:lstStyle/>
+          <a:p>
+            <a:r>
+              <a:rPr lang="de-DE" dirty="0"/>
+              <a:t>FLOAT </a:t>
+            </a:r>
+            <a:r>
+              <a:rPr lang="de-DE" dirty="0" smtClean="0"/>
+              <a:t>Depthwise Conv </a:t>
+            </a:r>
+            <a:r>
+              <a:rPr lang="de-DE" dirty="0"/>
+              <a:t>layer calculations</a:t>
+            </a:r>
+          </a:p>
+        </p:txBody>
+      </p:sp>
+      <mc:AlternateContent xmlns:mc="http://schemas.openxmlformats.org/markup-compatibility/2006" xmlns:a14="http://schemas.microsoft.com/office/drawing/2010/main">
+        <mc:Choice Requires="a14">
+          <p:sp>
+            <p:nvSpPr>
+              <p:cNvPr id="5" name="Content Placeholder 4"/>
+              <p:cNvSpPr>
+                <a:spLocks noGrp="1"/>
+              </p:cNvSpPr>
+              <p:nvPr>
+                <p:ph sz="quarter" idx="13"/>
+              </p:nvPr>
+            </p:nvSpPr>
+            <p:spPr/>
+            <p:txBody>
+              <a:bodyPr>
+                <a:normAutofit fontScale="92500"/>
+              </a:bodyPr>
+              <a:lstStyle/>
+              <a:p>
+                <a:pPr marL="0" indent="0">
+                  <a:buNone/>
+                </a:pPr>
+                <a:r>
+                  <a:rPr lang="de-DE" dirty="0" smtClean="0"/>
+                  <a:t>Output </a:t>
+                </a:r>
+                <a:r>
+                  <a:rPr lang="de-DE" dirty="0"/>
+                  <a:t>size: (batch_size * </a:t>
+                </a:r>
+                <a:r>
+                  <a:rPr lang="de-DE" dirty="0" smtClean="0"/>
+                  <a:t>out_y </a:t>
+                </a:r>
+                <a:r>
+                  <a:rPr lang="de-DE" dirty="0"/>
+                  <a:t>* </a:t>
+                </a:r>
+                <a:r>
+                  <a:rPr lang="de-DE" dirty="0" smtClean="0"/>
+                  <a:t>out_x </a:t>
+                </a:r>
+                <a:r>
+                  <a:rPr lang="de-DE" dirty="0"/>
+                  <a:t>* </a:t>
+                </a:r>
+                <a:r>
+                  <a:rPr lang="de-DE" dirty="0" smtClean="0"/>
+                  <a:t>out_channel)</a:t>
+                </a:r>
+              </a:p>
+              <a:p>
+                <a:r>
+                  <a:rPr lang="de-DE" dirty="0" smtClean="0"/>
+                  <a:t>Out_channel = in_channel * depth_multiplier</a:t>
+                </a:r>
+                <a:endParaRPr lang="de-DE" dirty="0"/>
+              </a:p>
+              <a:p>
+                <a:pPr marL="0" indent="0">
+                  <a:buNone/>
+                </a:pPr>
+                <a:r>
+                  <a:rPr lang="de-DE" dirty="0"/>
+                  <a:t>Filter size: </a:t>
+                </a:r>
+                <a:r>
+                  <a:rPr lang="de-DE" dirty="0" smtClean="0"/>
+                  <a:t>1 * filter_y </a:t>
+                </a:r>
+                <a:r>
+                  <a:rPr lang="de-DE" dirty="0"/>
+                  <a:t>* </a:t>
+                </a:r>
+                <a:r>
+                  <a:rPr lang="de-DE" dirty="0" smtClean="0"/>
+                  <a:t>filter_x </a:t>
+                </a:r>
+                <a:r>
+                  <a:rPr lang="de-DE" dirty="0"/>
+                  <a:t>* </a:t>
+                </a:r>
+                <a:r>
+                  <a:rPr lang="de-DE" dirty="0" smtClean="0"/>
+                  <a:t>out_channel</a:t>
+                </a:r>
+              </a:p>
+              <a:p>
+                <a:pPr marL="0" indent="0">
+                  <a:buNone/>
+                </a:pPr>
+                <a:endParaRPr lang="de-DE" i="1" dirty="0">
+                  <a:latin typeface="Cambria Math" panose="02040503050406030204" pitchFamily="18" charset="0"/>
+                </a:endParaRPr>
+              </a:p>
+              <a:p>
+                <a:pPr marL="0" indent="0">
+                  <a:buNone/>
+                </a:pPr>
+                <a:r>
+                  <a:rPr lang="de-DE" i="1" dirty="0" smtClean="0">
+                    <a:latin typeface="Cambria Math" panose="02040503050406030204" pitchFamily="18" charset="0"/>
+                  </a:rPr>
+                  <a:t>One output neuron calculations:</a:t>
+                </a:r>
+              </a:p>
+              <a:p>
+                <a:pPr marL="288000" lvl="1" indent="0">
+                  <a:buNone/>
+                </a:pPr>
+                <a14:m>
+                  <m:oMath xmlns:m="http://schemas.openxmlformats.org/officeDocument/2006/math">
+                    <m:r>
+                      <a:rPr lang="de-DE" i="1">
+                        <a:latin typeface="Cambria Math" panose="02040503050406030204" pitchFamily="18" charset="0"/>
+                      </a:rPr>
+                      <m:t>𝑜𝑢𝑡</m:t>
+                    </m:r>
+                    <m:r>
+                      <a:rPr lang="de-DE" i="1">
+                        <a:latin typeface="Cambria Math" panose="02040503050406030204" pitchFamily="18" charset="0"/>
+                      </a:rPr>
+                      <m:t>=</m:t>
+                    </m:r>
+                    <m:r>
+                      <a:rPr lang="de-DE" i="1">
+                        <a:latin typeface="Cambria Math" panose="02040503050406030204" pitchFamily="18" charset="0"/>
+                      </a:rPr>
+                      <m:t>𝑎𝑐𝑡𝑖𝑣𝑎𝑡𝑖𝑜𝑛</m:t>
+                    </m:r>
+                    <m:r>
+                      <a:rPr lang="de-DE" i="1">
+                        <a:latin typeface="Cambria Math" panose="02040503050406030204" pitchFamily="18" charset="0"/>
+                      </a:rPr>
+                      <m:t>(</m:t>
+                    </m:r>
+                    <m:d>
+                      <m:dPr>
+                        <m:ctrlPr>
+                          <a:rPr lang="de-DE" i="1">
+                            <a:latin typeface="Cambria Math" panose="02040503050406030204" pitchFamily="18" charset="0"/>
+                          </a:rPr>
+                        </m:ctrlPr>
+                      </m:dPr>
+                      <m:e>
+                        <m:nary>
+                          <m:naryPr>
+                            <m:chr m:val="∑"/>
+                            <m:supHide m:val="on"/>
+                            <m:ctrlPr>
+                              <a:rPr lang="de-DE" i="1">
+                                <a:latin typeface="Cambria Math" panose="02040503050406030204" pitchFamily="18" charset="0"/>
+                              </a:rPr>
+                            </m:ctrlPr>
+                          </m:naryPr>
+                          <m:sub>
+                            <m:r>
+                              <a:rPr lang="de-DE" i="1">
+                                <a:latin typeface="Cambria Math" panose="02040503050406030204" pitchFamily="18" charset="0"/>
+                                <a:ea typeface="Cambria Math" panose="02040503050406030204" pitchFamily="18" charset="0"/>
+                              </a:rPr>
+                              <m:t>𝑓𝑖𝑙𝑡𝑒</m:t>
+                            </m:r>
+                            <m:sSub>
+                              <m:sSubPr>
+                                <m:ctrlPr>
+                                  <a:rPr lang="de-DE" b="0" i="1" smtClean="0">
+                                    <a:latin typeface="Cambria Math" panose="02040503050406030204" pitchFamily="18" charset="0"/>
+                                    <a:ea typeface="Cambria Math" panose="02040503050406030204" pitchFamily="18" charset="0"/>
+                                  </a:rPr>
+                                </m:ctrlPr>
+                              </m:sSubPr>
+                              <m:e>
+                                <m:r>
+                                  <a:rPr lang="de-DE" i="1">
+                                    <a:latin typeface="Cambria Math" panose="02040503050406030204" pitchFamily="18" charset="0"/>
+                                    <a:ea typeface="Cambria Math" panose="02040503050406030204" pitchFamily="18" charset="0"/>
+                                  </a:rPr>
+                                  <m:t>𝑟</m:t>
+                                </m:r>
+                              </m:e>
+                              <m:sub>
+                                <m:r>
+                                  <a:rPr lang="de-DE" b="0" i="1" smtClean="0">
+                                    <a:latin typeface="Cambria Math" panose="02040503050406030204" pitchFamily="18" charset="0"/>
+                                    <a:ea typeface="Cambria Math" panose="02040503050406030204" pitchFamily="18" charset="0"/>
+                                  </a:rPr>
+                                  <m:t>𝑦</m:t>
+                                </m:r>
+                              </m:sub>
+                            </m:sSub>
+                          </m:sub>
+                          <m:sup/>
+                          <m:e>
+                            <m:nary>
+                              <m:naryPr>
+                                <m:chr m:val="∑"/>
+                                <m:supHide m:val="on"/>
+                                <m:ctrlPr>
+                                  <a:rPr lang="de-DE" i="1" smtClean="0">
+                                    <a:latin typeface="Cambria Math" panose="02040503050406030204" pitchFamily="18" charset="0"/>
+                                    <a:ea typeface="Cambria Math" panose="02040503050406030204" pitchFamily="18" charset="0"/>
+                                  </a:rPr>
+                                </m:ctrlPr>
+                              </m:naryPr>
+                              <m:sub>
+                                <m:r>
+                                  <m:rPr>
+                                    <m:brk m:alnAt="7"/>
+                                  </m:rPr>
+                                  <a:rPr lang="de-DE" b="0" i="1" smtClean="0">
+                                    <a:latin typeface="Cambria Math" panose="02040503050406030204" pitchFamily="18" charset="0"/>
+                                    <a:ea typeface="Cambria Math" panose="02040503050406030204" pitchFamily="18" charset="0"/>
+                                  </a:rPr>
+                                  <m:t>𝑓</m:t>
+                                </m:r>
+                                <m:r>
+                                  <a:rPr lang="de-DE" b="0" i="1" smtClean="0">
+                                    <a:latin typeface="Cambria Math" panose="02040503050406030204" pitchFamily="18" charset="0"/>
+                                    <a:ea typeface="Cambria Math" panose="02040503050406030204" pitchFamily="18" charset="0"/>
+                                  </a:rPr>
+                                  <m:t>𝑖𝑙𝑡𝑒</m:t>
+                                </m:r>
+                                <m:sSub>
+                                  <m:sSubPr>
+                                    <m:ctrlPr>
+                                      <a:rPr lang="de-DE" b="0" i="1" smtClean="0">
+                                        <a:latin typeface="Cambria Math" panose="02040503050406030204" pitchFamily="18" charset="0"/>
+                                        <a:ea typeface="Cambria Math" panose="02040503050406030204" pitchFamily="18" charset="0"/>
+                                      </a:rPr>
+                                    </m:ctrlPr>
+                                  </m:sSubPr>
+                                  <m:e>
+                                    <m:r>
+                                      <m:rPr>
+                                        <m:brk m:alnAt="7"/>
+                                      </m:rPr>
+                                      <a:rPr lang="de-DE" b="0" i="1" smtClean="0">
+                                        <a:latin typeface="Cambria Math" panose="02040503050406030204" pitchFamily="18" charset="0"/>
+                                        <a:ea typeface="Cambria Math" panose="02040503050406030204" pitchFamily="18" charset="0"/>
+                                      </a:rPr>
+                                      <m:t>𝑟</m:t>
+                                    </m:r>
+                                  </m:e>
+                                  <m:sub>
+                                    <m:r>
+                                      <a:rPr lang="de-DE" b="0" i="1" smtClean="0">
+                                        <a:latin typeface="Cambria Math" panose="02040503050406030204" pitchFamily="18" charset="0"/>
+                                        <a:ea typeface="Cambria Math" panose="02040503050406030204" pitchFamily="18" charset="0"/>
+                                      </a:rPr>
+                                      <m:t>𝑥</m:t>
+                                    </m:r>
+                                  </m:sub>
+                                </m:sSub>
+                              </m:sub>
+                              <m:sup/>
+                              <m:e>
+                                <m:r>
+                                  <a:rPr lang="de-DE" b="0" i="1" smtClean="0">
+                                    <a:latin typeface="Cambria Math" panose="02040503050406030204" pitchFamily="18" charset="0"/>
+                                    <a:ea typeface="Cambria Math" panose="02040503050406030204" pitchFamily="18" charset="0"/>
+                                  </a:rPr>
+                                  <m:t>𝑓𝑖𝑙𝑡𝑒𝑟</m:t>
+                                </m:r>
+                                <m:d>
+                                  <m:dPr>
+                                    <m:begChr m:val="["/>
+                                    <m:endChr m:val="]"/>
+                                    <m:ctrlPr>
+                                      <a:rPr lang="de-DE" b="0" i="1" smtClean="0">
+                                        <a:latin typeface="Cambria Math" panose="02040503050406030204" pitchFamily="18" charset="0"/>
+                                        <a:ea typeface="Cambria Math" panose="02040503050406030204" pitchFamily="18" charset="0"/>
+                                      </a:rPr>
+                                    </m:ctrlPr>
+                                  </m:dPr>
+                                  <m:e>
+                                    <m:r>
+                                      <a:rPr lang="de-DE" b="0" i="1" smtClean="0">
+                                        <a:latin typeface="Cambria Math" panose="02040503050406030204" pitchFamily="18" charset="0"/>
+                                        <a:ea typeface="Cambria Math" panose="02040503050406030204" pitchFamily="18" charset="0"/>
+                                      </a:rPr>
+                                      <m:t>𝑥</m:t>
+                                    </m:r>
+                                    <m:r>
+                                      <a:rPr lang="de-DE" b="0" i="1" smtClean="0">
+                                        <a:latin typeface="Cambria Math" panose="02040503050406030204" pitchFamily="18" charset="0"/>
+                                        <a:ea typeface="Cambria Math" panose="02040503050406030204" pitchFamily="18" charset="0"/>
+                                      </a:rPr>
+                                      <m:t>,</m:t>
+                                    </m:r>
+                                    <m:r>
+                                      <a:rPr lang="de-DE" b="0" i="1" smtClean="0">
+                                        <a:latin typeface="Cambria Math" panose="02040503050406030204" pitchFamily="18" charset="0"/>
+                                        <a:ea typeface="Cambria Math" panose="02040503050406030204" pitchFamily="18" charset="0"/>
+                                      </a:rPr>
+                                      <m:t>𝑦</m:t>
+                                    </m:r>
+                                    <m:r>
+                                      <a:rPr lang="de-DE" b="0" i="1" smtClean="0">
+                                        <a:latin typeface="Cambria Math" panose="02040503050406030204" pitchFamily="18" charset="0"/>
+                                        <a:ea typeface="Cambria Math" panose="02040503050406030204" pitchFamily="18" charset="0"/>
+                                      </a:rPr>
+                                      <m:t>,</m:t>
+                                    </m:r>
+                                    <m:r>
+                                      <a:rPr lang="de-DE" b="0" i="1" smtClean="0">
+                                        <a:latin typeface="Cambria Math" panose="02040503050406030204" pitchFamily="18" charset="0"/>
+                                        <a:ea typeface="Cambria Math" panose="02040503050406030204" pitchFamily="18" charset="0"/>
+                                      </a:rPr>
+                                      <m:t>𝑜𝑢</m:t>
+                                    </m:r>
+                                    <m:sSub>
+                                      <m:sSubPr>
+                                        <m:ctrlPr>
+                                          <a:rPr lang="de-DE" b="0" i="1" smtClean="0">
+                                            <a:latin typeface="Cambria Math" panose="02040503050406030204" pitchFamily="18" charset="0"/>
+                                            <a:ea typeface="Cambria Math" panose="02040503050406030204" pitchFamily="18" charset="0"/>
+                                          </a:rPr>
+                                        </m:ctrlPr>
+                                      </m:sSubPr>
+                                      <m:e>
+                                        <m:r>
+                                          <a:rPr lang="de-DE" b="0" i="1" smtClean="0">
+                                            <a:latin typeface="Cambria Math" panose="02040503050406030204" pitchFamily="18" charset="0"/>
+                                            <a:ea typeface="Cambria Math" panose="02040503050406030204" pitchFamily="18" charset="0"/>
+                                          </a:rPr>
+                                          <m:t>𝑡</m:t>
+                                        </m:r>
+                                      </m:e>
+                                      <m:sub>
+                                        <m:r>
+                                          <a:rPr lang="de-DE" b="0" i="1" smtClean="0">
+                                            <a:latin typeface="Cambria Math" panose="02040503050406030204" pitchFamily="18" charset="0"/>
+                                            <a:ea typeface="Cambria Math" panose="02040503050406030204" pitchFamily="18" charset="0"/>
+                                          </a:rPr>
+                                          <m:t>𝑐h𝑎𝑛𝑛𝑒𝑙</m:t>
+                                        </m:r>
+                                      </m:sub>
+                                    </m:sSub>
+                                  </m:e>
+                                </m:d>
+                                <m:r>
+                                  <a:rPr lang="de-DE" b="0" i="1" smtClean="0">
+                                    <a:latin typeface="Cambria Math" panose="02040503050406030204" pitchFamily="18" charset="0"/>
+                                    <a:ea typeface="Cambria Math" panose="02040503050406030204" pitchFamily="18" charset="0"/>
+                                  </a:rPr>
+                                  <m:t>∗</m:t>
+                                </m:r>
+                                <m:r>
+                                  <a:rPr lang="de-DE" b="0" i="1" smtClean="0">
+                                    <a:latin typeface="Cambria Math" panose="02040503050406030204" pitchFamily="18" charset="0"/>
+                                    <a:ea typeface="Cambria Math" panose="02040503050406030204" pitchFamily="18" charset="0"/>
+                                  </a:rPr>
+                                  <m:t>𝑖𝑛𝑝𝑢𝑡</m:t>
+                                </m:r>
+                                <m:r>
+                                  <a:rPr lang="de-DE" b="0" i="1" smtClean="0">
+                                    <a:latin typeface="Cambria Math" panose="02040503050406030204" pitchFamily="18" charset="0"/>
+                                    <a:ea typeface="Cambria Math" panose="02040503050406030204" pitchFamily="18" charset="0"/>
+                                  </a:rPr>
+                                  <m:t>[</m:t>
+                                </m:r>
+                                <m:r>
+                                  <a:rPr lang="de-DE" b="0" i="1" smtClean="0">
+                                    <a:latin typeface="Cambria Math" panose="02040503050406030204" pitchFamily="18" charset="0"/>
+                                    <a:ea typeface="Cambria Math" panose="02040503050406030204" pitchFamily="18" charset="0"/>
+                                  </a:rPr>
+                                  <m:t>𝑥</m:t>
+                                </m:r>
+                                <m:r>
+                                  <a:rPr lang="de-DE" b="0" i="1" smtClean="0">
+                                    <a:latin typeface="Cambria Math" panose="02040503050406030204" pitchFamily="18" charset="0"/>
+                                    <a:ea typeface="Cambria Math" panose="02040503050406030204" pitchFamily="18" charset="0"/>
+                                  </a:rPr>
+                                  <m:t>,</m:t>
+                                </m:r>
+                                <m:r>
+                                  <a:rPr lang="de-DE" b="0" i="1" smtClean="0">
+                                    <a:latin typeface="Cambria Math" panose="02040503050406030204" pitchFamily="18" charset="0"/>
+                                    <a:ea typeface="Cambria Math" panose="02040503050406030204" pitchFamily="18" charset="0"/>
+                                  </a:rPr>
+                                  <m:t>𝑦</m:t>
+                                </m:r>
+                                <m:r>
+                                  <a:rPr lang="de-DE" b="0" i="1" smtClean="0">
+                                    <a:latin typeface="Cambria Math" panose="02040503050406030204" pitchFamily="18" charset="0"/>
+                                    <a:ea typeface="Cambria Math" panose="02040503050406030204" pitchFamily="18" charset="0"/>
+                                  </a:rPr>
+                                  <m:t>,</m:t>
+                                </m:r>
+                                <m:r>
+                                  <a:rPr lang="de-DE" b="0" i="1" smtClean="0">
+                                    <a:latin typeface="Cambria Math" panose="02040503050406030204" pitchFamily="18" charset="0"/>
+                                    <a:ea typeface="Cambria Math" panose="02040503050406030204" pitchFamily="18" charset="0"/>
+                                  </a:rPr>
+                                  <m:t>𝑖</m:t>
+                                </m:r>
+                                <m:sSub>
+                                  <m:sSubPr>
+                                    <m:ctrlPr>
+                                      <a:rPr lang="de-DE" b="0" i="1" smtClean="0">
+                                        <a:latin typeface="Cambria Math" panose="02040503050406030204" pitchFamily="18" charset="0"/>
+                                        <a:ea typeface="Cambria Math" panose="02040503050406030204" pitchFamily="18" charset="0"/>
+                                      </a:rPr>
+                                    </m:ctrlPr>
+                                  </m:sSubPr>
+                                  <m:e>
+                                    <m:r>
+                                      <a:rPr lang="de-DE" b="0" i="1" smtClean="0">
+                                        <a:latin typeface="Cambria Math" panose="02040503050406030204" pitchFamily="18" charset="0"/>
+                                        <a:ea typeface="Cambria Math" panose="02040503050406030204" pitchFamily="18" charset="0"/>
+                                      </a:rPr>
+                                      <m:t>𝑛</m:t>
+                                    </m:r>
+                                  </m:e>
+                                  <m:sub>
+                                    <m:r>
+                                      <a:rPr lang="de-DE" b="0" i="1" smtClean="0">
+                                        <a:latin typeface="Cambria Math" panose="02040503050406030204" pitchFamily="18" charset="0"/>
+                                        <a:ea typeface="Cambria Math" panose="02040503050406030204" pitchFamily="18" charset="0"/>
+                                      </a:rPr>
+                                      <m:t>𝑐h𝑎𝑛𝑛𝑒𝑙</m:t>
+                                    </m:r>
+                                  </m:sub>
+                                </m:sSub>
+                                <m:r>
+                                  <a:rPr lang="de-DE" b="0" i="1" smtClean="0">
+                                    <a:latin typeface="Cambria Math" panose="02040503050406030204" pitchFamily="18" charset="0"/>
+                                    <a:ea typeface="Cambria Math" panose="02040503050406030204" pitchFamily="18" charset="0"/>
+                                  </a:rPr>
+                                  <m:t>]</m:t>
+                                </m:r>
+                              </m:e>
+                            </m:nary>
+                          </m:e>
+                        </m:nary>
+                      </m:e>
+                    </m:d>
+                    <m:r>
+                      <a:rPr lang="de-DE" i="1">
+                        <a:latin typeface="Cambria Math" panose="02040503050406030204" pitchFamily="18" charset="0"/>
+                      </a:rPr>
+                      <m:t>+</m:t>
+                    </m:r>
+                    <m:r>
+                      <a:rPr lang="de-DE" b="0" i="1" smtClean="0">
+                        <a:latin typeface="Cambria Math" panose="02040503050406030204" pitchFamily="18" charset="0"/>
+                      </a:rPr>
+                      <m:t>                                       </m:t>
+                    </m:r>
+                    <m:r>
+                      <a:rPr lang="de-DE" i="1">
+                        <a:latin typeface="Cambria Math" panose="02040503050406030204" pitchFamily="18" charset="0"/>
+                      </a:rPr>
+                      <m:t>𝑏𝑖𝑎𝑠</m:t>
+                    </m:r>
+                    <m:d>
+                      <m:dPr>
+                        <m:begChr m:val="["/>
+                        <m:endChr m:val="]"/>
+                        <m:ctrlPr>
+                          <a:rPr lang="de-DE" i="1">
+                            <a:latin typeface="Cambria Math" panose="02040503050406030204" pitchFamily="18" charset="0"/>
+                          </a:rPr>
+                        </m:ctrlPr>
+                      </m:dPr>
+                      <m:e>
+                        <m:r>
+                          <a:rPr lang="de-DE" i="1">
+                            <a:latin typeface="Cambria Math" panose="02040503050406030204" pitchFamily="18" charset="0"/>
+                          </a:rPr>
+                          <m:t>𝑜𝑢𝑡</m:t>
+                        </m:r>
+                        <m:r>
+                          <m:rPr>
+                            <m:lit/>
+                          </m:rPr>
+                          <a:rPr lang="de-DE" i="1">
+                            <a:latin typeface="Cambria Math" panose="02040503050406030204" pitchFamily="18" charset="0"/>
+                          </a:rPr>
+                          <m:t>_</m:t>
+                        </m:r>
+                        <m:r>
+                          <a:rPr lang="de-DE" i="1">
+                            <a:latin typeface="Cambria Math" panose="02040503050406030204" pitchFamily="18" charset="0"/>
+                          </a:rPr>
+                          <m:t>𝑐h𝑎𝑛𝑛𝑒𝑙</m:t>
+                        </m:r>
+                      </m:e>
+                    </m:d>
+                    <m:r>
+                      <a:rPr lang="de-DE" i="1">
+                        <a:latin typeface="Cambria Math" panose="02040503050406030204" pitchFamily="18" charset="0"/>
+                      </a:rPr>
+                      <m:t>)</m:t>
+                    </m:r>
+                  </m:oMath>
+                </a14:m>
+                <a:r>
+                  <a:rPr lang="de-DE" dirty="0"/>
+                  <a:t> </a:t>
+                </a:r>
+              </a:p>
+              <a:p>
+                <a:pPr marL="0" indent="0">
+                  <a:buNone/>
+                </a:pPr>
+                <a:endParaRPr lang="de-DE" dirty="0" smtClean="0"/>
+              </a:p>
+              <a:p>
+                <a:pPr marL="0" indent="0">
+                  <a:buNone/>
+                </a:pPr>
+                <a:r>
+                  <a:rPr lang="de-DE" dirty="0" smtClean="0"/>
+                  <a:t>The depthwise convolution convolves only one input channel for every output neuron (unlike the conv layer, which always convolves all input channels).</a:t>
+                </a:r>
+              </a:p>
+              <a:p>
+                <a:pPr marL="0" indent="0">
+                  <a:buNone/>
+                </a:pPr>
+                <a:r>
+                  <a:rPr lang="de-DE" dirty="0" smtClean="0"/>
+                  <a:t>The 2D input channel is convolved with a 2D filter.</a:t>
+                </a:r>
+              </a:p>
+              <a:p>
+                <a:pPr marL="0" indent="0">
+                  <a:buNone/>
+                </a:pPr>
+                <a:r>
+                  <a:rPr lang="de-DE" dirty="0" smtClean="0"/>
+                  <a:t>Every input channel can get multiple filters (depth multiplier)</a:t>
+                </a:r>
+              </a:p>
+              <a:p>
+                <a:pPr marL="0" indent="0">
+                  <a:buNone/>
+                </a:pPr>
+                <a:endParaRPr lang="de-DE" dirty="0"/>
+              </a:p>
+            </p:txBody>
+          </p:sp>
+        </mc:Choice>
+        <mc:Fallback xmlns="">
+          <p:sp>
+            <p:nvSpPr>
+              <p:cNvPr id="5" name="Content Placeholder 4"/>
+              <p:cNvSpPr>
+                <a:spLocks noGrp="1" noRot="1" noChangeAspect="1" noMove="1" noResize="1" noEditPoints="1" noAdjustHandles="1" noChangeArrowheads="1" noChangeShapeType="1" noTextEdit="1"/>
+              </p:cNvSpPr>
+              <p:nvPr>
+                <p:ph sz="quarter" idx="13"/>
+              </p:nvPr>
+            </p:nvSpPr>
+            <p:spPr>
+              <a:blipFill>
+                <a:blip r:embed="rId2"/>
+                <a:stretch>
+                  <a:fillRect l="-1693" t="-1549"/>
+                </a:stretch>
+              </a:blipFill>
+            </p:spPr>
+            <p:txBody>
+              <a:bodyPr/>
+              <a:lstStyle/>
+              <a:p>
+                <a:r>
+                  <a:rPr lang="de-DE">
+                    <a:noFill/>
+                  </a:rPr>
+                  <a:t> </a:t>
+                </a:r>
+              </a:p>
+            </p:txBody>
+          </p:sp>
+        </mc:Fallback>
+      </mc:AlternateContent>
+      <p:sp>
+        <p:nvSpPr>
+          <p:cNvPr id="6" name="Date Placeholder 5"/>
+          <p:cNvSpPr>
+            <a:spLocks noGrp="1"/>
+          </p:cNvSpPr>
+          <p:nvPr>
+            <p:ph type="dt" sz="half" idx="15"/>
+          </p:nvPr>
+        </p:nvSpPr>
+        <p:spPr/>
+        <p:txBody>
+          <a:bodyPr/>
+          <a:lstStyle/>
+          <a:p>
+            <a:r>
+              <a:rPr lang="de-DE" smtClean="0"/>
+              <a:t>2020-05-14             </a:t>
+            </a:r>
+            <a:r>
+              <a:rPr lang="de-DE" b="1" smtClean="0"/>
+              <a:t>restricted</a:t>
+            </a:r>
+            <a:endParaRPr lang="de-DE" b="1" dirty="0"/>
+          </a:p>
+        </p:txBody>
+      </p:sp>
+    </p:spTree>
+    <p:extLst>
+      <p:ext uri="{BB962C8B-B14F-4D97-AF65-F5344CB8AC3E}">
+        <p14:creationId xmlns:p14="http://schemas.microsoft.com/office/powerpoint/2010/main" val="2021592720"/>
+      </p:ext>
+    </p:extLst>
+  </p:cSld>
+  <p:clrMapOvr>
+    <a:masterClrMapping/>
+  </p:clrMapOvr>
+  <p:timing>
+    <p:tnLst>
+      <p:par>
+        <p:cTn id="1" dur="indefinite" restart="never" nodeType="tmRoot"/>
+      </p:par>
+    </p:tnLst>
+  </p:timing>
+</p:sld>
+</file>
+
+<file path=ppt/slides/slide15.xml><?xml version="1.0" encoding="utf-8"?>
+<p:sld xmlns:a="http://schemas.openxmlformats.org/drawingml/2006/main" xmlns:r="http://schemas.openxmlformats.org/officeDocument/2006/relationships" xmlns:p="http://schemas.openxmlformats.org/presentationml/2006/main">
+  <p:cSld>
+    <p:spTree>
+      <p:nvGrpSpPr>
+        <p:cNvPr id="1" name=""/>
+        <p:cNvGrpSpPr/>
+        <p:nvPr/>
+      </p:nvGrpSpPr>
+      <p:grpSpPr>
+        <a:xfrm>
+          <a:off x="0" y="0"/>
+          <a:ext cx="0" cy="0"/>
+          <a:chOff x="0" y="0"/>
+          <a:chExt cx="0" cy="0"/>
+        </a:xfrm>
+      </p:grpSpPr>
+      <p:sp>
+        <p:nvSpPr>
+          <p:cNvPr id="2" name="Footer Placeholder 1"/>
+          <p:cNvSpPr>
+            <a:spLocks noGrp="1"/>
+          </p:cNvSpPr>
+          <p:nvPr>
+            <p:ph type="ftr" sz="quarter" idx="16"/>
+          </p:nvPr>
+        </p:nvSpPr>
+        <p:spPr/>
+        <p:txBody>
+          <a:bodyPr/>
+          <a:lstStyle/>
+          <a:p>
+            <a:r>
+              <a:rPr lang="en-US" smtClean="0"/>
+              <a:t>Copyright © Infineon Technologies AG 2020. All rights reserved.</a:t>
+            </a:r>
+            <a:endParaRPr lang="de-DE" dirty="0"/>
+          </a:p>
+        </p:txBody>
+      </p:sp>
+      <p:sp>
+        <p:nvSpPr>
+          <p:cNvPr id="3" name="Slide Number Placeholder 2"/>
+          <p:cNvSpPr>
+            <a:spLocks noGrp="1"/>
+          </p:cNvSpPr>
+          <p:nvPr>
+            <p:ph type="sldNum" sz="quarter" idx="14"/>
+          </p:nvPr>
+        </p:nvSpPr>
+        <p:spPr/>
+        <p:txBody>
+          <a:bodyPr/>
+          <a:lstStyle/>
+          <a:p>
+            <a:fld id="{97555E91-926B-4C96-90B6-D75C3A27DF23}" type="slidenum">
+              <a:rPr lang="de-DE" smtClean="0"/>
+              <a:pPr/>
+              <a:t>15</a:t>
+            </a:fld>
+            <a:endParaRPr lang="de-DE" dirty="0"/>
+          </a:p>
+        </p:txBody>
+      </p:sp>
+      <p:sp>
+        <p:nvSpPr>
+          <p:cNvPr id="4" name="Title 3"/>
+          <p:cNvSpPr>
+            <a:spLocks noGrp="1"/>
+          </p:cNvSpPr>
+          <p:nvPr>
+            <p:ph type="title"/>
+          </p:nvPr>
+        </p:nvSpPr>
+        <p:spPr/>
+        <p:txBody>
+          <a:bodyPr/>
+          <a:lstStyle/>
+          <a:p>
+            <a:r>
+              <a:rPr lang="de-DE" dirty="0" smtClean="0"/>
+              <a:t>UInt8 Depthwise Conv </a:t>
+            </a:r>
+            <a:r>
+              <a:rPr lang="de-DE" dirty="0"/>
+              <a:t>layer calculations</a:t>
+            </a:r>
+          </a:p>
+        </p:txBody>
+      </p:sp>
+      <mc:AlternateContent xmlns:mc="http://schemas.openxmlformats.org/markup-compatibility/2006" xmlns:a14="http://schemas.microsoft.com/office/drawing/2010/main">
+        <mc:Choice Requires="a14">
+          <p:sp>
+            <p:nvSpPr>
+              <p:cNvPr id="5" name="Content Placeholder 4"/>
+              <p:cNvSpPr>
+                <a:spLocks noGrp="1"/>
+              </p:cNvSpPr>
+              <p:nvPr>
+                <p:ph sz="quarter" idx="13"/>
+              </p:nvPr>
+            </p:nvSpPr>
+            <p:spPr/>
+            <p:txBody>
+              <a:bodyPr>
+                <a:noAutofit/>
+              </a:bodyPr>
+              <a:lstStyle/>
+              <a:p>
+                <a:pPr marL="0" indent="0">
+                  <a:buNone/>
+                </a:pPr>
+                <a:r>
+                  <a:rPr lang="de-DE" sz="1600" dirty="0" smtClean="0"/>
+                  <a:t>Output </a:t>
+                </a:r>
+                <a:r>
+                  <a:rPr lang="de-DE" sz="1600" dirty="0"/>
+                  <a:t>size: (batch_size * </a:t>
+                </a:r>
+                <a:r>
+                  <a:rPr lang="de-DE" sz="1600" dirty="0" smtClean="0"/>
+                  <a:t>out_y </a:t>
+                </a:r>
+                <a:r>
+                  <a:rPr lang="de-DE" sz="1600" dirty="0"/>
+                  <a:t>* </a:t>
+                </a:r>
+                <a:r>
+                  <a:rPr lang="de-DE" sz="1600" dirty="0" smtClean="0"/>
+                  <a:t>out_x </a:t>
+                </a:r>
+                <a:r>
+                  <a:rPr lang="de-DE" sz="1600" dirty="0"/>
+                  <a:t>* </a:t>
+                </a:r>
+                <a:r>
+                  <a:rPr lang="de-DE" sz="1600" dirty="0" smtClean="0"/>
+                  <a:t>out_channel)</a:t>
+                </a:r>
+              </a:p>
+              <a:p>
+                <a:r>
+                  <a:rPr lang="de-DE" sz="1600" dirty="0" smtClean="0"/>
+                  <a:t>Out_channel = in_channel * depth_multiplier</a:t>
+                </a:r>
+                <a:endParaRPr lang="de-DE" sz="1600" dirty="0"/>
+              </a:p>
+              <a:p>
+                <a:pPr marL="0" indent="0">
+                  <a:buNone/>
+                </a:pPr>
+                <a:r>
+                  <a:rPr lang="de-DE" sz="1600" dirty="0"/>
+                  <a:t>Filter size: </a:t>
+                </a:r>
+                <a:r>
+                  <a:rPr lang="de-DE" sz="1600" dirty="0" smtClean="0"/>
+                  <a:t>1 * filter_y </a:t>
+                </a:r>
+                <a:r>
+                  <a:rPr lang="de-DE" sz="1600" dirty="0"/>
+                  <a:t>* </a:t>
+                </a:r>
+                <a:r>
+                  <a:rPr lang="de-DE" sz="1600" dirty="0" smtClean="0"/>
+                  <a:t>filter_x </a:t>
+                </a:r>
+                <a:r>
+                  <a:rPr lang="de-DE" sz="1600" dirty="0"/>
+                  <a:t>* </a:t>
+                </a:r>
+                <a:r>
+                  <a:rPr lang="de-DE" sz="1600" dirty="0" smtClean="0"/>
+                  <a:t>out_channel</a:t>
+                </a:r>
+              </a:p>
+              <a:p>
+                <a:pPr marL="0" indent="0">
+                  <a:buNone/>
+                </a:pPr>
+                <a:endParaRPr lang="de-DE" sz="1600" i="1" dirty="0">
+                  <a:latin typeface="Cambria Math" panose="02040503050406030204" pitchFamily="18" charset="0"/>
+                </a:endParaRPr>
+              </a:p>
+              <a:p>
+                <a:pPr marL="0" indent="0">
+                  <a:buNone/>
+                </a:pPr>
+                <a:r>
+                  <a:rPr lang="de-DE" sz="1600" i="1" dirty="0" smtClean="0">
+                    <a:latin typeface="Cambria Math" panose="02040503050406030204" pitchFamily="18" charset="0"/>
+                  </a:rPr>
+                  <a:t>One output neuron calculations:</a:t>
+                </a:r>
+              </a:p>
+              <a:p>
+                <a:pPr marL="288000" lvl="1" indent="0">
+                  <a:buNone/>
+                </a:pPr>
+                <a14:m>
+                  <m:oMath xmlns:m="http://schemas.openxmlformats.org/officeDocument/2006/math">
+                    <m:r>
+                      <a:rPr lang="de-DE" sz="1600" i="1">
+                        <a:latin typeface="Cambria Math" panose="02040503050406030204" pitchFamily="18" charset="0"/>
+                      </a:rPr>
+                      <m:t>𝑜𝑢𝑡</m:t>
+                    </m:r>
+                    <m:r>
+                      <a:rPr lang="de-DE" sz="1600" i="1">
+                        <a:latin typeface="Cambria Math" panose="02040503050406030204" pitchFamily="18" charset="0"/>
+                      </a:rPr>
+                      <m:t>=</m:t>
+                    </m:r>
+                    <m:r>
+                      <a:rPr lang="de-DE" sz="1600" i="1">
+                        <a:latin typeface="Cambria Math" panose="02040503050406030204" pitchFamily="18" charset="0"/>
+                      </a:rPr>
+                      <m:t>𝑎𝑐𝑡𝑖𝑣𝑎𝑡𝑖𝑜𝑛</m:t>
+                    </m:r>
+                    <m:r>
+                      <a:rPr lang="de-DE" sz="1600" i="1">
+                        <a:latin typeface="Cambria Math" panose="02040503050406030204" pitchFamily="18" charset="0"/>
+                      </a:rPr>
+                      <m:t>(</m:t>
+                    </m:r>
+                    <m:d>
+                      <m:dPr>
+                        <m:ctrlPr>
+                          <a:rPr lang="de-DE" sz="1600" i="1">
+                            <a:latin typeface="Cambria Math" panose="02040503050406030204" pitchFamily="18" charset="0"/>
+                          </a:rPr>
+                        </m:ctrlPr>
+                      </m:dPr>
+                      <m:e>
+                        <m:nary>
+                          <m:naryPr>
+                            <m:chr m:val="∑"/>
+                            <m:supHide m:val="on"/>
+                            <m:ctrlPr>
+                              <a:rPr lang="de-DE" sz="1600" i="1">
+                                <a:latin typeface="Cambria Math" panose="02040503050406030204" pitchFamily="18" charset="0"/>
+                              </a:rPr>
+                            </m:ctrlPr>
+                          </m:naryPr>
+                          <m:sub>
+                            <m:r>
+                              <a:rPr lang="de-DE" sz="1600" i="1">
+                                <a:latin typeface="Cambria Math" panose="02040503050406030204" pitchFamily="18" charset="0"/>
+                                <a:ea typeface="Cambria Math" panose="02040503050406030204" pitchFamily="18" charset="0"/>
+                              </a:rPr>
+                              <m:t>𝑓𝑖𝑙𝑡𝑒</m:t>
+                            </m:r>
+                            <m:sSub>
+                              <m:sSubPr>
+                                <m:ctrlPr>
+                                  <a:rPr lang="de-DE" sz="1600" b="0" i="1" smtClean="0">
+                                    <a:latin typeface="Cambria Math" panose="02040503050406030204" pitchFamily="18" charset="0"/>
+                                    <a:ea typeface="Cambria Math" panose="02040503050406030204" pitchFamily="18" charset="0"/>
+                                  </a:rPr>
+                                </m:ctrlPr>
+                              </m:sSubPr>
+                              <m:e>
+                                <m:r>
+                                  <a:rPr lang="de-DE" sz="1600" i="1">
+                                    <a:latin typeface="Cambria Math" panose="02040503050406030204" pitchFamily="18" charset="0"/>
+                                    <a:ea typeface="Cambria Math" panose="02040503050406030204" pitchFamily="18" charset="0"/>
+                                  </a:rPr>
+                                  <m:t>𝑟</m:t>
+                                </m:r>
+                              </m:e>
+                              <m:sub>
+                                <m:r>
+                                  <a:rPr lang="de-DE" sz="1600" b="0" i="1" smtClean="0">
+                                    <a:latin typeface="Cambria Math" panose="02040503050406030204" pitchFamily="18" charset="0"/>
+                                    <a:ea typeface="Cambria Math" panose="02040503050406030204" pitchFamily="18" charset="0"/>
+                                  </a:rPr>
+                                  <m:t>𝑦</m:t>
+                                </m:r>
+                              </m:sub>
+                            </m:sSub>
+                          </m:sub>
+                          <m:sup/>
+                          <m:e>
+                            <m:nary>
+                              <m:naryPr>
+                                <m:chr m:val="∑"/>
+                                <m:supHide m:val="on"/>
+                                <m:ctrlPr>
+                                  <a:rPr lang="de-DE" sz="1600" i="1" smtClean="0">
+                                    <a:latin typeface="Cambria Math" panose="02040503050406030204" pitchFamily="18" charset="0"/>
+                                    <a:ea typeface="Cambria Math" panose="02040503050406030204" pitchFamily="18" charset="0"/>
+                                  </a:rPr>
+                                </m:ctrlPr>
+                              </m:naryPr>
+                              <m:sub>
+                                <m:r>
+                                  <m:rPr>
+                                    <m:brk m:alnAt="7"/>
+                                  </m:rPr>
+                                  <a:rPr lang="de-DE" sz="1600" b="0" i="1" smtClean="0">
+                                    <a:latin typeface="Cambria Math" panose="02040503050406030204" pitchFamily="18" charset="0"/>
+                                    <a:ea typeface="Cambria Math" panose="02040503050406030204" pitchFamily="18" charset="0"/>
+                                  </a:rPr>
+                                  <m:t>𝑓</m:t>
+                                </m:r>
+                                <m:r>
+                                  <a:rPr lang="de-DE" sz="1600" b="0" i="1" smtClean="0">
+                                    <a:latin typeface="Cambria Math" panose="02040503050406030204" pitchFamily="18" charset="0"/>
+                                    <a:ea typeface="Cambria Math" panose="02040503050406030204" pitchFamily="18" charset="0"/>
+                                  </a:rPr>
+                                  <m:t>𝑖𝑙𝑡𝑒</m:t>
+                                </m:r>
+                                <m:sSub>
+                                  <m:sSubPr>
+                                    <m:ctrlPr>
+                                      <a:rPr lang="de-DE" sz="1600" b="0" i="1" smtClean="0">
+                                        <a:latin typeface="Cambria Math" panose="02040503050406030204" pitchFamily="18" charset="0"/>
+                                        <a:ea typeface="Cambria Math" panose="02040503050406030204" pitchFamily="18" charset="0"/>
+                                      </a:rPr>
+                                    </m:ctrlPr>
+                                  </m:sSubPr>
+                                  <m:e>
+                                    <m:r>
+                                      <m:rPr>
+                                        <m:brk m:alnAt="7"/>
+                                      </m:rPr>
+                                      <a:rPr lang="de-DE" sz="1600" b="0" i="1" smtClean="0">
+                                        <a:latin typeface="Cambria Math" panose="02040503050406030204" pitchFamily="18" charset="0"/>
+                                        <a:ea typeface="Cambria Math" panose="02040503050406030204" pitchFamily="18" charset="0"/>
+                                      </a:rPr>
+                                      <m:t>𝑟</m:t>
+                                    </m:r>
+                                  </m:e>
+                                  <m:sub>
+                                    <m:r>
+                                      <a:rPr lang="de-DE" sz="1600" b="0" i="1" smtClean="0">
+                                        <a:latin typeface="Cambria Math" panose="02040503050406030204" pitchFamily="18" charset="0"/>
+                                        <a:ea typeface="Cambria Math" panose="02040503050406030204" pitchFamily="18" charset="0"/>
+                                      </a:rPr>
+                                      <m:t>𝑥</m:t>
+                                    </m:r>
+                                  </m:sub>
+                                </m:sSub>
+                              </m:sub>
+                              <m:sup/>
+                              <m:e>
+                                <m:d>
+                                  <m:dPr>
+                                    <m:ctrlPr>
+                                      <a:rPr lang="de-DE" sz="1600" b="0" i="1" smtClean="0">
+                                        <a:latin typeface="Cambria Math" panose="02040503050406030204" pitchFamily="18" charset="0"/>
+                                        <a:ea typeface="Cambria Math" panose="02040503050406030204" pitchFamily="18" charset="0"/>
+                                      </a:rPr>
+                                    </m:ctrlPr>
+                                  </m:dPr>
+                                  <m:e>
+                                    <m:r>
+                                      <a:rPr lang="de-DE" sz="1600" b="0" i="1" smtClean="0">
+                                        <a:latin typeface="Cambria Math" panose="02040503050406030204" pitchFamily="18" charset="0"/>
+                                        <a:ea typeface="Cambria Math" panose="02040503050406030204" pitchFamily="18" charset="0"/>
+                                      </a:rPr>
+                                      <m:t>𝑓𝑖𝑙𝑡𝑒𝑟</m:t>
+                                    </m:r>
+                                    <m:d>
+                                      <m:dPr>
+                                        <m:begChr m:val="["/>
+                                        <m:endChr m:val="]"/>
+                                        <m:ctrlPr>
+                                          <a:rPr lang="de-DE" sz="1600" b="0" i="1" smtClean="0">
+                                            <a:latin typeface="Cambria Math" panose="02040503050406030204" pitchFamily="18" charset="0"/>
+                                            <a:ea typeface="Cambria Math" panose="02040503050406030204" pitchFamily="18" charset="0"/>
+                                          </a:rPr>
+                                        </m:ctrlPr>
+                                      </m:dPr>
+                                      <m:e>
+                                        <m:r>
+                                          <a:rPr lang="de-DE" sz="1600" b="0" i="1" smtClean="0">
+                                            <a:latin typeface="Cambria Math" panose="02040503050406030204" pitchFamily="18" charset="0"/>
+                                            <a:ea typeface="Cambria Math" panose="02040503050406030204" pitchFamily="18" charset="0"/>
+                                          </a:rPr>
+                                          <m:t>𝑥</m:t>
+                                        </m:r>
+                                        <m:r>
+                                          <a:rPr lang="de-DE" sz="1600" b="0" i="1" smtClean="0">
+                                            <a:latin typeface="Cambria Math" panose="02040503050406030204" pitchFamily="18" charset="0"/>
+                                            <a:ea typeface="Cambria Math" panose="02040503050406030204" pitchFamily="18" charset="0"/>
+                                          </a:rPr>
+                                          <m:t>,</m:t>
+                                        </m:r>
+                                        <m:r>
+                                          <a:rPr lang="de-DE" sz="1600" b="0" i="1" smtClean="0">
+                                            <a:latin typeface="Cambria Math" panose="02040503050406030204" pitchFamily="18" charset="0"/>
+                                            <a:ea typeface="Cambria Math" panose="02040503050406030204" pitchFamily="18" charset="0"/>
+                                          </a:rPr>
+                                          <m:t>𝑦</m:t>
+                                        </m:r>
+                                        <m:r>
+                                          <a:rPr lang="de-DE" sz="1600" b="0" i="1" smtClean="0">
+                                            <a:latin typeface="Cambria Math" panose="02040503050406030204" pitchFamily="18" charset="0"/>
+                                            <a:ea typeface="Cambria Math" panose="02040503050406030204" pitchFamily="18" charset="0"/>
+                                          </a:rPr>
+                                          <m:t>,</m:t>
+                                        </m:r>
+                                        <m:r>
+                                          <a:rPr lang="de-DE" sz="1600" b="0" i="1" smtClean="0">
+                                            <a:latin typeface="Cambria Math" panose="02040503050406030204" pitchFamily="18" charset="0"/>
+                                            <a:ea typeface="Cambria Math" panose="02040503050406030204" pitchFamily="18" charset="0"/>
+                                          </a:rPr>
+                                          <m:t>𝑜𝑢</m:t>
+                                        </m:r>
+                                        <m:sSub>
+                                          <m:sSubPr>
+                                            <m:ctrlPr>
+                                              <a:rPr lang="de-DE" sz="1600" b="0" i="1" smtClean="0">
+                                                <a:latin typeface="Cambria Math" panose="02040503050406030204" pitchFamily="18" charset="0"/>
+                                                <a:ea typeface="Cambria Math" panose="02040503050406030204" pitchFamily="18" charset="0"/>
+                                              </a:rPr>
+                                            </m:ctrlPr>
+                                          </m:sSubPr>
+                                          <m:e>
+                                            <m:r>
+                                              <a:rPr lang="de-DE" sz="1600" b="0" i="1" smtClean="0">
+                                                <a:latin typeface="Cambria Math" panose="02040503050406030204" pitchFamily="18" charset="0"/>
+                                                <a:ea typeface="Cambria Math" panose="02040503050406030204" pitchFamily="18" charset="0"/>
+                                              </a:rPr>
+                                              <m:t>𝑡</m:t>
+                                            </m:r>
+                                          </m:e>
+                                          <m:sub>
+                                            <m:r>
+                                              <a:rPr lang="de-DE" sz="1600" b="0" i="1" smtClean="0">
+                                                <a:latin typeface="Cambria Math" panose="02040503050406030204" pitchFamily="18" charset="0"/>
+                                                <a:ea typeface="Cambria Math" panose="02040503050406030204" pitchFamily="18" charset="0"/>
+                                              </a:rPr>
+                                              <m:t>𝑐h𝑎𝑛𝑛𝑒𝑙</m:t>
+                                            </m:r>
+                                          </m:sub>
+                                        </m:sSub>
+                                      </m:e>
+                                    </m:d>
+                                    <m:r>
+                                      <a:rPr lang="de-DE" sz="1600" b="0" i="1" smtClean="0">
+                                        <a:latin typeface="Cambria Math" panose="02040503050406030204" pitchFamily="18" charset="0"/>
+                                        <a:ea typeface="Cambria Math" panose="02040503050406030204" pitchFamily="18" charset="0"/>
+                                      </a:rPr>
+                                      <m:t>+</m:t>
+                                    </m:r>
+                                    <m:r>
+                                      <a:rPr lang="de-DE" sz="1600" b="0" i="1" smtClean="0">
+                                        <a:solidFill>
+                                          <a:srgbClr val="FF0000"/>
+                                        </a:solidFill>
+                                        <a:latin typeface="Cambria Math" panose="02040503050406030204" pitchFamily="18" charset="0"/>
+                                        <a:ea typeface="Cambria Math" panose="02040503050406030204" pitchFamily="18" charset="0"/>
+                                      </a:rPr>
+                                      <m:t>𝑓𝑖𝑙𝑡𝑒</m:t>
+                                    </m:r>
+                                    <m:sSub>
+                                      <m:sSubPr>
+                                        <m:ctrlPr>
+                                          <a:rPr lang="de-DE" sz="1600" b="0" i="1" smtClean="0">
+                                            <a:solidFill>
+                                              <a:srgbClr val="FF0000"/>
+                                            </a:solidFill>
+                                            <a:latin typeface="Cambria Math" panose="02040503050406030204" pitchFamily="18" charset="0"/>
+                                            <a:ea typeface="Cambria Math" panose="02040503050406030204" pitchFamily="18" charset="0"/>
+                                          </a:rPr>
+                                        </m:ctrlPr>
+                                      </m:sSubPr>
+                                      <m:e>
+                                        <m:r>
+                                          <a:rPr lang="de-DE" sz="1600" b="0" i="1" smtClean="0">
+                                            <a:solidFill>
+                                              <a:srgbClr val="FF0000"/>
+                                            </a:solidFill>
+                                            <a:latin typeface="Cambria Math" panose="02040503050406030204" pitchFamily="18" charset="0"/>
+                                            <a:ea typeface="Cambria Math" panose="02040503050406030204" pitchFamily="18" charset="0"/>
+                                          </a:rPr>
+                                          <m:t>𝑟</m:t>
+                                        </m:r>
+                                      </m:e>
+                                      <m:sub>
+                                        <m:r>
+                                          <a:rPr lang="de-DE" sz="1600" b="0" i="1" smtClean="0">
+                                            <a:solidFill>
+                                              <a:srgbClr val="FF0000"/>
+                                            </a:solidFill>
+                                            <a:latin typeface="Cambria Math" panose="02040503050406030204" pitchFamily="18" charset="0"/>
+                                            <a:ea typeface="Cambria Math" panose="02040503050406030204" pitchFamily="18" charset="0"/>
+                                          </a:rPr>
+                                          <m:t>𝑜𝑓𝑓𝑠𝑒𝑡</m:t>
+                                        </m:r>
+                                      </m:sub>
+                                    </m:sSub>
+                                  </m:e>
+                                </m:d>
+                                <m:r>
+                                  <a:rPr lang="de-DE" sz="1600" b="0" i="1" smtClean="0">
+                                    <a:latin typeface="Cambria Math" panose="02040503050406030204" pitchFamily="18" charset="0"/>
+                                    <a:ea typeface="Cambria Math" panose="02040503050406030204" pitchFamily="18" charset="0"/>
+                                  </a:rPr>
+                                  <m:t>∗</m:t>
+                                </m:r>
+                                <m:d>
+                                  <m:dPr>
+                                    <m:ctrlPr>
+                                      <a:rPr lang="de-DE" sz="1600" b="0" i="1" smtClean="0">
+                                        <a:solidFill>
+                                          <a:srgbClr val="FF0000"/>
+                                        </a:solidFill>
+                                        <a:latin typeface="Cambria Math" panose="02040503050406030204" pitchFamily="18" charset="0"/>
+                                        <a:ea typeface="Cambria Math" panose="02040503050406030204" pitchFamily="18" charset="0"/>
+                                      </a:rPr>
+                                    </m:ctrlPr>
+                                  </m:dPr>
+                                  <m:e>
+                                    <m:r>
+                                      <a:rPr lang="de-DE" sz="1600" b="0" i="1" smtClean="0">
+                                        <a:latin typeface="Cambria Math" panose="02040503050406030204" pitchFamily="18" charset="0"/>
+                                        <a:ea typeface="Cambria Math" panose="02040503050406030204" pitchFamily="18" charset="0"/>
+                                      </a:rPr>
+                                      <m:t>𝑖𝑛𝑝𝑢𝑡</m:t>
+                                    </m:r>
+                                    <m:d>
+                                      <m:dPr>
+                                        <m:begChr m:val="["/>
+                                        <m:endChr m:val="]"/>
+                                        <m:ctrlPr>
+                                          <a:rPr lang="de-DE" sz="1600" b="0" i="1" smtClean="0">
+                                            <a:latin typeface="Cambria Math" panose="02040503050406030204" pitchFamily="18" charset="0"/>
+                                            <a:ea typeface="Cambria Math" panose="02040503050406030204" pitchFamily="18" charset="0"/>
+                                          </a:rPr>
+                                        </m:ctrlPr>
+                                      </m:dPr>
+                                      <m:e>
+                                        <m:r>
+                                          <a:rPr lang="de-DE" sz="1600" b="0" i="1" smtClean="0">
+                                            <a:latin typeface="Cambria Math" panose="02040503050406030204" pitchFamily="18" charset="0"/>
+                                            <a:ea typeface="Cambria Math" panose="02040503050406030204" pitchFamily="18" charset="0"/>
+                                          </a:rPr>
+                                          <m:t>𝑥</m:t>
+                                        </m:r>
+                                        <m:r>
+                                          <a:rPr lang="de-DE" sz="1600" b="0" i="1" smtClean="0">
+                                            <a:latin typeface="Cambria Math" panose="02040503050406030204" pitchFamily="18" charset="0"/>
+                                            <a:ea typeface="Cambria Math" panose="02040503050406030204" pitchFamily="18" charset="0"/>
+                                          </a:rPr>
+                                          <m:t>,</m:t>
+                                        </m:r>
+                                        <m:r>
+                                          <a:rPr lang="de-DE" sz="1600" b="0" i="1" smtClean="0">
+                                            <a:latin typeface="Cambria Math" panose="02040503050406030204" pitchFamily="18" charset="0"/>
+                                            <a:ea typeface="Cambria Math" panose="02040503050406030204" pitchFamily="18" charset="0"/>
+                                          </a:rPr>
+                                          <m:t>𝑦</m:t>
+                                        </m:r>
+                                        <m:r>
+                                          <a:rPr lang="de-DE" sz="1600" b="0" i="1" smtClean="0">
+                                            <a:latin typeface="Cambria Math" panose="02040503050406030204" pitchFamily="18" charset="0"/>
+                                            <a:ea typeface="Cambria Math" panose="02040503050406030204" pitchFamily="18" charset="0"/>
+                                          </a:rPr>
+                                          <m:t>,</m:t>
+                                        </m:r>
+                                        <m:r>
+                                          <a:rPr lang="de-DE" sz="1600" b="0" i="1" smtClean="0">
+                                            <a:latin typeface="Cambria Math" panose="02040503050406030204" pitchFamily="18" charset="0"/>
+                                            <a:ea typeface="Cambria Math" panose="02040503050406030204" pitchFamily="18" charset="0"/>
+                                          </a:rPr>
+                                          <m:t>𝑖</m:t>
+                                        </m:r>
+                                        <m:sSub>
+                                          <m:sSubPr>
+                                            <m:ctrlPr>
+                                              <a:rPr lang="de-DE" sz="1600" b="0" i="1" smtClean="0">
+                                                <a:latin typeface="Cambria Math" panose="02040503050406030204" pitchFamily="18" charset="0"/>
+                                                <a:ea typeface="Cambria Math" panose="02040503050406030204" pitchFamily="18" charset="0"/>
+                                              </a:rPr>
+                                            </m:ctrlPr>
+                                          </m:sSubPr>
+                                          <m:e>
+                                            <m:r>
+                                              <a:rPr lang="de-DE" sz="1600" b="0" i="1" smtClean="0">
+                                                <a:latin typeface="Cambria Math" panose="02040503050406030204" pitchFamily="18" charset="0"/>
+                                                <a:ea typeface="Cambria Math" panose="02040503050406030204" pitchFamily="18" charset="0"/>
+                                              </a:rPr>
+                                              <m:t>𝑛</m:t>
+                                            </m:r>
+                                          </m:e>
+                                          <m:sub>
+                                            <m:r>
+                                              <a:rPr lang="de-DE" sz="1600" b="0" i="1" smtClean="0">
+                                                <a:latin typeface="Cambria Math" panose="02040503050406030204" pitchFamily="18" charset="0"/>
+                                                <a:ea typeface="Cambria Math" panose="02040503050406030204" pitchFamily="18" charset="0"/>
+                                              </a:rPr>
+                                              <m:t>𝑐h𝑎𝑛𝑛𝑒𝑙</m:t>
+                                            </m:r>
+                                          </m:sub>
+                                        </m:sSub>
+                                      </m:e>
+                                    </m:d>
+                                    <m:r>
+                                      <a:rPr lang="de-DE" sz="1600" b="0" i="1" smtClean="0">
+                                        <a:latin typeface="Cambria Math" panose="02040503050406030204" pitchFamily="18" charset="0"/>
+                                        <a:ea typeface="Cambria Math" panose="02040503050406030204" pitchFamily="18" charset="0"/>
+                                      </a:rPr>
+                                      <m:t>+</m:t>
+                                    </m:r>
+                                    <m:r>
+                                      <a:rPr lang="de-DE" sz="1600" b="0" i="1" smtClean="0">
+                                        <a:solidFill>
+                                          <a:srgbClr val="FF0000"/>
+                                        </a:solidFill>
+                                        <a:latin typeface="Cambria Math" panose="02040503050406030204" pitchFamily="18" charset="0"/>
+                                        <a:ea typeface="Cambria Math" panose="02040503050406030204" pitchFamily="18" charset="0"/>
+                                      </a:rPr>
+                                      <m:t>𝑖𝑛𝑝𝑢</m:t>
+                                    </m:r>
+                                    <m:sSub>
+                                      <m:sSubPr>
+                                        <m:ctrlPr>
+                                          <a:rPr lang="de-DE" sz="1600" b="0" i="1" smtClean="0">
+                                            <a:solidFill>
+                                              <a:srgbClr val="FF0000"/>
+                                            </a:solidFill>
+                                            <a:latin typeface="Cambria Math" panose="02040503050406030204" pitchFamily="18" charset="0"/>
+                                            <a:ea typeface="Cambria Math" panose="02040503050406030204" pitchFamily="18" charset="0"/>
+                                          </a:rPr>
+                                        </m:ctrlPr>
+                                      </m:sSubPr>
+                                      <m:e>
+                                        <m:r>
+                                          <a:rPr lang="de-DE" sz="1600" b="0" i="1" smtClean="0">
+                                            <a:solidFill>
+                                              <a:srgbClr val="FF0000"/>
+                                            </a:solidFill>
+                                            <a:latin typeface="Cambria Math" panose="02040503050406030204" pitchFamily="18" charset="0"/>
+                                            <a:ea typeface="Cambria Math" panose="02040503050406030204" pitchFamily="18" charset="0"/>
+                                          </a:rPr>
+                                          <m:t>𝑡</m:t>
+                                        </m:r>
+                                      </m:e>
+                                      <m:sub>
+                                        <m:r>
+                                          <a:rPr lang="de-DE" sz="1600" b="0" i="1" smtClean="0">
+                                            <a:solidFill>
+                                              <a:srgbClr val="FF0000"/>
+                                            </a:solidFill>
+                                            <a:latin typeface="Cambria Math" panose="02040503050406030204" pitchFamily="18" charset="0"/>
+                                            <a:ea typeface="Cambria Math" panose="02040503050406030204" pitchFamily="18" charset="0"/>
+                                          </a:rPr>
+                                          <m:t>𝑜𝑓𝑓𝑠𝑒𝑡</m:t>
+                                        </m:r>
+                                      </m:sub>
+                                    </m:sSub>
+                                  </m:e>
+                                </m:d>
+                              </m:e>
+                            </m:nary>
+                          </m:e>
+                        </m:nary>
+                      </m:e>
+                    </m:d>
+                    <m:r>
+                      <a:rPr lang="de-DE" sz="1600" i="1">
+                        <a:latin typeface="Cambria Math" panose="02040503050406030204" pitchFamily="18" charset="0"/>
+                      </a:rPr>
+                      <m:t>+</m:t>
+                    </m:r>
+                    <m:r>
+                      <a:rPr lang="de-DE" sz="1600" b="0" i="1" smtClean="0">
+                        <a:latin typeface="Cambria Math" panose="02040503050406030204" pitchFamily="18" charset="0"/>
+                      </a:rPr>
+                      <m:t> </m:t>
+                    </m:r>
+                    <m:r>
+                      <a:rPr lang="de-DE" sz="1600" i="1">
+                        <a:latin typeface="Cambria Math" panose="02040503050406030204" pitchFamily="18" charset="0"/>
+                      </a:rPr>
+                      <m:t>𝑏𝑖𝑎𝑠</m:t>
+                    </m:r>
+                    <m:d>
+                      <m:dPr>
+                        <m:begChr m:val="["/>
+                        <m:endChr m:val="]"/>
+                        <m:ctrlPr>
+                          <a:rPr lang="de-DE" sz="1600" i="1">
+                            <a:latin typeface="Cambria Math" panose="02040503050406030204" pitchFamily="18" charset="0"/>
+                          </a:rPr>
+                        </m:ctrlPr>
+                      </m:dPr>
+                      <m:e>
+                        <m:r>
+                          <a:rPr lang="de-DE" sz="1600" i="1">
+                            <a:latin typeface="Cambria Math" panose="02040503050406030204" pitchFamily="18" charset="0"/>
+                          </a:rPr>
+                          <m:t>𝑜𝑢𝑡</m:t>
+                        </m:r>
+                        <m:r>
+                          <m:rPr>
+                            <m:lit/>
+                          </m:rPr>
+                          <a:rPr lang="de-DE" sz="1600" i="1">
+                            <a:latin typeface="Cambria Math" panose="02040503050406030204" pitchFamily="18" charset="0"/>
+                          </a:rPr>
+                          <m:t>_</m:t>
+                        </m:r>
+                        <m:r>
+                          <a:rPr lang="de-DE" sz="1600" i="1">
+                            <a:latin typeface="Cambria Math" panose="02040503050406030204" pitchFamily="18" charset="0"/>
+                          </a:rPr>
+                          <m:t>𝑐h𝑎𝑛𝑛𝑒𝑙</m:t>
+                        </m:r>
+                      </m:e>
+                    </m:d>
+                    <m:r>
+                      <a:rPr lang="de-DE" sz="1600" i="1">
+                        <a:latin typeface="Cambria Math" panose="02040503050406030204" pitchFamily="18" charset="0"/>
+                      </a:rPr>
+                      <m:t>)</m:t>
+                    </m:r>
+                  </m:oMath>
+                </a14:m>
+                <a:r>
+                  <a:rPr lang="de-DE" sz="1600" dirty="0"/>
+                  <a:t> </a:t>
+                </a:r>
+                <a:endParaRPr lang="de-DE" sz="1600" dirty="0" smtClean="0"/>
+              </a:p>
+              <a:p>
+                <a:pPr marL="288000" lvl="1" indent="0">
+                  <a:buNone/>
+                </a:pPr>
+                <a:endParaRPr lang="de-DE" sz="1600" dirty="0" smtClean="0"/>
+              </a:p>
+              <a:p>
+                <a:pPr marL="0" indent="0">
+                  <a:buNone/>
+                </a:pPr>
+                <a:r>
+                  <a:rPr lang="de-DE" sz="1600" dirty="0" smtClean="0"/>
+                  <a:t>Reformulate sum:</a:t>
+                </a:r>
+              </a:p>
+              <a:p>
+                <a:pPr marL="0" indent="0">
+                  <a:buNone/>
+                </a:pPr>
+                <a14:m>
+                  <m:oMath xmlns:m="http://schemas.openxmlformats.org/officeDocument/2006/math">
+                    <m:nary>
+                      <m:naryPr>
+                        <m:chr m:val="∑"/>
+                        <m:supHide m:val="on"/>
+                        <m:ctrlPr>
+                          <a:rPr lang="de-DE" sz="1600" i="1">
+                            <a:latin typeface="Cambria Math" panose="02040503050406030204" pitchFamily="18" charset="0"/>
+                          </a:rPr>
+                        </m:ctrlPr>
+                      </m:naryPr>
+                      <m:sub>
+                        <m:r>
+                          <a:rPr lang="de-DE" sz="1600" i="1">
+                            <a:latin typeface="Cambria Math" panose="02040503050406030204" pitchFamily="18" charset="0"/>
+                            <a:ea typeface="Cambria Math" panose="02040503050406030204" pitchFamily="18" charset="0"/>
+                          </a:rPr>
+                          <m:t>𝑓𝑖𝑙𝑡𝑒</m:t>
+                        </m:r>
+                        <m:sSub>
+                          <m:sSubPr>
+                            <m:ctrlPr>
+                              <a:rPr lang="de-DE" sz="1600" i="1">
+                                <a:latin typeface="Cambria Math" panose="02040503050406030204" pitchFamily="18" charset="0"/>
+                                <a:ea typeface="Cambria Math" panose="02040503050406030204" pitchFamily="18" charset="0"/>
+                              </a:rPr>
+                            </m:ctrlPr>
+                          </m:sSubPr>
+                          <m:e>
+                            <m:r>
+                              <a:rPr lang="de-DE" sz="1600" i="1">
+                                <a:latin typeface="Cambria Math" panose="02040503050406030204" pitchFamily="18" charset="0"/>
+                                <a:ea typeface="Cambria Math" panose="02040503050406030204" pitchFamily="18" charset="0"/>
+                              </a:rPr>
+                              <m:t>𝑟</m:t>
+                            </m:r>
+                          </m:e>
+                          <m:sub>
+                            <m:r>
+                              <a:rPr lang="de-DE" sz="1600" i="1">
+                                <a:latin typeface="Cambria Math" panose="02040503050406030204" pitchFamily="18" charset="0"/>
+                                <a:ea typeface="Cambria Math" panose="02040503050406030204" pitchFamily="18" charset="0"/>
+                              </a:rPr>
+                              <m:t>𝑦</m:t>
+                            </m:r>
+                          </m:sub>
+                        </m:sSub>
+                      </m:sub>
+                      <m:sup/>
+                      <m:e>
+                        <m:nary>
+                          <m:naryPr>
+                            <m:chr m:val="∑"/>
+                            <m:supHide m:val="on"/>
+                            <m:ctrlPr>
+                              <a:rPr lang="de-DE" sz="1600" i="1">
+                                <a:latin typeface="Cambria Math" panose="02040503050406030204" pitchFamily="18" charset="0"/>
+                                <a:ea typeface="Cambria Math" panose="02040503050406030204" pitchFamily="18" charset="0"/>
+                              </a:rPr>
+                            </m:ctrlPr>
+                          </m:naryPr>
+                          <m:sub>
+                            <m:r>
+                              <m:rPr>
+                                <m:brk m:alnAt="7"/>
+                              </m:rPr>
+                              <a:rPr lang="de-DE" sz="1600" i="1">
+                                <a:latin typeface="Cambria Math" panose="02040503050406030204" pitchFamily="18" charset="0"/>
+                                <a:ea typeface="Cambria Math" panose="02040503050406030204" pitchFamily="18" charset="0"/>
+                              </a:rPr>
+                              <m:t>𝑓</m:t>
+                            </m:r>
+                            <m:r>
+                              <a:rPr lang="de-DE" sz="1600" i="1">
+                                <a:latin typeface="Cambria Math" panose="02040503050406030204" pitchFamily="18" charset="0"/>
+                                <a:ea typeface="Cambria Math" panose="02040503050406030204" pitchFamily="18" charset="0"/>
+                              </a:rPr>
+                              <m:t>𝑖𝑙𝑡𝑒</m:t>
+                            </m:r>
+                            <m:sSub>
+                              <m:sSubPr>
+                                <m:ctrlPr>
+                                  <a:rPr lang="de-DE" sz="1600" i="1">
+                                    <a:latin typeface="Cambria Math" panose="02040503050406030204" pitchFamily="18" charset="0"/>
+                                    <a:ea typeface="Cambria Math" panose="02040503050406030204" pitchFamily="18" charset="0"/>
+                                  </a:rPr>
+                                </m:ctrlPr>
+                              </m:sSubPr>
+                              <m:e>
+                                <m:r>
+                                  <m:rPr>
+                                    <m:brk m:alnAt="7"/>
+                                  </m:rPr>
+                                  <a:rPr lang="de-DE" sz="1600" i="1">
+                                    <a:latin typeface="Cambria Math" panose="02040503050406030204" pitchFamily="18" charset="0"/>
+                                    <a:ea typeface="Cambria Math" panose="02040503050406030204" pitchFamily="18" charset="0"/>
+                                  </a:rPr>
+                                  <m:t>𝑟</m:t>
+                                </m:r>
+                              </m:e>
+                              <m:sub>
+                                <m:r>
+                                  <a:rPr lang="de-DE" sz="1600" i="1">
+                                    <a:latin typeface="Cambria Math" panose="02040503050406030204" pitchFamily="18" charset="0"/>
+                                    <a:ea typeface="Cambria Math" panose="02040503050406030204" pitchFamily="18" charset="0"/>
+                                  </a:rPr>
+                                  <m:t>𝑥</m:t>
+                                </m:r>
+                              </m:sub>
+                            </m:sSub>
+                          </m:sub>
+                          <m:sup/>
+                          <m:e>
+                            <m:r>
+                              <a:rPr lang="de-DE" sz="1600" i="1">
+                                <a:latin typeface="Cambria Math" panose="02040503050406030204" pitchFamily="18" charset="0"/>
+                                <a:ea typeface="Cambria Math" panose="02040503050406030204" pitchFamily="18" charset="0"/>
+                              </a:rPr>
+                              <m:t>(</m:t>
+                            </m:r>
+                            <m:r>
+                              <a:rPr lang="de-DE" sz="1600" i="1">
+                                <a:latin typeface="Cambria Math" panose="02040503050406030204" pitchFamily="18" charset="0"/>
+                                <a:ea typeface="Cambria Math" panose="02040503050406030204" pitchFamily="18" charset="0"/>
+                              </a:rPr>
+                              <m:t>𝑓𝑖𝑙𝑡𝑒𝑟</m:t>
+                            </m:r>
+                            <m:d>
+                              <m:dPr>
+                                <m:begChr m:val="["/>
+                                <m:endChr m:val="]"/>
+                                <m:ctrlPr>
+                                  <a:rPr lang="de-DE" sz="1600" i="1">
+                                    <a:latin typeface="Cambria Math" panose="02040503050406030204" pitchFamily="18" charset="0"/>
+                                    <a:ea typeface="Cambria Math" panose="02040503050406030204" pitchFamily="18" charset="0"/>
+                                  </a:rPr>
+                                </m:ctrlPr>
+                              </m:dPr>
+                              <m:e>
+                                <m:r>
+                                  <a:rPr lang="de-DE" sz="1600" i="1">
+                                    <a:latin typeface="Cambria Math" panose="02040503050406030204" pitchFamily="18" charset="0"/>
+                                    <a:ea typeface="Cambria Math" panose="02040503050406030204" pitchFamily="18" charset="0"/>
+                                  </a:rPr>
+                                  <m:t>𝑥</m:t>
+                                </m:r>
+                                <m:r>
+                                  <a:rPr lang="de-DE" sz="1600" i="1">
+                                    <a:latin typeface="Cambria Math" panose="02040503050406030204" pitchFamily="18" charset="0"/>
+                                    <a:ea typeface="Cambria Math" panose="02040503050406030204" pitchFamily="18" charset="0"/>
+                                  </a:rPr>
+                                  <m:t>,</m:t>
+                                </m:r>
+                                <m:r>
+                                  <a:rPr lang="de-DE" sz="1600" i="1">
+                                    <a:latin typeface="Cambria Math" panose="02040503050406030204" pitchFamily="18" charset="0"/>
+                                    <a:ea typeface="Cambria Math" panose="02040503050406030204" pitchFamily="18" charset="0"/>
+                                  </a:rPr>
+                                  <m:t>𝑦</m:t>
+                                </m:r>
+                                <m:r>
+                                  <a:rPr lang="de-DE" sz="1600" i="1">
+                                    <a:latin typeface="Cambria Math" panose="02040503050406030204" pitchFamily="18" charset="0"/>
+                                    <a:ea typeface="Cambria Math" panose="02040503050406030204" pitchFamily="18" charset="0"/>
+                                  </a:rPr>
+                                  <m:t>,</m:t>
+                                </m:r>
+                                <m:r>
+                                  <a:rPr lang="de-DE" sz="1600" i="1">
+                                    <a:latin typeface="Cambria Math" panose="02040503050406030204" pitchFamily="18" charset="0"/>
+                                    <a:ea typeface="Cambria Math" panose="02040503050406030204" pitchFamily="18" charset="0"/>
+                                  </a:rPr>
+                                  <m:t>𝑜𝑢</m:t>
+                                </m:r>
+                                <m:sSub>
+                                  <m:sSubPr>
+                                    <m:ctrlPr>
+                                      <a:rPr lang="de-DE" sz="1600" i="1">
+                                        <a:latin typeface="Cambria Math" panose="02040503050406030204" pitchFamily="18" charset="0"/>
+                                        <a:ea typeface="Cambria Math" panose="02040503050406030204" pitchFamily="18" charset="0"/>
+                                      </a:rPr>
+                                    </m:ctrlPr>
+                                  </m:sSubPr>
+                                  <m:e>
+                                    <m:r>
+                                      <a:rPr lang="de-DE" sz="1600" i="1">
+                                        <a:latin typeface="Cambria Math" panose="02040503050406030204" pitchFamily="18" charset="0"/>
+                                        <a:ea typeface="Cambria Math" panose="02040503050406030204" pitchFamily="18" charset="0"/>
+                                      </a:rPr>
+                                      <m:t>𝑡</m:t>
+                                    </m:r>
+                                  </m:e>
+                                  <m:sub>
+                                    <m:r>
+                                      <a:rPr lang="de-DE" sz="1600" i="1">
+                                        <a:latin typeface="Cambria Math" panose="02040503050406030204" pitchFamily="18" charset="0"/>
+                                        <a:ea typeface="Cambria Math" panose="02040503050406030204" pitchFamily="18" charset="0"/>
+                                      </a:rPr>
+                                      <m:t>𝑐h𝑎𝑛𝑛𝑒𝑙</m:t>
+                                    </m:r>
+                                  </m:sub>
+                                </m:sSub>
+                              </m:e>
+                            </m:d>
+                            <m:r>
+                              <a:rPr lang="de-DE" sz="1600" i="1">
+                                <a:latin typeface="Cambria Math" panose="02040503050406030204" pitchFamily="18" charset="0"/>
+                                <a:ea typeface="Cambria Math" panose="02040503050406030204" pitchFamily="18" charset="0"/>
+                              </a:rPr>
+                              <m:t>+</m:t>
+                            </m:r>
+                            <m:r>
+                              <a:rPr lang="de-DE" sz="1600" i="1">
+                                <a:solidFill>
+                                  <a:srgbClr val="FF0000"/>
+                                </a:solidFill>
+                                <a:latin typeface="Cambria Math" panose="02040503050406030204" pitchFamily="18" charset="0"/>
+                                <a:ea typeface="Cambria Math" panose="02040503050406030204" pitchFamily="18" charset="0"/>
+                              </a:rPr>
+                              <m:t>𝑓𝑖𝑙𝑡𝑒</m:t>
+                            </m:r>
+                            <m:sSub>
+                              <m:sSubPr>
+                                <m:ctrlPr>
+                                  <a:rPr lang="de-DE" sz="1600" i="1">
+                                    <a:solidFill>
+                                      <a:srgbClr val="FF0000"/>
+                                    </a:solidFill>
+                                    <a:latin typeface="Cambria Math" panose="02040503050406030204" pitchFamily="18" charset="0"/>
+                                    <a:ea typeface="Cambria Math" panose="02040503050406030204" pitchFamily="18" charset="0"/>
+                                  </a:rPr>
+                                </m:ctrlPr>
+                              </m:sSubPr>
+                              <m:e>
+                                <m:r>
+                                  <a:rPr lang="de-DE" sz="1600" i="1">
+                                    <a:solidFill>
+                                      <a:srgbClr val="FF0000"/>
+                                    </a:solidFill>
+                                    <a:latin typeface="Cambria Math" panose="02040503050406030204" pitchFamily="18" charset="0"/>
+                                    <a:ea typeface="Cambria Math" panose="02040503050406030204" pitchFamily="18" charset="0"/>
+                                  </a:rPr>
+                                  <m:t>𝑟</m:t>
+                                </m:r>
+                              </m:e>
+                              <m:sub>
+                                <m:r>
+                                  <a:rPr lang="de-DE" sz="1600" i="1">
+                                    <a:solidFill>
+                                      <a:srgbClr val="FF0000"/>
+                                    </a:solidFill>
+                                    <a:latin typeface="Cambria Math" panose="02040503050406030204" pitchFamily="18" charset="0"/>
+                                    <a:ea typeface="Cambria Math" panose="02040503050406030204" pitchFamily="18" charset="0"/>
+                                  </a:rPr>
+                                  <m:t>𝑜𝑓𝑓𝑠𝑒𝑡</m:t>
+                                </m:r>
+                              </m:sub>
+                            </m:sSub>
+                            <m:r>
+                              <a:rPr lang="de-DE" sz="1600" i="1">
+                                <a:latin typeface="Cambria Math" panose="02040503050406030204" pitchFamily="18" charset="0"/>
+                                <a:ea typeface="Cambria Math" panose="02040503050406030204" pitchFamily="18" charset="0"/>
+                              </a:rPr>
+                              <m:t>)∗(</m:t>
+                            </m:r>
+                            <m:r>
+                              <a:rPr lang="de-DE" sz="1600" i="1">
+                                <a:latin typeface="Cambria Math" panose="02040503050406030204" pitchFamily="18" charset="0"/>
+                                <a:ea typeface="Cambria Math" panose="02040503050406030204" pitchFamily="18" charset="0"/>
+                              </a:rPr>
+                              <m:t>𝑖𝑛𝑝𝑢𝑡</m:t>
+                            </m:r>
+                            <m:d>
+                              <m:dPr>
+                                <m:begChr m:val="["/>
+                                <m:endChr m:val="]"/>
+                                <m:ctrlPr>
+                                  <a:rPr lang="de-DE" sz="1600" i="1">
+                                    <a:latin typeface="Cambria Math" panose="02040503050406030204" pitchFamily="18" charset="0"/>
+                                    <a:ea typeface="Cambria Math" panose="02040503050406030204" pitchFamily="18" charset="0"/>
+                                  </a:rPr>
+                                </m:ctrlPr>
+                              </m:dPr>
+                              <m:e>
+                                <m:r>
+                                  <a:rPr lang="de-DE" sz="1600" i="1">
+                                    <a:latin typeface="Cambria Math" panose="02040503050406030204" pitchFamily="18" charset="0"/>
+                                    <a:ea typeface="Cambria Math" panose="02040503050406030204" pitchFamily="18" charset="0"/>
+                                  </a:rPr>
+                                  <m:t>𝑥</m:t>
+                                </m:r>
+                                <m:r>
+                                  <a:rPr lang="de-DE" sz="1600" i="1">
+                                    <a:latin typeface="Cambria Math" panose="02040503050406030204" pitchFamily="18" charset="0"/>
+                                    <a:ea typeface="Cambria Math" panose="02040503050406030204" pitchFamily="18" charset="0"/>
+                                  </a:rPr>
+                                  <m:t>,</m:t>
+                                </m:r>
+                                <m:r>
+                                  <a:rPr lang="de-DE" sz="1600" i="1">
+                                    <a:latin typeface="Cambria Math" panose="02040503050406030204" pitchFamily="18" charset="0"/>
+                                    <a:ea typeface="Cambria Math" panose="02040503050406030204" pitchFamily="18" charset="0"/>
+                                  </a:rPr>
+                                  <m:t>𝑦</m:t>
+                                </m:r>
+                                <m:r>
+                                  <a:rPr lang="de-DE" sz="1600" i="1">
+                                    <a:latin typeface="Cambria Math" panose="02040503050406030204" pitchFamily="18" charset="0"/>
+                                    <a:ea typeface="Cambria Math" panose="02040503050406030204" pitchFamily="18" charset="0"/>
+                                  </a:rPr>
+                                  <m:t>,</m:t>
+                                </m:r>
+                                <m:r>
+                                  <a:rPr lang="de-DE" sz="1600" i="1">
+                                    <a:latin typeface="Cambria Math" panose="02040503050406030204" pitchFamily="18" charset="0"/>
+                                    <a:ea typeface="Cambria Math" panose="02040503050406030204" pitchFamily="18" charset="0"/>
+                                  </a:rPr>
+                                  <m:t>𝑖</m:t>
+                                </m:r>
+                                <m:sSub>
+                                  <m:sSubPr>
+                                    <m:ctrlPr>
+                                      <a:rPr lang="de-DE" sz="1600" i="1">
+                                        <a:latin typeface="Cambria Math" panose="02040503050406030204" pitchFamily="18" charset="0"/>
+                                        <a:ea typeface="Cambria Math" panose="02040503050406030204" pitchFamily="18" charset="0"/>
+                                      </a:rPr>
+                                    </m:ctrlPr>
+                                  </m:sSubPr>
+                                  <m:e>
+                                    <m:r>
+                                      <a:rPr lang="de-DE" sz="1600" i="1">
+                                        <a:latin typeface="Cambria Math" panose="02040503050406030204" pitchFamily="18" charset="0"/>
+                                        <a:ea typeface="Cambria Math" panose="02040503050406030204" pitchFamily="18" charset="0"/>
+                                      </a:rPr>
+                                      <m:t>𝑛</m:t>
+                                    </m:r>
+                                  </m:e>
+                                  <m:sub>
+                                    <m:r>
+                                      <a:rPr lang="de-DE" sz="1600" i="1">
+                                        <a:latin typeface="Cambria Math" panose="02040503050406030204" pitchFamily="18" charset="0"/>
+                                        <a:ea typeface="Cambria Math" panose="02040503050406030204" pitchFamily="18" charset="0"/>
+                                      </a:rPr>
+                                      <m:t>𝑐h𝑎𝑛𝑛𝑒𝑙</m:t>
+                                    </m:r>
+                                  </m:sub>
+                                </m:sSub>
+                              </m:e>
+                            </m:d>
+                            <m:r>
+                              <a:rPr lang="de-DE" sz="1600" i="1">
+                                <a:latin typeface="Cambria Math" panose="02040503050406030204" pitchFamily="18" charset="0"/>
+                                <a:ea typeface="Cambria Math" panose="02040503050406030204" pitchFamily="18" charset="0"/>
+                              </a:rPr>
+                              <m:t>+</m:t>
+                            </m:r>
+                            <m:r>
+                              <a:rPr lang="de-DE" sz="1600" i="1">
+                                <a:solidFill>
+                                  <a:srgbClr val="FF0000"/>
+                                </a:solidFill>
+                                <a:latin typeface="Cambria Math" panose="02040503050406030204" pitchFamily="18" charset="0"/>
+                                <a:ea typeface="Cambria Math" panose="02040503050406030204" pitchFamily="18" charset="0"/>
+                              </a:rPr>
+                              <m:t>𝑖𝑛𝑝𝑢</m:t>
+                            </m:r>
+                            <m:sSub>
+                              <m:sSubPr>
+                                <m:ctrlPr>
+                                  <a:rPr lang="de-DE" sz="1600" i="1">
+                                    <a:solidFill>
+                                      <a:srgbClr val="FF0000"/>
+                                    </a:solidFill>
+                                    <a:latin typeface="Cambria Math" panose="02040503050406030204" pitchFamily="18" charset="0"/>
+                                    <a:ea typeface="Cambria Math" panose="02040503050406030204" pitchFamily="18" charset="0"/>
+                                  </a:rPr>
+                                </m:ctrlPr>
+                              </m:sSubPr>
+                              <m:e>
+                                <m:r>
+                                  <a:rPr lang="de-DE" sz="1600" i="1">
+                                    <a:solidFill>
+                                      <a:srgbClr val="FF0000"/>
+                                    </a:solidFill>
+                                    <a:latin typeface="Cambria Math" panose="02040503050406030204" pitchFamily="18" charset="0"/>
+                                    <a:ea typeface="Cambria Math" panose="02040503050406030204" pitchFamily="18" charset="0"/>
+                                  </a:rPr>
+                                  <m:t>𝑡</m:t>
+                                </m:r>
+                              </m:e>
+                              <m:sub>
+                                <m:r>
+                                  <a:rPr lang="de-DE" sz="1600" i="1">
+                                    <a:solidFill>
+                                      <a:srgbClr val="FF0000"/>
+                                    </a:solidFill>
+                                    <a:latin typeface="Cambria Math" panose="02040503050406030204" pitchFamily="18" charset="0"/>
+                                    <a:ea typeface="Cambria Math" panose="02040503050406030204" pitchFamily="18" charset="0"/>
+                                  </a:rPr>
+                                  <m:t>𝑜𝑓𝑓𝑠𝑒𝑡</m:t>
+                                </m:r>
+                              </m:sub>
+                            </m:sSub>
+                            <m:r>
+                              <a:rPr lang="de-DE" sz="1600" i="1">
+                                <a:latin typeface="Cambria Math" panose="02040503050406030204" pitchFamily="18" charset="0"/>
+                                <a:ea typeface="Cambria Math" panose="02040503050406030204" pitchFamily="18" charset="0"/>
+                              </a:rPr>
+                              <m:t>)</m:t>
+                            </m:r>
+                          </m:e>
+                        </m:nary>
+                      </m:e>
+                    </m:nary>
+                  </m:oMath>
+                </a14:m>
+                <a:r>
+                  <a:rPr lang="de-DE" sz="1600" dirty="0" smtClean="0"/>
+                  <a:t> =</a:t>
+                </a:r>
+              </a:p>
+              <a:p>
+                <a:pPr marL="0" indent="0">
+                  <a:buNone/>
+                </a:pPr>
+                <a:endParaRPr lang="de-DE" sz="1600" dirty="0"/>
+              </a:p>
+              <a:p>
+                <a:pPr marL="0" indent="0">
+                  <a:buNone/>
+                </a:pPr>
+                <a14:m>
+                  <m:oMathPara xmlns:m="http://schemas.openxmlformats.org/officeDocument/2006/math">
+                    <m:oMathParaPr>
+                      <m:jc m:val="centerGroup"/>
+                    </m:oMathParaPr>
+                    <m:oMath xmlns:m="http://schemas.openxmlformats.org/officeDocument/2006/math">
+                      <m:d>
+                        <m:dPr>
+                          <m:ctrlPr>
+                            <a:rPr lang="de-DE" sz="1600" b="0" i="1" smtClean="0">
+                              <a:latin typeface="Cambria Math" panose="02040503050406030204" pitchFamily="18" charset="0"/>
+                            </a:rPr>
+                          </m:ctrlPr>
+                        </m:dPr>
+                        <m:e>
+                          <m:nary>
+                            <m:naryPr>
+                              <m:chr m:val="∑"/>
+                              <m:supHide m:val="on"/>
+                              <m:ctrlPr>
+                                <a:rPr lang="de-DE" sz="1600" i="1" smtClean="0">
+                                  <a:latin typeface="Cambria Math" panose="02040503050406030204" pitchFamily="18" charset="0"/>
+                                </a:rPr>
+                              </m:ctrlPr>
+                            </m:naryPr>
+                            <m:sub>
+                              <m:r>
+                                <m:rPr>
+                                  <m:brk m:alnAt="7"/>
+                                </m:rPr>
+                                <a:rPr lang="de-DE" sz="1600" b="0" i="1" smtClean="0">
+                                  <a:latin typeface="Cambria Math" panose="02040503050406030204" pitchFamily="18" charset="0"/>
+                                </a:rPr>
+                                <m:t>𝑓</m:t>
+                              </m:r>
+                              <m:r>
+                                <a:rPr lang="de-DE" sz="1600" b="0" i="1" smtClean="0">
+                                  <a:latin typeface="Cambria Math" panose="02040503050406030204" pitchFamily="18" charset="0"/>
+                                </a:rPr>
+                                <m:t>𝑖𝑙𝑡𝑒</m:t>
+                              </m:r>
+                              <m:sSub>
+                                <m:sSubPr>
+                                  <m:ctrlPr>
+                                    <a:rPr lang="de-DE" sz="1600" b="0" i="1" smtClean="0">
+                                      <a:latin typeface="Cambria Math" panose="02040503050406030204" pitchFamily="18" charset="0"/>
+                                    </a:rPr>
+                                  </m:ctrlPr>
+                                </m:sSubPr>
+                                <m:e>
+                                  <m:r>
+                                    <m:rPr>
+                                      <m:brk m:alnAt="7"/>
+                                    </m:rPr>
+                                    <a:rPr lang="de-DE" sz="1600" b="0" i="1" smtClean="0">
+                                      <a:latin typeface="Cambria Math" panose="02040503050406030204" pitchFamily="18" charset="0"/>
+                                    </a:rPr>
+                                    <m:t>𝑟</m:t>
+                                  </m:r>
+                                </m:e>
+                                <m:sub>
+                                  <m:r>
+                                    <m:rPr>
+                                      <m:brk m:alnAt="7"/>
+                                    </m:rPr>
+                                    <a:rPr lang="de-DE" sz="1600" b="0" i="1" smtClean="0">
+                                      <a:latin typeface="Cambria Math" panose="02040503050406030204" pitchFamily="18" charset="0"/>
+                                    </a:rPr>
+                                    <m:t>𝑦</m:t>
+                                  </m:r>
+                                </m:sub>
+                              </m:sSub>
+                            </m:sub>
+                            <m:sup/>
+                            <m:e>
+                              <m:nary>
+                                <m:naryPr>
+                                  <m:chr m:val="∑"/>
+                                  <m:supHide m:val="on"/>
+                                  <m:ctrlPr>
+                                    <a:rPr lang="de-DE" sz="1600" i="1" smtClean="0">
+                                      <a:latin typeface="Cambria Math" panose="02040503050406030204" pitchFamily="18" charset="0"/>
+                                    </a:rPr>
+                                  </m:ctrlPr>
+                                </m:naryPr>
+                                <m:sub>
+                                  <m:r>
+                                    <m:rPr>
+                                      <m:brk m:alnAt="7"/>
+                                    </m:rPr>
+                                    <a:rPr lang="de-DE" sz="1600" b="0" i="1" smtClean="0">
+                                      <a:latin typeface="Cambria Math" panose="02040503050406030204" pitchFamily="18" charset="0"/>
+                                    </a:rPr>
+                                    <m:t>𝑓</m:t>
+                                  </m:r>
+                                  <m:r>
+                                    <a:rPr lang="de-DE" sz="1600" b="0" i="1" smtClean="0">
+                                      <a:latin typeface="Cambria Math" panose="02040503050406030204" pitchFamily="18" charset="0"/>
+                                    </a:rPr>
+                                    <m:t>𝑖𝑙𝑡𝑒</m:t>
+                                  </m:r>
+                                  <m:sSub>
+                                    <m:sSubPr>
+                                      <m:ctrlPr>
+                                        <a:rPr lang="de-DE" sz="1600" b="0" i="1" smtClean="0">
+                                          <a:latin typeface="Cambria Math" panose="02040503050406030204" pitchFamily="18" charset="0"/>
+                                        </a:rPr>
+                                      </m:ctrlPr>
+                                    </m:sSubPr>
+                                    <m:e>
+                                      <m:r>
+                                        <m:rPr>
+                                          <m:brk m:alnAt="7"/>
+                                        </m:rPr>
+                                        <a:rPr lang="de-DE" sz="1600" b="0" i="1" smtClean="0">
+                                          <a:latin typeface="Cambria Math" panose="02040503050406030204" pitchFamily="18" charset="0"/>
+                                        </a:rPr>
+                                        <m:t>𝑟</m:t>
+                                      </m:r>
+                                    </m:e>
+                                    <m:sub>
+                                      <m:r>
+                                        <m:rPr>
+                                          <m:brk m:alnAt="7"/>
+                                        </m:rPr>
+                                        <a:rPr lang="de-DE" sz="1600" b="0" i="1" smtClean="0">
+                                          <a:latin typeface="Cambria Math" panose="02040503050406030204" pitchFamily="18" charset="0"/>
+                                        </a:rPr>
+                                        <m:t>𝑥</m:t>
+                                      </m:r>
+                                    </m:sub>
+                                  </m:sSub>
+                                </m:sub>
+                                <m:sup/>
+                                <m:e>
+                                  <m:r>
+                                    <a:rPr lang="de-DE" sz="1600" i="1">
+                                      <a:latin typeface="Cambria Math" panose="02040503050406030204" pitchFamily="18" charset="0"/>
+                                      <a:ea typeface="Cambria Math" panose="02040503050406030204" pitchFamily="18" charset="0"/>
+                                    </a:rPr>
+                                    <m:t>𝑓𝑖𝑙𝑡𝑒𝑟</m:t>
+                                  </m:r>
+                                  <m:d>
+                                    <m:dPr>
+                                      <m:begChr m:val="["/>
+                                      <m:endChr m:val="]"/>
+                                      <m:ctrlPr>
+                                        <a:rPr lang="de-DE" sz="1600" i="1">
+                                          <a:latin typeface="Cambria Math" panose="02040503050406030204" pitchFamily="18" charset="0"/>
+                                          <a:ea typeface="Cambria Math" panose="02040503050406030204" pitchFamily="18" charset="0"/>
+                                        </a:rPr>
+                                      </m:ctrlPr>
+                                    </m:dPr>
+                                    <m:e>
+                                      <m:r>
+                                        <a:rPr lang="de-DE" sz="1600" i="1">
+                                          <a:latin typeface="Cambria Math" panose="02040503050406030204" pitchFamily="18" charset="0"/>
+                                          <a:ea typeface="Cambria Math" panose="02040503050406030204" pitchFamily="18" charset="0"/>
+                                        </a:rPr>
+                                        <m:t>𝑥</m:t>
+                                      </m:r>
+                                      <m:r>
+                                        <a:rPr lang="de-DE" sz="1600" i="1">
+                                          <a:latin typeface="Cambria Math" panose="02040503050406030204" pitchFamily="18" charset="0"/>
+                                          <a:ea typeface="Cambria Math" panose="02040503050406030204" pitchFamily="18" charset="0"/>
+                                        </a:rPr>
+                                        <m:t>,</m:t>
+                                      </m:r>
+                                      <m:r>
+                                        <a:rPr lang="de-DE" sz="1600" i="1">
+                                          <a:latin typeface="Cambria Math" panose="02040503050406030204" pitchFamily="18" charset="0"/>
+                                          <a:ea typeface="Cambria Math" panose="02040503050406030204" pitchFamily="18" charset="0"/>
+                                        </a:rPr>
+                                        <m:t>𝑦</m:t>
+                                      </m:r>
+                                      <m:r>
+                                        <a:rPr lang="de-DE" sz="1600" i="1">
+                                          <a:latin typeface="Cambria Math" panose="02040503050406030204" pitchFamily="18" charset="0"/>
+                                          <a:ea typeface="Cambria Math" panose="02040503050406030204" pitchFamily="18" charset="0"/>
+                                        </a:rPr>
+                                        <m:t>,</m:t>
+                                      </m:r>
+                                      <m:r>
+                                        <a:rPr lang="de-DE" sz="1600" i="1">
+                                          <a:latin typeface="Cambria Math" panose="02040503050406030204" pitchFamily="18" charset="0"/>
+                                          <a:ea typeface="Cambria Math" panose="02040503050406030204" pitchFamily="18" charset="0"/>
+                                        </a:rPr>
+                                        <m:t>𝑜𝑢</m:t>
+                                      </m:r>
+                                      <m:sSub>
+                                        <m:sSubPr>
+                                          <m:ctrlPr>
+                                            <a:rPr lang="de-DE" sz="1600" i="1">
+                                              <a:latin typeface="Cambria Math" panose="02040503050406030204" pitchFamily="18" charset="0"/>
+                                              <a:ea typeface="Cambria Math" panose="02040503050406030204" pitchFamily="18" charset="0"/>
+                                            </a:rPr>
+                                          </m:ctrlPr>
+                                        </m:sSubPr>
+                                        <m:e>
+                                          <m:r>
+                                            <a:rPr lang="de-DE" sz="1600" i="1">
+                                              <a:latin typeface="Cambria Math" panose="02040503050406030204" pitchFamily="18" charset="0"/>
+                                              <a:ea typeface="Cambria Math" panose="02040503050406030204" pitchFamily="18" charset="0"/>
+                                            </a:rPr>
+                                            <m:t>𝑡</m:t>
+                                          </m:r>
+                                        </m:e>
+                                        <m:sub>
+                                          <m:r>
+                                            <a:rPr lang="de-DE" sz="1600" i="1">
+                                              <a:latin typeface="Cambria Math" panose="02040503050406030204" pitchFamily="18" charset="0"/>
+                                              <a:ea typeface="Cambria Math" panose="02040503050406030204" pitchFamily="18" charset="0"/>
+                                            </a:rPr>
+                                            <m:t>𝑐h𝑎𝑛𝑛𝑒𝑙</m:t>
+                                          </m:r>
+                                        </m:sub>
+                                      </m:sSub>
+                                    </m:e>
+                                  </m:d>
+                                  <m:r>
+                                    <a:rPr lang="de-DE" sz="1600" b="0" i="1" smtClean="0">
+                                      <a:latin typeface="Cambria Math" panose="02040503050406030204" pitchFamily="18" charset="0"/>
+                                      <a:ea typeface="Cambria Math" panose="02040503050406030204" pitchFamily="18" charset="0"/>
+                                    </a:rPr>
+                                    <m:t>∗</m:t>
+                                  </m:r>
+                                  <m:r>
+                                    <a:rPr lang="de-DE" sz="1600" i="1">
+                                      <a:latin typeface="Cambria Math" panose="02040503050406030204" pitchFamily="18" charset="0"/>
+                                      <a:ea typeface="Cambria Math" panose="02040503050406030204" pitchFamily="18" charset="0"/>
+                                    </a:rPr>
+                                    <m:t>𝑖𝑛𝑝𝑢𝑡</m:t>
+                                  </m:r>
+                                  <m:d>
+                                    <m:dPr>
+                                      <m:begChr m:val="["/>
+                                      <m:endChr m:val="]"/>
+                                      <m:ctrlPr>
+                                        <a:rPr lang="de-DE" sz="1600" i="1">
+                                          <a:latin typeface="Cambria Math" panose="02040503050406030204" pitchFamily="18" charset="0"/>
+                                          <a:ea typeface="Cambria Math" panose="02040503050406030204" pitchFamily="18" charset="0"/>
+                                        </a:rPr>
+                                      </m:ctrlPr>
+                                    </m:dPr>
+                                    <m:e>
+                                      <m:r>
+                                        <a:rPr lang="de-DE" sz="1600" i="1">
+                                          <a:latin typeface="Cambria Math" panose="02040503050406030204" pitchFamily="18" charset="0"/>
+                                          <a:ea typeface="Cambria Math" panose="02040503050406030204" pitchFamily="18" charset="0"/>
+                                        </a:rPr>
+                                        <m:t>𝑥</m:t>
+                                      </m:r>
+                                      <m:r>
+                                        <a:rPr lang="de-DE" sz="1600" i="1">
+                                          <a:latin typeface="Cambria Math" panose="02040503050406030204" pitchFamily="18" charset="0"/>
+                                          <a:ea typeface="Cambria Math" panose="02040503050406030204" pitchFamily="18" charset="0"/>
+                                        </a:rPr>
+                                        <m:t>,</m:t>
+                                      </m:r>
+                                      <m:r>
+                                        <a:rPr lang="de-DE" sz="1600" i="1">
+                                          <a:latin typeface="Cambria Math" panose="02040503050406030204" pitchFamily="18" charset="0"/>
+                                          <a:ea typeface="Cambria Math" panose="02040503050406030204" pitchFamily="18" charset="0"/>
+                                        </a:rPr>
+                                        <m:t>𝑦</m:t>
+                                      </m:r>
+                                      <m:r>
+                                        <a:rPr lang="de-DE" sz="1600" i="1">
+                                          <a:latin typeface="Cambria Math" panose="02040503050406030204" pitchFamily="18" charset="0"/>
+                                          <a:ea typeface="Cambria Math" panose="02040503050406030204" pitchFamily="18" charset="0"/>
+                                        </a:rPr>
+                                        <m:t>,</m:t>
+                                      </m:r>
+                                      <m:r>
+                                        <a:rPr lang="de-DE" sz="1600" i="1">
+                                          <a:latin typeface="Cambria Math" panose="02040503050406030204" pitchFamily="18" charset="0"/>
+                                          <a:ea typeface="Cambria Math" panose="02040503050406030204" pitchFamily="18" charset="0"/>
+                                        </a:rPr>
+                                        <m:t>𝑖</m:t>
+                                      </m:r>
+                                      <m:sSub>
+                                        <m:sSubPr>
+                                          <m:ctrlPr>
+                                            <a:rPr lang="de-DE" sz="1600" i="1">
+                                              <a:latin typeface="Cambria Math" panose="02040503050406030204" pitchFamily="18" charset="0"/>
+                                              <a:ea typeface="Cambria Math" panose="02040503050406030204" pitchFamily="18" charset="0"/>
+                                            </a:rPr>
+                                          </m:ctrlPr>
+                                        </m:sSubPr>
+                                        <m:e>
+                                          <m:r>
+                                            <a:rPr lang="de-DE" sz="1600" i="1">
+                                              <a:latin typeface="Cambria Math" panose="02040503050406030204" pitchFamily="18" charset="0"/>
+                                              <a:ea typeface="Cambria Math" panose="02040503050406030204" pitchFamily="18" charset="0"/>
+                                            </a:rPr>
+                                            <m:t>𝑛</m:t>
+                                          </m:r>
+                                        </m:e>
+                                        <m:sub>
+                                          <m:r>
+                                            <a:rPr lang="de-DE" sz="1600" i="1">
+                                              <a:latin typeface="Cambria Math" panose="02040503050406030204" pitchFamily="18" charset="0"/>
+                                              <a:ea typeface="Cambria Math" panose="02040503050406030204" pitchFamily="18" charset="0"/>
+                                            </a:rPr>
+                                            <m:t>𝑐h𝑎𝑛𝑛𝑒𝑙</m:t>
+                                          </m:r>
+                                        </m:sub>
+                                      </m:sSub>
+                                    </m:e>
+                                  </m:d>
+                                </m:e>
+                              </m:nary>
+                            </m:e>
+                          </m:nary>
+                        </m:e>
+                      </m:d>
+                      <m:r>
+                        <a:rPr lang="de-DE" sz="1600" b="0" i="1" smtClean="0">
+                          <a:latin typeface="Cambria Math" panose="02040503050406030204" pitchFamily="18" charset="0"/>
+                        </a:rPr>
+                        <m:t>+</m:t>
+                      </m:r>
+                      <m:d>
+                        <m:dPr>
+                          <m:ctrlPr>
+                            <a:rPr lang="de-DE" sz="1600" b="0" i="1" smtClean="0">
+                              <a:latin typeface="Cambria Math" panose="02040503050406030204" pitchFamily="18" charset="0"/>
+                            </a:rPr>
+                          </m:ctrlPr>
+                        </m:dPr>
+                        <m:e>
+                          <m:r>
+                            <a:rPr lang="de-DE" sz="1600" b="0" i="1" smtClean="0">
+                              <a:latin typeface="Cambria Math" panose="02040503050406030204" pitchFamily="18" charset="0"/>
+                            </a:rPr>
+                            <m:t>𝑖𝑛𝑝𝑢</m:t>
+                          </m:r>
+                          <m:sSub>
+                            <m:sSubPr>
+                              <m:ctrlPr>
+                                <a:rPr lang="de-DE" sz="1600" b="0" i="1" smtClean="0">
+                                  <a:latin typeface="Cambria Math" panose="02040503050406030204" pitchFamily="18" charset="0"/>
+                                </a:rPr>
+                              </m:ctrlPr>
+                            </m:sSubPr>
+                            <m:e>
+                              <m:r>
+                                <a:rPr lang="de-DE" sz="1600" b="0" i="1" smtClean="0">
+                                  <a:latin typeface="Cambria Math" panose="02040503050406030204" pitchFamily="18" charset="0"/>
+                                </a:rPr>
+                                <m:t>𝑡</m:t>
+                              </m:r>
+                            </m:e>
+                            <m:sub>
+                              <m:r>
+                                <a:rPr lang="de-DE" sz="1600" b="0" i="1" smtClean="0">
+                                  <a:latin typeface="Cambria Math" panose="02040503050406030204" pitchFamily="18" charset="0"/>
+                                </a:rPr>
+                                <m:t>𝑜𝑓𝑓𝑠𝑒𝑡</m:t>
+                              </m:r>
+                            </m:sub>
+                          </m:sSub>
+                          <m:r>
+                            <a:rPr lang="de-DE" sz="1600" b="0" i="1" smtClean="0">
+                              <a:latin typeface="Cambria Math" panose="02040503050406030204" pitchFamily="18" charset="0"/>
+                            </a:rPr>
+                            <m:t>∗</m:t>
+                          </m:r>
+                          <m:nary>
+                            <m:naryPr>
+                              <m:chr m:val="∑"/>
+                              <m:supHide m:val="on"/>
+                              <m:ctrlPr>
+                                <a:rPr lang="de-DE" sz="1600" i="1">
+                                  <a:latin typeface="Cambria Math" panose="02040503050406030204" pitchFamily="18" charset="0"/>
+                                </a:rPr>
+                              </m:ctrlPr>
+                            </m:naryPr>
+                            <m:sub>
+                              <m:r>
+                                <m:rPr>
+                                  <m:brk m:alnAt="7"/>
+                                </m:rPr>
+                                <a:rPr lang="de-DE" sz="1600" i="1">
+                                  <a:latin typeface="Cambria Math" panose="02040503050406030204" pitchFamily="18" charset="0"/>
+                                </a:rPr>
+                                <m:t>𝑓</m:t>
+                              </m:r>
+                              <m:r>
+                                <a:rPr lang="de-DE" sz="1600" i="1">
+                                  <a:latin typeface="Cambria Math" panose="02040503050406030204" pitchFamily="18" charset="0"/>
+                                </a:rPr>
+                                <m:t>𝑖𝑙𝑡𝑒</m:t>
+                              </m:r>
+                              <m:sSub>
+                                <m:sSubPr>
+                                  <m:ctrlPr>
+                                    <a:rPr lang="de-DE" sz="1600" i="1">
+                                      <a:latin typeface="Cambria Math" panose="02040503050406030204" pitchFamily="18" charset="0"/>
+                                    </a:rPr>
+                                  </m:ctrlPr>
+                                </m:sSubPr>
+                                <m:e>
+                                  <m:r>
+                                    <a:rPr lang="de-DE" sz="1600" i="1">
+                                      <a:latin typeface="Cambria Math" panose="02040503050406030204" pitchFamily="18" charset="0"/>
+                                    </a:rPr>
+                                    <m:t>𝑟</m:t>
+                                  </m:r>
+                                </m:e>
+                                <m:sub>
+                                  <m:r>
+                                    <a:rPr lang="de-DE" sz="1600" i="1">
+                                      <a:latin typeface="Cambria Math" panose="02040503050406030204" pitchFamily="18" charset="0"/>
+                                    </a:rPr>
+                                    <m:t>𝑦</m:t>
+                                  </m:r>
+                                </m:sub>
+                              </m:sSub>
+                            </m:sub>
+                            <m:sup/>
+                            <m:e>
+                              <m:nary>
+                                <m:naryPr>
+                                  <m:chr m:val="∑"/>
+                                  <m:supHide m:val="on"/>
+                                  <m:ctrlPr>
+                                    <a:rPr lang="de-DE" sz="1600" i="1">
+                                      <a:latin typeface="Cambria Math" panose="02040503050406030204" pitchFamily="18" charset="0"/>
+                                    </a:rPr>
+                                  </m:ctrlPr>
+                                </m:naryPr>
+                                <m:sub>
+                                  <m:r>
+                                    <m:rPr>
+                                      <m:brk m:alnAt="7"/>
+                                    </m:rPr>
+                                    <a:rPr lang="de-DE" sz="1600" i="1">
+                                      <a:latin typeface="Cambria Math" panose="02040503050406030204" pitchFamily="18" charset="0"/>
+                                    </a:rPr>
+                                    <m:t>𝑓</m:t>
+                                  </m:r>
+                                  <m:r>
+                                    <a:rPr lang="de-DE" sz="1600" i="1">
+                                      <a:latin typeface="Cambria Math" panose="02040503050406030204" pitchFamily="18" charset="0"/>
+                                    </a:rPr>
+                                    <m:t>𝑖𝑙𝑡𝑒</m:t>
+                                  </m:r>
+                                  <m:sSub>
+                                    <m:sSubPr>
+                                      <m:ctrlPr>
+                                        <a:rPr lang="de-DE" sz="1600" i="1">
+                                          <a:latin typeface="Cambria Math" panose="02040503050406030204" pitchFamily="18" charset="0"/>
+                                        </a:rPr>
+                                      </m:ctrlPr>
+                                    </m:sSubPr>
+                                    <m:e>
+                                      <m:r>
+                                        <a:rPr lang="de-DE" sz="1600" i="1">
+                                          <a:latin typeface="Cambria Math" panose="02040503050406030204" pitchFamily="18" charset="0"/>
+                                        </a:rPr>
+                                        <m:t>𝑟</m:t>
+                                      </m:r>
+                                    </m:e>
+                                    <m:sub>
+                                      <m:r>
+                                        <a:rPr lang="de-DE" sz="1600" i="1">
+                                          <a:latin typeface="Cambria Math" panose="02040503050406030204" pitchFamily="18" charset="0"/>
+                                        </a:rPr>
+                                        <m:t>𝑥</m:t>
+                                      </m:r>
+                                    </m:sub>
+                                  </m:sSub>
+                                </m:sub>
+                                <m:sup/>
+                                <m:e>
+                                  <m:r>
+                                    <a:rPr lang="de-DE" sz="1600" i="1">
+                                      <a:latin typeface="Cambria Math" panose="02040503050406030204" pitchFamily="18" charset="0"/>
+                                      <a:ea typeface="Cambria Math" panose="02040503050406030204" pitchFamily="18" charset="0"/>
+                                    </a:rPr>
+                                    <m:t>𝑓𝑖𝑙𝑡𝑒𝑟</m:t>
+                                  </m:r>
+                                  <m:d>
+                                    <m:dPr>
+                                      <m:begChr m:val="["/>
+                                      <m:endChr m:val="]"/>
+                                      <m:ctrlPr>
+                                        <a:rPr lang="de-DE" sz="1600" i="1">
+                                          <a:latin typeface="Cambria Math" panose="02040503050406030204" pitchFamily="18" charset="0"/>
+                                          <a:ea typeface="Cambria Math" panose="02040503050406030204" pitchFamily="18" charset="0"/>
+                                        </a:rPr>
+                                      </m:ctrlPr>
+                                    </m:dPr>
+                                    <m:e>
+                                      <m:r>
+                                        <a:rPr lang="de-DE" sz="1600" i="1">
+                                          <a:latin typeface="Cambria Math" panose="02040503050406030204" pitchFamily="18" charset="0"/>
+                                          <a:ea typeface="Cambria Math" panose="02040503050406030204" pitchFamily="18" charset="0"/>
+                                        </a:rPr>
+                                        <m:t>𝑥</m:t>
+                                      </m:r>
+                                      <m:r>
+                                        <a:rPr lang="de-DE" sz="1600" i="1">
+                                          <a:latin typeface="Cambria Math" panose="02040503050406030204" pitchFamily="18" charset="0"/>
+                                          <a:ea typeface="Cambria Math" panose="02040503050406030204" pitchFamily="18" charset="0"/>
+                                        </a:rPr>
+                                        <m:t>,</m:t>
+                                      </m:r>
+                                      <m:r>
+                                        <a:rPr lang="de-DE" sz="1600" i="1">
+                                          <a:latin typeface="Cambria Math" panose="02040503050406030204" pitchFamily="18" charset="0"/>
+                                          <a:ea typeface="Cambria Math" panose="02040503050406030204" pitchFamily="18" charset="0"/>
+                                        </a:rPr>
+                                        <m:t>𝑦</m:t>
+                                      </m:r>
+                                      <m:r>
+                                        <a:rPr lang="de-DE" sz="1600" i="1">
+                                          <a:latin typeface="Cambria Math" panose="02040503050406030204" pitchFamily="18" charset="0"/>
+                                          <a:ea typeface="Cambria Math" panose="02040503050406030204" pitchFamily="18" charset="0"/>
+                                        </a:rPr>
+                                        <m:t>,</m:t>
+                                      </m:r>
+                                      <m:r>
+                                        <a:rPr lang="de-DE" sz="1600" i="1">
+                                          <a:latin typeface="Cambria Math" panose="02040503050406030204" pitchFamily="18" charset="0"/>
+                                          <a:ea typeface="Cambria Math" panose="02040503050406030204" pitchFamily="18" charset="0"/>
+                                        </a:rPr>
+                                        <m:t>𝑜𝑢</m:t>
+                                      </m:r>
+                                      <m:sSub>
+                                        <m:sSubPr>
+                                          <m:ctrlPr>
+                                            <a:rPr lang="de-DE" sz="1600" i="1">
+                                              <a:latin typeface="Cambria Math" panose="02040503050406030204" pitchFamily="18" charset="0"/>
+                                              <a:ea typeface="Cambria Math" panose="02040503050406030204" pitchFamily="18" charset="0"/>
+                                            </a:rPr>
+                                          </m:ctrlPr>
+                                        </m:sSubPr>
+                                        <m:e>
+                                          <m:r>
+                                            <a:rPr lang="de-DE" sz="1600" i="1">
+                                              <a:latin typeface="Cambria Math" panose="02040503050406030204" pitchFamily="18" charset="0"/>
+                                              <a:ea typeface="Cambria Math" panose="02040503050406030204" pitchFamily="18" charset="0"/>
+                                            </a:rPr>
+                                            <m:t>𝑡</m:t>
+                                          </m:r>
+                                        </m:e>
+                                        <m:sub>
+                                          <m:r>
+                                            <a:rPr lang="de-DE" sz="1600" i="1">
+                                              <a:latin typeface="Cambria Math" panose="02040503050406030204" pitchFamily="18" charset="0"/>
+                                              <a:ea typeface="Cambria Math" panose="02040503050406030204" pitchFamily="18" charset="0"/>
+                                            </a:rPr>
+                                            <m:t>𝑐h𝑎𝑛𝑛𝑒𝑙</m:t>
+                                          </m:r>
+                                        </m:sub>
+                                      </m:sSub>
+                                    </m:e>
+                                  </m:d>
+                                  <m:r>
+                                    <a:rPr lang="de-DE" sz="1600" b="0" i="1" smtClean="0">
+                                      <a:latin typeface="Cambria Math" panose="02040503050406030204" pitchFamily="18" charset="0"/>
+                                      <a:ea typeface="Cambria Math" panose="02040503050406030204" pitchFamily="18" charset="0"/>
+                                    </a:rPr>
+                                    <m:t>+</m:t>
+                                  </m:r>
+                                  <m:r>
+                                    <a:rPr lang="de-DE" sz="1600" b="0" i="1" smtClean="0">
+                                      <a:latin typeface="Cambria Math" panose="02040503050406030204" pitchFamily="18" charset="0"/>
+                                      <a:ea typeface="Cambria Math" panose="02040503050406030204" pitchFamily="18" charset="0"/>
+                                    </a:rPr>
+                                    <m:t>𝑓𝑖𝑙𝑡𝑒</m:t>
+                                  </m:r>
+                                  <m:sSub>
+                                    <m:sSubPr>
+                                      <m:ctrlPr>
+                                        <a:rPr lang="de-DE" sz="1600" b="0" i="1" smtClean="0">
+                                          <a:latin typeface="Cambria Math" panose="02040503050406030204" pitchFamily="18" charset="0"/>
+                                          <a:ea typeface="Cambria Math" panose="02040503050406030204" pitchFamily="18" charset="0"/>
+                                        </a:rPr>
+                                      </m:ctrlPr>
+                                    </m:sSubPr>
+                                    <m:e>
+                                      <m:r>
+                                        <a:rPr lang="de-DE" sz="1600" b="0" i="1" smtClean="0">
+                                          <a:latin typeface="Cambria Math" panose="02040503050406030204" pitchFamily="18" charset="0"/>
+                                          <a:ea typeface="Cambria Math" panose="02040503050406030204" pitchFamily="18" charset="0"/>
+                                        </a:rPr>
+                                        <m:t>𝑟</m:t>
+                                      </m:r>
+                                    </m:e>
+                                    <m:sub>
+                                      <m:r>
+                                        <a:rPr lang="de-DE" sz="1600" b="0" i="1" smtClean="0">
+                                          <a:latin typeface="Cambria Math" panose="02040503050406030204" pitchFamily="18" charset="0"/>
+                                          <a:ea typeface="Cambria Math" panose="02040503050406030204" pitchFamily="18" charset="0"/>
+                                        </a:rPr>
+                                        <m:t>𝑜𝑓𝑓𝑠𝑒𝑡</m:t>
+                                      </m:r>
+                                    </m:sub>
+                                  </m:sSub>
+                                </m:e>
+                              </m:nary>
+                            </m:e>
+                          </m:nary>
+                        </m:e>
+                      </m:d>
+                      <m:r>
+                        <a:rPr lang="de-DE" sz="1600" b="0" i="1" smtClean="0">
+                          <a:latin typeface="Cambria Math" panose="02040503050406030204" pitchFamily="18" charset="0"/>
+                          <a:ea typeface="Cambria Math" panose="02040503050406030204" pitchFamily="18" charset="0"/>
+                        </a:rPr>
+                        <m:t>+</m:t>
+                      </m:r>
+                    </m:oMath>
+                  </m:oMathPara>
+                </a14:m>
+                <a:endParaRPr lang="de-DE" sz="1600" b="0" i="1" dirty="0" smtClean="0">
+                  <a:latin typeface="Cambria Math" panose="02040503050406030204" pitchFamily="18" charset="0"/>
+                  <a:ea typeface="Cambria Math" panose="02040503050406030204" pitchFamily="18" charset="0"/>
+                </a:endParaRPr>
+              </a:p>
+              <a:p>
+                <a:pPr marL="0" indent="0">
+                  <a:buNone/>
+                </a:pPr>
+                <a14:m>
+                  <m:oMathPara xmlns:m="http://schemas.openxmlformats.org/officeDocument/2006/math">
+                    <m:oMathParaPr>
+                      <m:jc m:val="centerGroup"/>
+                    </m:oMathParaPr>
+                    <m:oMath xmlns:m="http://schemas.openxmlformats.org/officeDocument/2006/math">
+                      <m:r>
+                        <a:rPr lang="de-DE" sz="1600" b="0" i="1" smtClean="0">
+                          <a:latin typeface="Cambria Math" panose="02040503050406030204" pitchFamily="18" charset="0"/>
+                          <a:ea typeface="Cambria Math" panose="02040503050406030204" pitchFamily="18" charset="0"/>
+                        </a:rPr>
+                        <m:t>(</m:t>
+                      </m:r>
+                      <m:r>
+                        <a:rPr lang="de-DE" sz="1600" b="0" i="1" smtClean="0">
+                          <a:latin typeface="Cambria Math" panose="02040503050406030204" pitchFamily="18" charset="0"/>
+                          <a:ea typeface="Cambria Math" panose="02040503050406030204" pitchFamily="18" charset="0"/>
+                        </a:rPr>
+                        <m:t>𝑓𝑖𝑙𝑡𝑒</m:t>
+                      </m:r>
+                      <m:sSub>
+                        <m:sSubPr>
+                          <m:ctrlPr>
+                            <a:rPr lang="de-DE" sz="1600" b="0" i="1" smtClean="0">
+                              <a:latin typeface="Cambria Math" panose="02040503050406030204" pitchFamily="18" charset="0"/>
+                              <a:ea typeface="Cambria Math" panose="02040503050406030204" pitchFamily="18" charset="0"/>
+                            </a:rPr>
+                          </m:ctrlPr>
+                        </m:sSubPr>
+                        <m:e>
+                          <m:r>
+                            <a:rPr lang="de-DE" sz="1600" b="0" i="1" smtClean="0">
+                              <a:latin typeface="Cambria Math" panose="02040503050406030204" pitchFamily="18" charset="0"/>
+                              <a:ea typeface="Cambria Math" panose="02040503050406030204" pitchFamily="18" charset="0"/>
+                            </a:rPr>
+                            <m:t>𝑟</m:t>
+                          </m:r>
+                        </m:e>
+                        <m:sub>
+                          <m:r>
+                            <a:rPr lang="de-DE" sz="1600" b="0" i="1" smtClean="0">
+                              <a:latin typeface="Cambria Math" panose="02040503050406030204" pitchFamily="18" charset="0"/>
+                              <a:ea typeface="Cambria Math" panose="02040503050406030204" pitchFamily="18" charset="0"/>
+                            </a:rPr>
+                            <m:t>𝑜𝑓𝑓𝑠𝑒𝑡</m:t>
+                          </m:r>
+                        </m:sub>
+                      </m:sSub>
+                      <m:r>
+                        <a:rPr lang="de-DE" sz="1600" b="0" i="1" smtClean="0">
+                          <a:latin typeface="Cambria Math" panose="02040503050406030204" pitchFamily="18" charset="0"/>
+                          <a:ea typeface="Cambria Math" panose="02040503050406030204" pitchFamily="18" charset="0"/>
+                        </a:rPr>
+                        <m:t>∗</m:t>
+                      </m:r>
+                      <m:nary>
+                        <m:naryPr>
+                          <m:chr m:val="∑"/>
+                          <m:supHide m:val="on"/>
+                          <m:ctrlPr>
+                            <a:rPr lang="de-DE" sz="1600" i="1">
+                              <a:latin typeface="Cambria Math" panose="02040503050406030204" pitchFamily="18" charset="0"/>
+                            </a:rPr>
+                          </m:ctrlPr>
+                        </m:naryPr>
+                        <m:sub>
+                          <m:r>
+                            <m:rPr>
+                              <m:brk m:alnAt="7"/>
+                            </m:rPr>
+                            <a:rPr lang="de-DE" sz="1600" i="1">
+                              <a:latin typeface="Cambria Math" panose="02040503050406030204" pitchFamily="18" charset="0"/>
+                            </a:rPr>
+                            <m:t>𝑓</m:t>
+                          </m:r>
+                          <m:r>
+                            <a:rPr lang="de-DE" sz="1600" i="1">
+                              <a:latin typeface="Cambria Math" panose="02040503050406030204" pitchFamily="18" charset="0"/>
+                            </a:rPr>
+                            <m:t>𝑖𝑙𝑡𝑒</m:t>
+                          </m:r>
+                          <m:sSub>
+                            <m:sSubPr>
+                              <m:ctrlPr>
+                                <a:rPr lang="de-DE" sz="1600" i="1">
+                                  <a:latin typeface="Cambria Math" panose="02040503050406030204" pitchFamily="18" charset="0"/>
+                                </a:rPr>
+                              </m:ctrlPr>
+                            </m:sSubPr>
+                            <m:e>
+                              <m:r>
+                                <a:rPr lang="de-DE" sz="1600" i="1">
+                                  <a:latin typeface="Cambria Math" panose="02040503050406030204" pitchFamily="18" charset="0"/>
+                                </a:rPr>
+                                <m:t>𝑟</m:t>
+                              </m:r>
+                            </m:e>
+                            <m:sub>
+                              <m:r>
+                                <a:rPr lang="de-DE" sz="1600" i="1">
+                                  <a:latin typeface="Cambria Math" panose="02040503050406030204" pitchFamily="18" charset="0"/>
+                                </a:rPr>
+                                <m:t>𝑦</m:t>
+                              </m:r>
+                            </m:sub>
+                          </m:sSub>
+                        </m:sub>
+                        <m:sup/>
+                        <m:e>
+                          <m:nary>
+                            <m:naryPr>
+                              <m:chr m:val="∑"/>
+                              <m:supHide m:val="on"/>
+                              <m:ctrlPr>
+                                <a:rPr lang="de-DE" sz="1600" i="1">
+                                  <a:latin typeface="Cambria Math" panose="02040503050406030204" pitchFamily="18" charset="0"/>
+                                </a:rPr>
+                              </m:ctrlPr>
+                            </m:naryPr>
+                            <m:sub>
+                              <m:r>
+                                <m:rPr>
+                                  <m:brk m:alnAt="7"/>
+                                </m:rPr>
+                                <a:rPr lang="de-DE" sz="1600" i="1">
+                                  <a:latin typeface="Cambria Math" panose="02040503050406030204" pitchFamily="18" charset="0"/>
+                                </a:rPr>
+                                <m:t>𝑓</m:t>
+                              </m:r>
+                              <m:r>
+                                <a:rPr lang="de-DE" sz="1600" i="1">
+                                  <a:latin typeface="Cambria Math" panose="02040503050406030204" pitchFamily="18" charset="0"/>
+                                </a:rPr>
+                                <m:t>𝑖𝑙𝑡𝑒</m:t>
+                              </m:r>
+                              <m:sSub>
+                                <m:sSubPr>
+                                  <m:ctrlPr>
+                                    <a:rPr lang="de-DE" sz="1600" i="1">
+                                      <a:latin typeface="Cambria Math" panose="02040503050406030204" pitchFamily="18" charset="0"/>
+                                    </a:rPr>
+                                  </m:ctrlPr>
+                                </m:sSubPr>
+                                <m:e>
+                                  <m:r>
+                                    <a:rPr lang="de-DE" sz="1600" i="1">
+                                      <a:latin typeface="Cambria Math" panose="02040503050406030204" pitchFamily="18" charset="0"/>
+                                    </a:rPr>
+                                    <m:t>𝑟</m:t>
+                                  </m:r>
+                                </m:e>
+                                <m:sub>
+                                  <m:r>
+                                    <a:rPr lang="de-DE" sz="1600" i="1">
+                                      <a:latin typeface="Cambria Math" panose="02040503050406030204" pitchFamily="18" charset="0"/>
+                                    </a:rPr>
+                                    <m:t>𝑥</m:t>
+                                  </m:r>
+                                </m:sub>
+                              </m:sSub>
+                            </m:sub>
+                            <m:sup/>
+                            <m:e>
+                              <m:r>
+                                <a:rPr lang="de-DE" sz="1600" b="0" i="1" smtClean="0">
+                                  <a:latin typeface="Cambria Math" panose="02040503050406030204" pitchFamily="18" charset="0"/>
+                                  <a:ea typeface="Cambria Math" panose="02040503050406030204" pitchFamily="18" charset="0"/>
+                                </a:rPr>
+                                <m:t>𝑖𝑛𝑝𝑢𝑡</m:t>
+                              </m:r>
+                              <m:d>
+                                <m:dPr>
+                                  <m:begChr m:val="["/>
+                                  <m:endChr m:val="]"/>
+                                  <m:ctrlPr>
+                                    <a:rPr lang="de-DE" sz="1600" i="1">
+                                      <a:latin typeface="Cambria Math" panose="02040503050406030204" pitchFamily="18" charset="0"/>
+                                      <a:ea typeface="Cambria Math" panose="02040503050406030204" pitchFamily="18" charset="0"/>
+                                    </a:rPr>
+                                  </m:ctrlPr>
+                                </m:dPr>
+                                <m:e>
+                                  <m:r>
+                                    <a:rPr lang="de-DE" sz="1600" i="1">
+                                      <a:latin typeface="Cambria Math" panose="02040503050406030204" pitchFamily="18" charset="0"/>
+                                      <a:ea typeface="Cambria Math" panose="02040503050406030204" pitchFamily="18" charset="0"/>
+                                    </a:rPr>
+                                    <m:t>𝑥</m:t>
+                                  </m:r>
+                                  <m:r>
+                                    <a:rPr lang="de-DE" sz="1600" i="1">
+                                      <a:latin typeface="Cambria Math" panose="02040503050406030204" pitchFamily="18" charset="0"/>
+                                      <a:ea typeface="Cambria Math" panose="02040503050406030204" pitchFamily="18" charset="0"/>
+                                    </a:rPr>
+                                    <m:t>,</m:t>
+                                  </m:r>
+                                  <m:r>
+                                    <a:rPr lang="de-DE" sz="1600" i="1">
+                                      <a:latin typeface="Cambria Math" panose="02040503050406030204" pitchFamily="18" charset="0"/>
+                                      <a:ea typeface="Cambria Math" panose="02040503050406030204" pitchFamily="18" charset="0"/>
+                                    </a:rPr>
+                                    <m:t>𝑦</m:t>
+                                  </m:r>
+                                  <m:r>
+                                    <a:rPr lang="de-DE" sz="1600" i="1">
+                                      <a:latin typeface="Cambria Math" panose="02040503050406030204" pitchFamily="18" charset="0"/>
+                                      <a:ea typeface="Cambria Math" panose="02040503050406030204" pitchFamily="18" charset="0"/>
+                                    </a:rPr>
+                                    <m:t>,</m:t>
+                                  </m:r>
+                                  <m:r>
+                                    <a:rPr lang="de-DE" sz="1600" b="0" i="1" smtClean="0">
+                                      <a:latin typeface="Cambria Math" panose="02040503050406030204" pitchFamily="18" charset="0"/>
+                                      <a:ea typeface="Cambria Math" panose="02040503050406030204" pitchFamily="18" charset="0"/>
+                                    </a:rPr>
+                                    <m:t>𝑖𝑛</m:t>
+                                  </m:r>
+                                  <m:r>
+                                    <a:rPr lang="de-DE" sz="1600" b="0" i="1" smtClean="0">
+                                      <a:latin typeface="Cambria Math" panose="02040503050406030204" pitchFamily="18" charset="0"/>
+                                      <a:ea typeface="Cambria Math" panose="02040503050406030204" pitchFamily="18" charset="0"/>
+                                    </a:rPr>
+                                    <m:t>_</m:t>
+                                  </m:r>
+                                  <m:r>
+                                    <a:rPr lang="de-DE" sz="1600" b="0" i="1" smtClean="0">
+                                      <a:latin typeface="Cambria Math" panose="02040503050406030204" pitchFamily="18" charset="0"/>
+                                      <a:ea typeface="Cambria Math" panose="02040503050406030204" pitchFamily="18" charset="0"/>
+                                    </a:rPr>
+                                    <m:t>𝑐h𝑎𝑛𝑛𝑒𝑙</m:t>
+                                  </m:r>
+                                </m:e>
+                              </m:d>
+                            </m:e>
+                          </m:nary>
+                        </m:e>
+                      </m:nary>
+                      <m:r>
+                        <a:rPr lang="de-DE" sz="1600" b="0" i="1" smtClean="0">
+                          <a:latin typeface="Cambria Math" panose="02040503050406030204" pitchFamily="18" charset="0"/>
+                          <a:ea typeface="Cambria Math" panose="02040503050406030204" pitchFamily="18" charset="0"/>
+                        </a:rPr>
+                        <m:t>)</m:t>
+                      </m:r>
+                    </m:oMath>
+                  </m:oMathPara>
+                </a14:m>
+                <a:endParaRPr lang="de-DE" sz="1600" dirty="0"/>
+              </a:p>
+            </p:txBody>
+          </p:sp>
+        </mc:Choice>
+        <mc:Fallback xmlns="">
+          <p:sp>
+            <p:nvSpPr>
+              <p:cNvPr id="5" name="Content Placeholder 4"/>
+              <p:cNvSpPr>
+                <a:spLocks noGrp="1" noRot="1" noChangeAspect="1" noMove="1" noResize="1" noEditPoints="1" noAdjustHandles="1" noChangeArrowheads="1" noChangeShapeType="1" noTextEdit="1"/>
+              </p:cNvSpPr>
+              <p:nvPr>
+                <p:ph sz="quarter" idx="13"/>
+              </p:nvPr>
+            </p:nvSpPr>
+            <p:spPr>
+              <a:blipFill>
+                <a:blip r:embed="rId2"/>
+                <a:stretch>
+                  <a:fillRect l="-4231" t="-1192"/>
+                </a:stretch>
+              </a:blipFill>
+            </p:spPr>
+            <p:txBody>
+              <a:bodyPr/>
+              <a:lstStyle/>
+              <a:p>
+                <a:r>
+                  <a:rPr lang="de-DE">
+                    <a:noFill/>
+                  </a:rPr>
+                  <a:t> </a:t>
+                </a:r>
+              </a:p>
+            </p:txBody>
+          </p:sp>
+        </mc:Fallback>
+      </mc:AlternateContent>
+      <p:sp>
+        <p:nvSpPr>
+          <p:cNvPr id="6" name="Date Placeholder 5"/>
+          <p:cNvSpPr>
+            <a:spLocks noGrp="1"/>
+          </p:cNvSpPr>
+          <p:nvPr>
+            <p:ph type="dt" sz="half" idx="15"/>
+          </p:nvPr>
+        </p:nvSpPr>
+        <p:spPr/>
+        <p:txBody>
+          <a:bodyPr/>
+          <a:lstStyle/>
+          <a:p>
+            <a:r>
+              <a:rPr lang="de-DE" smtClean="0"/>
+              <a:t>2020-05-14             </a:t>
+            </a:r>
+            <a:r>
+              <a:rPr lang="de-DE" b="1" smtClean="0"/>
+              <a:t>restricted</a:t>
+            </a:r>
+            <a:endParaRPr lang="de-DE" b="1" dirty="0"/>
+          </a:p>
+        </p:txBody>
+      </p:sp>
+    </p:spTree>
+    <p:extLst>
+      <p:ext uri="{BB962C8B-B14F-4D97-AF65-F5344CB8AC3E}">
+        <p14:creationId xmlns:p14="http://schemas.microsoft.com/office/powerpoint/2010/main" val="904921740"/>
+      </p:ext>
+    </p:extLst>
+  </p:cSld>
+  <p:clrMapOvr>
+    <a:masterClrMapping/>
+  </p:clrMapOvr>
+  <p:timing>
+    <p:tnLst>
+      <p:par>
+        <p:cTn id="1" dur="indefinite" restart="never" nodeType="tmRoot"/>
+      </p:par>
+    </p:tnLst>
+  </p:timing>
+</p:sld>
+</file>
+
+<file path=ppt/slides/slide16.xml><?xml version="1.0" encoding="utf-8"?>
 <p:sld xmlns:a="http://schemas.openxmlformats.org/drawingml/2006/main" xmlns:r="http://schemas.openxmlformats.org/officeDocument/2006/relationships" xmlns:p="http://schemas.openxmlformats.org/presentationml/2006/main">
   <p:cSld>
     <p:spTree>
@@ -15648,8 +18832,8 @@
           </a:p>
         </p:txBody>
       </p:sp>
-      <mc:AlternateContent xmlns:mc="http://schemas.openxmlformats.org/markup-compatibility/2006">
-        <mc:Choice xmlns:a14="http://schemas.microsoft.com/office/drawing/2010/main" Requires="a14">
+      <mc:AlternateContent xmlns:mc="http://schemas.openxmlformats.org/markup-compatibility/2006" xmlns:a14="http://schemas.microsoft.com/office/drawing/2010/main">
+        <mc:Choice Requires="a14">
           <p:sp>
             <p:nvSpPr>
               <p:cNvPr id="9" name="Content Placeholder 8"/>
@@ -16865,7 +20049,7 @@
             </p:txBody>
           </p:sp>
         </mc:Choice>
-        <mc:Fallback>
+        <mc:Fallback xmlns="">
           <p:sp>
             <p:nvSpPr>
               <p:cNvPr id="9" name="Content Placeholder 8"/>
@@ -17115,8 +20299,8 @@
           </a:p>
         </p:txBody>
       </p:sp>
-      <mc:AlternateContent xmlns:mc="http://schemas.openxmlformats.org/markup-compatibility/2006">
-        <mc:Choice xmlns:a14="http://schemas.microsoft.com/office/drawing/2010/main" Requires="a14">
+      <mc:AlternateContent xmlns:mc="http://schemas.openxmlformats.org/markup-compatibility/2006" xmlns:a14="http://schemas.microsoft.com/office/drawing/2010/main">
+        <mc:Choice Requires="a14">
           <p:sp>
             <p:nvSpPr>
               <p:cNvPr id="5" name="Content Placeholder 4"/>
@@ -17725,7 +20909,7 @@
             </p:txBody>
           </p:sp>
         </mc:Choice>
-        <mc:Fallback>
+        <mc:Fallback xmlns="">
           <p:sp>
             <p:nvSpPr>
               <p:cNvPr id="5" name="Content Placeholder 4"/>
@@ -18156,11 +21340,7 @@
           <a:p>
             <a:r>
               <a:rPr lang="de-DE" dirty="0" smtClean="0"/>
-              <a:t>All </a:t>
-            </a:r>
-            <a:r>
-              <a:rPr lang="de-DE" dirty="0" smtClean="0"/>
-              <a:t>optimizations I made</a:t>
+              <a:t>All optimizations I made</a:t>
             </a:r>
             <a:endParaRPr lang="de-DE" dirty="0"/>
           </a:p>
@@ -18183,11 +21363,7 @@
           <a:p>
             <a:r>
               <a:rPr lang="de-DE" dirty="0" smtClean="0"/>
-              <a:t>Dynamic memory allocation of OpData </a:t>
-            </a:r>
-            <a:r>
-              <a:rPr lang="de-DE" dirty="0" smtClean="0"/>
-              <a:t>members</a:t>
+              <a:t>Dynamic memory allocation of OpData members</a:t>
             </a:r>
           </a:p>
           <a:p>
@@ -18195,7 +21371,6 @@
               <a:rPr lang="de-DE" dirty="0" smtClean="0"/>
               <a:t>Moved CalculateOpData function call to Prepare phase</a:t>
             </a:r>
-            <a:endParaRPr lang="de-DE" dirty="0" smtClean="0"/>
           </a:p>
           <a:p>
             <a:r>
@@ -18245,7 +21420,39 @@
               <a:rPr lang="de-DE" dirty="0" smtClean="0">
                 <a:sym typeface="Wingdings" panose="05000000000000000000" pitchFamily="2" charset="2"/>
               </a:rPr>
-              <a:t> If dilation factor is not one, reference implementation is used</a:t>
+              <a:t> If dilation factor is not one, reference implementation is </a:t>
+            </a:r>
+            <a:r>
+              <a:rPr lang="de-DE" dirty="0" smtClean="0">
+                <a:sym typeface="Wingdings" panose="05000000000000000000" pitchFamily="2" charset="2"/>
+              </a:rPr>
+              <a:t>used</a:t>
+            </a:r>
+          </a:p>
+          <a:p>
+            <a:r>
+              <a:rPr lang="de-DE" dirty="0" smtClean="0">
+                <a:sym typeface="Wingdings" panose="05000000000000000000" pitchFamily="2" charset="2"/>
+              </a:rPr>
+              <a:t>If padding != 0, the precomputation and filter consecutivity can‘t be used!</a:t>
+            </a:r>
+          </a:p>
+          <a:p>
+            <a:pPr lvl="1"/>
+            <a:r>
+              <a:rPr lang="de-DE" dirty="0" smtClean="0">
+                <a:sym typeface="Wingdings" panose="05000000000000000000" pitchFamily="2" charset="2"/>
+              </a:rPr>
+              <a:t>Extra implementation in this case</a:t>
+            </a:r>
+          </a:p>
+          <a:p>
+            <a:pPr lvl="1"/>
+            <a:r>
+              <a:rPr lang="de-DE" dirty="0" smtClean="0">
+                <a:sym typeface="Wingdings" panose="05000000000000000000" pitchFamily="2" charset="2"/>
+              </a:rPr>
+              <a:t>I added 2 extra tensorflow tests for padding (there were none)</a:t>
             </a:r>
             <a:endParaRPr lang="de-DE" dirty="0" smtClean="0">
               <a:sym typeface="Wingdings" panose="05000000000000000000" pitchFamily="2" charset="2"/>

</xml_diff>